<commit_message>
Update Teacher To-Do Mini Intro.pptx
</commit_message>
<xml_diff>
--- a/Teacher To-Do Mini Intro.pptx
+++ b/Teacher To-Do Mini Intro.pptx
@@ -6,7 +6,8 @@
   </p:sldMasterIdLst>
   <p:sldIdLst>
     <p:sldId id="256" r:id="rId2"/>
-    <p:sldId id="257" r:id="rId3"/>
+    <p:sldId id="258" r:id="rId3"/>
+    <p:sldId id="257" r:id="rId4"/>
   </p:sldIdLst>
   <p:sldSz cx="12192000" cy="6858000"/>
   <p:notesSz cx="6858000" cy="9144000"/>
@@ -105,7 +106,3694 @@
       </a:defRPr>
     </a:lvl9pPr>
   </p:defaultTextStyle>
+  <p:extLst>
+    <p:ext uri="{EFAFB233-063F-42B5-8137-9DF3F51BA10A}">
+      <p15:sldGuideLst xmlns:p15="http://schemas.microsoft.com/office/powerpoint/2012/main"/>
+    </p:ext>
+  </p:extLst>
 </p:presentation>
+</file>
+
+<file path=ppt/diagrams/colors1.xml><?xml version="1.0" encoding="utf-8"?>
+<dgm:colorsDef xmlns:dgm="http://schemas.openxmlformats.org/drawingml/2006/diagram" xmlns:a="http://schemas.openxmlformats.org/drawingml/2006/main" uniqueId="urn:microsoft.com/office/officeart/2005/8/colors/colorful5">
+  <dgm:title val=""/>
+  <dgm:desc val=""/>
+  <dgm:catLst>
+    <dgm:cat type="colorful" pri="10500"/>
+  </dgm:catLst>
+  <dgm:styleLbl name="node0">
+    <dgm:fillClrLst meth="repeat">
+      <a:schemeClr val="accent4"/>
+    </dgm:fillClrLst>
+    <dgm:linClrLst meth="repeat">
+      <a:schemeClr val="lt1"/>
+    </dgm:linClrLst>
+    <dgm:effectClrLst/>
+    <dgm:txLinClrLst/>
+    <dgm:txFillClrLst/>
+    <dgm:txEffectClrLst/>
+  </dgm:styleLbl>
+  <dgm:styleLbl name="node1">
+    <dgm:fillClrLst>
+      <a:schemeClr val="accent5"/>
+      <a:schemeClr val="accent6"/>
+    </dgm:fillClrLst>
+    <dgm:linClrLst meth="repeat">
+      <a:schemeClr val="lt1"/>
+    </dgm:linClrLst>
+    <dgm:effectClrLst/>
+    <dgm:txLinClrLst/>
+    <dgm:txFillClrLst/>
+    <dgm:txEffectClrLst/>
+  </dgm:styleLbl>
+  <dgm:styleLbl name="alignNode1">
+    <dgm:fillClrLst>
+      <a:schemeClr val="accent5"/>
+      <a:schemeClr val="accent6"/>
+    </dgm:fillClrLst>
+    <dgm:linClrLst>
+      <a:schemeClr val="accent5"/>
+      <a:schemeClr val="accent6"/>
+    </dgm:linClrLst>
+    <dgm:effectClrLst/>
+    <dgm:txLinClrLst/>
+    <dgm:txFillClrLst/>
+    <dgm:txEffectClrLst/>
+  </dgm:styleLbl>
+  <dgm:styleLbl name="lnNode1">
+    <dgm:fillClrLst>
+      <a:schemeClr val="accent5"/>
+      <a:schemeClr val="accent6"/>
+    </dgm:fillClrLst>
+    <dgm:linClrLst meth="repeat">
+      <a:schemeClr val="lt1"/>
+    </dgm:linClrLst>
+    <dgm:effectClrLst/>
+    <dgm:txLinClrLst/>
+    <dgm:txFillClrLst/>
+    <dgm:txEffectClrLst/>
+  </dgm:styleLbl>
+  <dgm:styleLbl name="vennNode1">
+    <dgm:fillClrLst>
+      <a:schemeClr val="accent5">
+        <a:alpha val="50000"/>
+      </a:schemeClr>
+      <a:schemeClr val="accent6">
+        <a:alpha val="50000"/>
+      </a:schemeClr>
+    </dgm:fillClrLst>
+    <dgm:linClrLst meth="repeat">
+      <a:schemeClr val="lt1"/>
+    </dgm:linClrLst>
+    <dgm:effectClrLst/>
+    <dgm:txLinClrLst/>
+    <dgm:txFillClrLst/>
+    <dgm:txEffectClrLst/>
+  </dgm:styleLbl>
+  <dgm:styleLbl name="node2">
+    <dgm:fillClrLst>
+      <a:schemeClr val="accent6"/>
+    </dgm:fillClrLst>
+    <dgm:linClrLst meth="repeat">
+      <a:schemeClr val="lt1"/>
+    </dgm:linClrLst>
+    <dgm:effectClrLst/>
+    <dgm:txLinClrLst/>
+    <dgm:txFillClrLst/>
+    <dgm:txEffectClrLst/>
+  </dgm:styleLbl>
+  <dgm:styleLbl name="node3">
+    <dgm:fillClrLst>
+      <a:schemeClr val="accent1"/>
+    </dgm:fillClrLst>
+    <dgm:linClrLst meth="repeat">
+      <a:schemeClr val="lt1"/>
+    </dgm:linClrLst>
+    <dgm:effectClrLst/>
+    <dgm:txLinClrLst/>
+    <dgm:txFillClrLst/>
+    <dgm:txEffectClrLst/>
+  </dgm:styleLbl>
+  <dgm:styleLbl name="node4">
+    <dgm:fillClrLst>
+      <a:schemeClr val="accent2"/>
+    </dgm:fillClrLst>
+    <dgm:linClrLst meth="repeat">
+      <a:schemeClr val="lt1"/>
+    </dgm:linClrLst>
+    <dgm:effectClrLst/>
+    <dgm:txLinClrLst/>
+    <dgm:txFillClrLst/>
+    <dgm:txEffectClrLst/>
+  </dgm:styleLbl>
+  <dgm:styleLbl name="fgImgPlace1">
+    <dgm:fillClrLst>
+      <a:schemeClr val="accent5">
+        <a:tint val="50000"/>
+      </a:schemeClr>
+      <a:schemeClr val="accent6">
+        <a:tint val="50000"/>
+      </a:schemeClr>
+    </dgm:fillClrLst>
+    <dgm:linClrLst meth="repeat">
+      <a:schemeClr val="lt1"/>
+    </dgm:linClrLst>
+    <dgm:effectClrLst/>
+    <dgm:txLinClrLst/>
+    <dgm:txFillClrLst meth="repeat">
+      <a:schemeClr val="lt1"/>
+    </dgm:txFillClrLst>
+    <dgm:txEffectClrLst/>
+  </dgm:styleLbl>
+  <dgm:styleLbl name="alignImgPlace1">
+    <dgm:fillClrLst>
+      <a:schemeClr val="accent5">
+        <a:tint val="50000"/>
+      </a:schemeClr>
+      <a:schemeClr val="accent6">
+        <a:tint val="20000"/>
+      </a:schemeClr>
+    </dgm:fillClrLst>
+    <dgm:linClrLst meth="repeat">
+      <a:schemeClr val="lt1"/>
+    </dgm:linClrLst>
+    <dgm:effectClrLst/>
+    <dgm:txLinClrLst/>
+    <dgm:txFillClrLst meth="repeat">
+      <a:schemeClr val="lt1"/>
+    </dgm:txFillClrLst>
+    <dgm:txEffectClrLst/>
+  </dgm:styleLbl>
+  <dgm:styleLbl name="bgImgPlace1">
+    <dgm:fillClrLst>
+      <a:schemeClr val="accent5">
+        <a:tint val="50000"/>
+      </a:schemeClr>
+      <a:schemeClr val="accent6">
+        <a:tint val="20000"/>
+      </a:schemeClr>
+    </dgm:fillClrLst>
+    <dgm:linClrLst meth="repeat">
+      <a:schemeClr val="lt1"/>
+    </dgm:linClrLst>
+    <dgm:effectClrLst/>
+    <dgm:txLinClrLst/>
+    <dgm:txFillClrLst meth="repeat">
+      <a:schemeClr val="lt1"/>
+    </dgm:txFillClrLst>
+    <dgm:txEffectClrLst/>
+  </dgm:styleLbl>
+  <dgm:styleLbl name="sibTrans2D1">
+    <dgm:fillClrLst>
+      <a:schemeClr val="accent5"/>
+      <a:schemeClr val="accent6"/>
+    </dgm:fillClrLst>
+    <dgm:linClrLst meth="repeat">
+      <a:schemeClr val="lt1"/>
+    </dgm:linClrLst>
+    <dgm:effectClrLst/>
+    <dgm:txLinClrLst/>
+    <dgm:txFillClrLst/>
+    <dgm:txEffectClrLst/>
+  </dgm:styleLbl>
+  <dgm:styleLbl name="fgSibTrans2D1">
+    <dgm:fillClrLst>
+      <a:schemeClr val="accent5"/>
+      <a:schemeClr val="accent6"/>
+    </dgm:fillClrLst>
+    <dgm:linClrLst meth="repeat">
+      <a:schemeClr val="lt1"/>
+    </dgm:linClrLst>
+    <dgm:effectClrLst/>
+    <dgm:txLinClrLst/>
+    <dgm:txFillClrLst meth="repeat">
+      <a:schemeClr val="lt1"/>
+    </dgm:txFillClrLst>
+    <dgm:txEffectClrLst/>
+  </dgm:styleLbl>
+  <dgm:styleLbl name="bgSibTrans2D1">
+    <dgm:fillClrLst>
+      <a:schemeClr val="accent5"/>
+      <a:schemeClr val="accent6"/>
+    </dgm:fillClrLst>
+    <dgm:linClrLst meth="repeat">
+      <a:schemeClr val="lt1"/>
+    </dgm:linClrLst>
+    <dgm:effectClrLst/>
+    <dgm:txLinClrLst/>
+    <dgm:txFillClrLst meth="repeat">
+      <a:schemeClr val="lt1"/>
+    </dgm:txFillClrLst>
+    <dgm:txEffectClrLst/>
+  </dgm:styleLbl>
+  <dgm:styleLbl name="sibTrans1D1">
+    <dgm:fillClrLst/>
+    <dgm:linClrLst>
+      <a:schemeClr val="accent5"/>
+      <a:schemeClr val="accent6"/>
+    </dgm:linClrLst>
+    <dgm:effectClrLst/>
+    <dgm:txLinClrLst/>
+    <dgm:txFillClrLst meth="repeat">
+      <a:schemeClr val="tx1"/>
+    </dgm:txFillClrLst>
+    <dgm:txEffectClrLst/>
+  </dgm:styleLbl>
+  <dgm:styleLbl name="callout">
+    <dgm:fillClrLst meth="repeat">
+      <a:schemeClr val="accent5"/>
+    </dgm:fillClrLst>
+    <dgm:linClrLst meth="repeat">
+      <a:schemeClr val="accent5">
+        <a:tint val="50000"/>
+      </a:schemeClr>
+    </dgm:linClrLst>
+    <dgm:effectClrLst/>
+    <dgm:txLinClrLst/>
+    <dgm:txFillClrLst meth="repeat">
+      <a:schemeClr val="tx1"/>
+    </dgm:txFillClrLst>
+    <dgm:txEffectClrLst/>
+  </dgm:styleLbl>
+  <dgm:styleLbl name="asst0">
+    <dgm:fillClrLst meth="repeat">
+      <a:schemeClr val="accent5"/>
+    </dgm:fillClrLst>
+    <dgm:linClrLst meth="repeat">
+      <a:schemeClr val="lt1">
+        <a:shade val="80000"/>
+      </a:schemeClr>
+    </dgm:linClrLst>
+    <dgm:effectClrLst/>
+    <dgm:txLinClrLst/>
+    <dgm:txFillClrLst/>
+    <dgm:txEffectClrLst/>
+  </dgm:styleLbl>
+  <dgm:styleLbl name="asst1">
+    <dgm:fillClrLst meth="repeat">
+      <a:schemeClr val="accent6"/>
+    </dgm:fillClrLst>
+    <dgm:linClrLst meth="repeat">
+      <a:schemeClr val="lt1">
+        <a:shade val="80000"/>
+      </a:schemeClr>
+    </dgm:linClrLst>
+    <dgm:effectClrLst/>
+    <dgm:txLinClrLst/>
+    <dgm:txFillClrLst/>
+    <dgm:txEffectClrLst/>
+  </dgm:styleLbl>
+  <dgm:styleLbl name="asst2">
+    <dgm:fillClrLst>
+      <a:schemeClr val="accent1"/>
+    </dgm:fillClrLst>
+    <dgm:linClrLst meth="repeat">
+      <a:schemeClr val="lt1"/>
+    </dgm:linClrLst>
+    <dgm:effectClrLst/>
+    <dgm:txLinClrLst/>
+    <dgm:txFillClrLst/>
+    <dgm:txEffectClrLst/>
+  </dgm:styleLbl>
+  <dgm:styleLbl name="asst3">
+    <dgm:fillClrLst>
+      <a:schemeClr val="accent2"/>
+    </dgm:fillClrLst>
+    <dgm:linClrLst meth="repeat">
+      <a:schemeClr val="lt1"/>
+    </dgm:linClrLst>
+    <dgm:effectClrLst/>
+    <dgm:txLinClrLst/>
+    <dgm:txFillClrLst/>
+    <dgm:txEffectClrLst/>
+  </dgm:styleLbl>
+  <dgm:styleLbl name="asst4">
+    <dgm:fillClrLst>
+      <a:schemeClr val="accent3"/>
+    </dgm:fillClrLst>
+    <dgm:linClrLst meth="repeat">
+      <a:schemeClr val="lt1"/>
+    </dgm:linClrLst>
+    <dgm:effectClrLst/>
+    <dgm:txLinClrLst/>
+    <dgm:txFillClrLst/>
+    <dgm:txEffectClrLst/>
+  </dgm:styleLbl>
+  <dgm:styleLbl name="parChTrans2D1">
+    <dgm:fillClrLst meth="repeat">
+      <a:schemeClr val="accent5"/>
+    </dgm:fillClrLst>
+    <dgm:linClrLst meth="repeat">
+      <a:schemeClr val="lt1"/>
+    </dgm:linClrLst>
+    <dgm:effectClrLst/>
+    <dgm:txLinClrLst/>
+    <dgm:txFillClrLst meth="repeat">
+      <a:schemeClr val="lt1"/>
+    </dgm:txFillClrLst>
+    <dgm:txEffectClrLst/>
+  </dgm:styleLbl>
+  <dgm:styleLbl name="parChTrans2D2">
+    <dgm:fillClrLst meth="repeat">
+      <a:schemeClr val="accent6"/>
+    </dgm:fillClrLst>
+    <dgm:linClrLst meth="repeat">
+      <a:schemeClr val="lt1"/>
+    </dgm:linClrLst>
+    <dgm:effectClrLst/>
+    <dgm:txLinClrLst/>
+    <dgm:txFillClrLst/>
+    <dgm:txEffectClrLst/>
+  </dgm:styleLbl>
+  <dgm:styleLbl name="parChTrans2D3">
+    <dgm:fillClrLst meth="repeat">
+      <a:schemeClr val="accent6"/>
+    </dgm:fillClrLst>
+    <dgm:linClrLst meth="repeat">
+      <a:schemeClr val="lt1"/>
+    </dgm:linClrLst>
+    <dgm:effectClrLst/>
+    <dgm:txLinClrLst/>
+    <dgm:txFillClrLst/>
+    <dgm:txEffectClrLst/>
+  </dgm:styleLbl>
+  <dgm:styleLbl name="parChTrans2D4">
+    <dgm:fillClrLst meth="repeat">
+      <a:schemeClr val="accent1"/>
+    </dgm:fillClrLst>
+    <dgm:linClrLst meth="repeat">
+      <a:schemeClr val="lt1"/>
+    </dgm:linClrLst>
+    <dgm:effectClrLst/>
+    <dgm:txLinClrLst/>
+    <dgm:txFillClrLst meth="repeat">
+      <a:schemeClr val="lt1"/>
+    </dgm:txFillClrLst>
+    <dgm:txEffectClrLst/>
+  </dgm:styleLbl>
+  <dgm:styleLbl name="parChTrans1D1">
+    <dgm:fillClrLst meth="repeat">
+      <a:schemeClr val="accent5"/>
+    </dgm:fillClrLst>
+    <dgm:linClrLst meth="repeat">
+      <a:schemeClr val="accent5"/>
+    </dgm:linClrLst>
+    <dgm:effectClrLst/>
+    <dgm:txLinClrLst/>
+    <dgm:txFillClrLst meth="repeat">
+      <a:schemeClr val="tx1"/>
+    </dgm:txFillClrLst>
+    <dgm:txEffectClrLst/>
+  </dgm:styleLbl>
+  <dgm:styleLbl name="parChTrans1D2">
+    <dgm:fillClrLst meth="repeat">
+      <a:schemeClr val="accent6">
+        <a:tint val="90000"/>
+      </a:schemeClr>
+    </dgm:fillClrLst>
+    <dgm:linClrLst meth="repeat">
+      <a:schemeClr val="accent6"/>
+    </dgm:linClrLst>
+    <dgm:effectClrLst/>
+    <dgm:txLinClrLst/>
+    <dgm:txFillClrLst meth="repeat">
+      <a:schemeClr val="tx1"/>
+    </dgm:txFillClrLst>
+    <dgm:txEffectClrLst/>
+  </dgm:styleLbl>
+  <dgm:styleLbl name="parChTrans1D3">
+    <dgm:fillClrLst meth="repeat">
+      <a:schemeClr val="accent6">
+        <a:tint val="70000"/>
+      </a:schemeClr>
+    </dgm:fillClrLst>
+    <dgm:linClrLst meth="repeat">
+      <a:schemeClr val="accent1"/>
+    </dgm:linClrLst>
+    <dgm:effectClrLst/>
+    <dgm:txLinClrLst/>
+    <dgm:txFillClrLst meth="repeat">
+      <a:schemeClr val="tx1"/>
+    </dgm:txFillClrLst>
+    <dgm:txEffectClrLst/>
+  </dgm:styleLbl>
+  <dgm:styleLbl name="parChTrans1D4">
+    <dgm:fillClrLst meth="repeat">
+      <a:schemeClr val="accent6">
+        <a:tint val="50000"/>
+      </a:schemeClr>
+    </dgm:fillClrLst>
+    <dgm:linClrLst meth="repeat">
+      <a:schemeClr val="accent2"/>
+    </dgm:linClrLst>
+    <dgm:effectClrLst/>
+    <dgm:txLinClrLst/>
+    <dgm:txFillClrLst meth="repeat">
+      <a:schemeClr val="tx1"/>
+    </dgm:txFillClrLst>
+    <dgm:txEffectClrLst/>
+  </dgm:styleLbl>
+  <dgm:styleLbl name="fgAcc1">
+    <dgm:fillClrLst meth="repeat">
+      <a:schemeClr val="lt1">
+        <a:alpha val="90000"/>
+      </a:schemeClr>
+    </dgm:fillClrLst>
+    <dgm:linClrLst>
+      <a:schemeClr val="accent5"/>
+      <a:schemeClr val="accent6"/>
+    </dgm:linClrLst>
+    <dgm:effectClrLst/>
+    <dgm:txLinClrLst/>
+    <dgm:txFillClrLst meth="repeat">
+      <a:schemeClr val="dk1"/>
+    </dgm:txFillClrLst>
+    <dgm:txEffectClrLst/>
+  </dgm:styleLbl>
+  <dgm:styleLbl name="conFgAcc1">
+    <dgm:fillClrLst meth="repeat">
+      <a:schemeClr val="lt1">
+        <a:alpha val="90000"/>
+      </a:schemeClr>
+    </dgm:fillClrLst>
+    <dgm:linClrLst>
+      <a:schemeClr val="accent5"/>
+      <a:schemeClr val="accent6"/>
+    </dgm:linClrLst>
+    <dgm:effectClrLst/>
+    <dgm:txLinClrLst/>
+    <dgm:txFillClrLst meth="repeat">
+      <a:schemeClr val="dk1"/>
+    </dgm:txFillClrLst>
+    <dgm:txEffectClrLst/>
+  </dgm:styleLbl>
+  <dgm:styleLbl name="alignAcc1">
+    <dgm:fillClrLst meth="repeat">
+      <a:schemeClr val="lt1">
+        <a:alpha val="90000"/>
+      </a:schemeClr>
+    </dgm:fillClrLst>
+    <dgm:linClrLst>
+      <a:schemeClr val="accent5"/>
+      <a:schemeClr val="accent6"/>
+    </dgm:linClrLst>
+    <dgm:effectClrLst/>
+    <dgm:txLinClrLst/>
+    <dgm:txFillClrLst meth="repeat">
+      <a:schemeClr val="dk1"/>
+    </dgm:txFillClrLst>
+    <dgm:txEffectClrLst/>
+  </dgm:styleLbl>
+  <dgm:styleLbl name="trAlignAcc1">
+    <dgm:fillClrLst meth="repeat">
+      <a:schemeClr val="lt1">
+        <a:alpha val="40000"/>
+      </a:schemeClr>
+    </dgm:fillClrLst>
+    <dgm:linClrLst meth="repeat">
+      <a:schemeClr val="accent5"/>
+    </dgm:linClrLst>
+    <dgm:effectClrLst/>
+    <dgm:txLinClrLst/>
+    <dgm:txFillClrLst meth="repeat">
+      <a:schemeClr val="dk1"/>
+    </dgm:txFillClrLst>
+    <dgm:txEffectClrLst/>
+  </dgm:styleLbl>
+  <dgm:styleLbl name="bgAcc1">
+    <dgm:fillClrLst meth="repeat">
+      <a:schemeClr val="lt1">
+        <a:alpha val="90000"/>
+      </a:schemeClr>
+    </dgm:fillClrLst>
+    <dgm:linClrLst>
+      <a:schemeClr val="accent5"/>
+      <a:schemeClr val="accent6"/>
+    </dgm:linClrLst>
+    <dgm:effectClrLst/>
+    <dgm:txLinClrLst/>
+    <dgm:txFillClrLst meth="repeat">
+      <a:schemeClr val="dk1"/>
+    </dgm:txFillClrLst>
+    <dgm:txEffectClrLst/>
+  </dgm:styleLbl>
+  <dgm:styleLbl name="solidFgAcc1">
+    <dgm:fillClrLst meth="repeat">
+      <a:schemeClr val="lt1"/>
+    </dgm:fillClrLst>
+    <dgm:linClrLst>
+      <a:schemeClr val="accent5"/>
+      <a:schemeClr val="accent6"/>
+    </dgm:linClrLst>
+    <dgm:effectClrLst/>
+    <dgm:txLinClrLst/>
+    <dgm:txFillClrLst meth="repeat">
+      <a:schemeClr val="dk1"/>
+    </dgm:txFillClrLst>
+    <dgm:txEffectClrLst/>
+  </dgm:styleLbl>
+  <dgm:styleLbl name="solidAlignAcc1">
+    <dgm:fillClrLst meth="repeat">
+      <a:schemeClr val="lt1"/>
+    </dgm:fillClrLst>
+    <dgm:linClrLst>
+      <a:schemeClr val="accent5"/>
+      <a:schemeClr val="accent6"/>
+    </dgm:linClrLst>
+    <dgm:effectClrLst/>
+    <dgm:txLinClrLst/>
+    <dgm:txFillClrLst meth="repeat">
+      <a:schemeClr val="dk1"/>
+    </dgm:txFillClrLst>
+    <dgm:txEffectClrLst/>
+  </dgm:styleLbl>
+  <dgm:styleLbl name="solidBgAcc1">
+    <dgm:fillClrLst meth="repeat">
+      <a:schemeClr val="lt1"/>
+    </dgm:fillClrLst>
+    <dgm:linClrLst>
+      <a:schemeClr val="accent5"/>
+      <a:schemeClr val="accent6"/>
+    </dgm:linClrLst>
+    <dgm:effectClrLst/>
+    <dgm:txLinClrLst/>
+    <dgm:txFillClrLst meth="repeat">
+      <a:schemeClr val="dk1"/>
+    </dgm:txFillClrLst>
+    <dgm:txEffectClrLst/>
+  </dgm:styleLbl>
+  <dgm:styleLbl name="fgAccFollowNode1">
+    <dgm:fillClrLst>
+      <a:schemeClr val="accent5">
+        <a:tint val="40000"/>
+        <a:alpha val="90000"/>
+      </a:schemeClr>
+      <a:schemeClr val="accent6">
+        <a:tint val="40000"/>
+        <a:alpha val="90000"/>
+      </a:schemeClr>
+    </dgm:fillClrLst>
+    <dgm:linClrLst>
+      <a:schemeClr val="accent5">
+        <a:tint val="40000"/>
+        <a:alpha val="90000"/>
+      </a:schemeClr>
+      <a:schemeClr val="accent5">
+        <a:tint val="40000"/>
+        <a:alpha val="90000"/>
+      </a:schemeClr>
+    </dgm:linClrLst>
+    <dgm:effectClrLst/>
+    <dgm:txLinClrLst/>
+    <dgm:txFillClrLst meth="repeat">
+      <a:schemeClr val="dk1"/>
+    </dgm:txFillClrLst>
+    <dgm:txEffectClrLst/>
+  </dgm:styleLbl>
+  <dgm:styleLbl name="alignAccFollowNode1">
+    <dgm:fillClrLst>
+      <a:schemeClr val="accent5">
+        <a:tint val="40000"/>
+        <a:alpha val="90000"/>
+      </a:schemeClr>
+      <a:schemeClr val="accent6">
+        <a:tint val="40000"/>
+        <a:alpha val="90000"/>
+      </a:schemeClr>
+    </dgm:fillClrLst>
+    <dgm:linClrLst>
+      <a:schemeClr val="accent5">
+        <a:tint val="40000"/>
+        <a:alpha val="90000"/>
+      </a:schemeClr>
+      <a:schemeClr val="accent6">
+        <a:tint val="40000"/>
+        <a:alpha val="90000"/>
+      </a:schemeClr>
+    </dgm:linClrLst>
+    <dgm:effectClrLst/>
+    <dgm:txLinClrLst/>
+    <dgm:txFillClrLst meth="repeat">
+      <a:schemeClr val="dk1"/>
+    </dgm:txFillClrLst>
+    <dgm:txEffectClrLst/>
+  </dgm:styleLbl>
+  <dgm:styleLbl name="bgAccFollowNode1">
+    <dgm:fillClrLst>
+      <a:schemeClr val="accent5">
+        <a:tint val="40000"/>
+        <a:alpha val="90000"/>
+      </a:schemeClr>
+      <a:schemeClr val="accent6">
+        <a:tint val="40000"/>
+        <a:alpha val="90000"/>
+      </a:schemeClr>
+    </dgm:fillClrLst>
+    <dgm:linClrLst>
+      <a:schemeClr val="accent5">
+        <a:tint val="40000"/>
+        <a:alpha val="90000"/>
+      </a:schemeClr>
+      <a:schemeClr val="accent6">
+        <a:tint val="40000"/>
+        <a:alpha val="90000"/>
+      </a:schemeClr>
+    </dgm:linClrLst>
+    <dgm:effectClrLst/>
+    <dgm:txLinClrLst/>
+    <dgm:txFillClrLst meth="repeat">
+      <a:schemeClr val="dk1"/>
+    </dgm:txFillClrLst>
+    <dgm:txEffectClrLst/>
+  </dgm:styleLbl>
+  <dgm:styleLbl name="fgAcc0">
+    <dgm:fillClrLst meth="repeat">
+      <a:schemeClr val="lt1">
+        <a:alpha val="90000"/>
+      </a:schemeClr>
+    </dgm:fillClrLst>
+    <dgm:linClrLst>
+      <a:schemeClr val="accent4"/>
+    </dgm:linClrLst>
+    <dgm:effectClrLst/>
+    <dgm:txLinClrLst/>
+    <dgm:txFillClrLst meth="repeat">
+      <a:schemeClr val="dk1"/>
+    </dgm:txFillClrLst>
+    <dgm:txEffectClrLst/>
+  </dgm:styleLbl>
+  <dgm:styleLbl name="fgAcc2">
+    <dgm:fillClrLst meth="repeat">
+      <a:schemeClr val="lt1">
+        <a:alpha val="90000"/>
+      </a:schemeClr>
+    </dgm:fillClrLst>
+    <dgm:linClrLst>
+      <a:schemeClr val="accent6"/>
+    </dgm:linClrLst>
+    <dgm:effectClrLst/>
+    <dgm:txLinClrLst/>
+    <dgm:txFillClrLst meth="repeat">
+      <a:schemeClr val="dk1"/>
+    </dgm:txFillClrLst>
+    <dgm:txEffectClrLst/>
+  </dgm:styleLbl>
+  <dgm:styleLbl name="fgAcc3">
+    <dgm:fillClrLst meth="repeat">
+      <a:schemeClr val="lt1">
+        <a:alpha val="90000"/>
+      </a:schemeClr>
+    </dgm:fillClrLst>
+    <dgm:linClrLst>
+      <a:schemeClr val="accent1"/>
+    </dgm:linClrLst>
+    <dgm:effectClrLst/>
+    <dgm:txLinClrLst/>
+    <dgm:txFillClrLst meth="repeat">
+      <a:schemeClr val="dk1"/>
+    </dgm:txFillClrLst>
+    <dgm:txEffectClrLst/>
+  </dgm:styleLbl>
+  <dgm:styleLbl name="fgAcc4">
+    <dgm:fillClrLst meth="repeat">
+      <a:schemeClr val="lt1">
+        <a:alpha val="90000"/>
+      </a:schemeClr>
+    </dgm:fillClrLst>
+    <dgm:linClrLst>
+      <a:schemeClr val="accent2"/>
+    </dgm:linClrLst>
+    <dgm:effectClrLst/>
+    <dgm:txLinClrLst/>
+    <dgm:txFillClrLst meth="repeat">
+      <a:schemeClr val="dk1"/>
+    </dgm:txFillClrLst>
+    <dgm:txEffectClrLst/>
+  </dgm:styleLbl>
+  <dgm:styleLbl name="bgShp">
+    <dgm:fillClrLst meth="repeat">
+      <a:schemeClr val="accent5">
+        <a:tint val="40000"/>
+      </a:schemeClr>
+    </dgm:fillClrLst>
+    <dgm:linClrLst meth="repeat">
+      <a:schemeClr val="dk1"/>
+    </dgm:linClrLst>
+    <dgm:effectClrLst/>
+    <dgm:txLinClrLst/>
+    <dgm:txFillClrLst meth="repeat">
+      <a:schemeClr val="dk1"/>
+    </dgm:txFillClrLst>
+    <dgm:txEffectClrLst/>
+  </dgm:styleLbl>
+  <dgm:styleLbl name="dkBgShp">
+    <dgm:fillClrLst meth="repeat">
+      <a:schemeClr val="accent5">
+        <a:shade val="90000"/>
+      </a:schemeClr>
+    </dgm:fillClrLst>
+    <dgm:linClrLst meth="repeat">
+      <a:schemeClr val="dk1"/>
+    </dgm:linClrLst>
+    <dgm:effectClrLst/>
+    <dgm:txLinClrLst/>
+    <dgm:txFillClrLst meth="repeat">
+      <a:schemeClr val="lt1"/>
+    </dgm:txFillClrLst>
+    <dgm:txEffectClrLst/>
+  </dgm:styleLbl>
+  <dgm:styleLbl name="trBgShp">
+    <dgm:fillClrLst meth="repeat">
+      <a:schemeClr val="accent5">
+        <a:tint val="50000"/>
+        <a:alpha val="40000"/>
+      </a:schemeClr>
+    </dgm:fillClrLst>
+    <dgm:linClrLst meth="repeat">
+      <a:schemeClr val="accent5"/>
+    </dgm:linClrLst>
+    <dgm:effectClrLst/>
+    <dgm:txLinClrLst/>
+    <dgm:txFillClrLst meth="repeat">
+      <a:schemeClr val="lt1"/>
+    </dgm:txFillClrLst>
+    <dgm:txEffectClrLst/>
+  </dgm:styleLbl>
+  <dgm:styleLbl name="fgShp">
+    <dgm:fillClrLst meth="repeat">
+      <a:schemeClr val="accent5">
+        <a:tint val="40000"/>
+      </a:schemeClr>
+    </dgm:fillClrLst>
+    <dgm:linClrLst meth="repeat">
+      <a:schemeClr val="lt1"/>
+    </dgm:linClrLst>
+    <dgm:effectClrLst/>
+    <dgm:txLinClrLst/>
+    <dgm:txFillClrLst meth="repeat">
+      <a:schemeClr val="dk1"/>
+    </dgm:txFillClrLst>
+    <dgm:txEffectClrLst/>
+  </dgm:styleLbl>
+  <dgm:styleLbl name="revTx">
+    <dgm:fillClrLst meth="repeat">
+      <a:schemeClr val="lt1">
+        <a:alpha val="0"/>
+      </a:schemeClr>
+    </dgm:fillClrLst>
+    <dgm:linClrLst meth="repeat">
+      <a:schemeClr val="dk1">
+        <a:alpha val="0"/>
+      </a:schemeClr>
+    </dgm:linClrLst>
+    <dgm:effectClrLst/>
+    <dgm:txLinClrLst/>
+    <dgm:txFillClrLst meth="repeat">
+      <a:schemeClr val="tx1"/>
+    </dgm:txFillClrLst>
+    <dgm:txEffectClrLst/>
+  </dgm:styleLbl>
+</dgm:colorsDef>
+</file>
+
+<file path=ppt/diagrams/data1.xml><?xml version="1.0" encoding="utf-8"?>
+<dgm:dataModel xmlns:dgm="http://schemas.openxmlformats.org/drawingml/2006/diagram" xmlns:a="http://schemas.openxmlformats.org/drawingml/2006/main">
+  <dgm:ptLst>
+    <dgm:pt modelId="{4D8EFA5B-A929-4579-8D39-7156050C8575}" type="doc">
+      <dgm:prSet loTypeId="urn:microsoft.com/office/officeart/2005/8/layout/vList5" loCatId="list" qsTypeId="urn:microsoft.com/office/officeart/2005/8/quickstyle/simple1" qsCatId="simple" csTypeId="urn:microsoft.com/office/officeart/2005/8/colors/colorful5" csCatId="colorful" phldr="1"/>
+      <dgm:spPr/>
+      <dgm:t>
+        <a:bodyPr/>
+        <a:lstStyle/>
+        <a:p>
+          <a:endParaRPr lang="en-US"/>
+        </a:p>
+      </dgm:t>
+    </dgm:pt>
+    <dgm:pt modelId="{EA65ECFE-7273-4156-A465-726FBBB7A5EF}">
+      <dgm:prSet/>
+      <dgm:spPr/>
+      <dgm:t>
+        <a:bodyPr/>
+        <a:lstStyle/>
+        <a:p>
+          <a:r>
+            <a:rPr lang="en-US" dirty="0"/>
+            <a:t>Sam Gerstner</a:t>
+          </a:r>
+        </a:p>
+      </dgm:t>
+    </dgm:pt>
+    <dgm:pt modelId="{A3A086E3-53DE-40AF-AB56-FC13F13E229D}" type="parTrans" cxnId="{5C67BE43-C5FF-43BD-9417-0164983FDFBF}">
+      <dgm:prSet/>
+      <dgm:spPr/>
+      <dgm:t>
+        <a:bodyPr/>
+        <a:lstStyle/>
+        <a:p>
+          <a:endParaRPr lang="en-US"/>
+        </a:p>
+      </dgm:t>
+    </dgm:pt>
+    <dgm:pt modelId="{893E9E46-DF43-4B73-9894-AE92E5509AD1}" type="sibTrans" cxnId="{5C67BE43-C5FF-43BD-9417-0164983FDFBF}">
+      <dgm:prSet/>
+      <dgm:spPr/>
+      <dgm:t>
+        <a:bodyPr/>
+        <a:lstStyle/>
+        <a:p>
+          <a:endParaRPr lang="en-US"/>
+        </a:p>
+      </dgm:t>
+    </dgm:pt>
+    <dgm:pt modelId="{1F387302-3FAB-49B4-AE6A-1D438559D29E}">
+      <dgm:prSet/>
+      <dgm:spPr/>
+      <dgm:t>
+        <a:bodyPr/>
+        <a:lstStyle/>
+        <a:p>
+          <a:r>
+            <a:rPr lang="en-US"/>
+            <a:t>Team Lead</a:t>
+          </a:r>
+        </a:p>
+      </dgm:t>
+    </dgm:pt>
+    <dgm:pt modelId="{BBA5EBDA-2191-44B5-B083-CD46D3864ECC}" type="parTrans" cxnId="{EDE53308-148C-4116-80CB-E3C6C5B52F36}">
+      <dgm:prSet/>
+      <dgm:spPr/>
+      <dgm:t>
+        <a:bodyPr/>
+        <a:lstStyle/>
+        <a:p>
+          <a:endParaRPr lang="en-US"/>
+        </a:p>
+      </dgm:t>
+    </dgm:pt>
+    <dgm:pt modelId="{2648B335-6FFD-4876-BECD-C95861D20824}" type="sibTrans" cxnId="{EDE53308-148C-4116-80CB-E3C6C5B52F36}">
+      <dgm:prSet/>
+      <dgm:spPr/>
+      <dgm:t>
+        <a:bodyPr/>
+        <a:lstStyle/>
+        <a:p>
+          <a:endParaRPr lang="en-US"/>
+        </a:p>
+      </dgm:t>
+    </dgm:pt>
+    <dgm:pt modelId="{7CE6808E-0B4D-4FA7-BEB8-03BE537E9F36}">
+      <dgm:prSet/>
+      <dgm:spPr/>
+      <dgm:t>
+        <a:bodyPr/>
+        <a:lstStyle/>
+        <a:p>
+          <a:r>
+            <a:rPr lang="en-US"/>
+            <a:t>Alexander Frenette</a:t>
+          </a:r>
+        </a:p>
+      </dgm:t>
+    </dgm:pt>
+    <dgm:pt modelId="{1D3574A5-0353-4975-AA8A-8536E59950D9}" type="parTrans" cxnId="{FB467DF6-86A5-45EC-9416-B27904C66E3A}">
+      <dgm:prSet/>
+      <dgm:spPr/>
+      <dgm:t>
+        <a:bodyPr/>
+        <a:lstStyle/>
+        <a:p>
+          <a:endParaRPr lang="en-US"/>
+        </a:p>
+      </dgm:t>
+    </dgm:pt>
+    <dgm:pt modelId="{13F5E189-1773-4717-A545-79B061BFB205}" type="sibTrans" cxnId="{FB467DF6-86A5-45EC-9416-B27904C66E3A}">
+      <dgm:prSet/>
+      <dgm:spPr/>
+      <dgm:t>
+        <a:bodyPr/>
+        <a:lstStyle/>
+        <a:p>
+          <a:endParaRPr lang="en-US"/>
+        </a:p>
+      </dgm:t>
+    </dgm:pt>
+    <dgm:pt modelId="{27DA4637-2004-46D0-8AF6-6FF76E48612B}">
+      <dgm:prSet/>
+      <dgm:spPr/>
+      <dgm:t>
+        <a:bodyPr/>
+        <a:lstStyle/>
+        <a:p>
+          <a:r>
+            <a:rPr lang="en-US"/>
+            <a:t>Backend Developer</a:t>
+          </a:r>
+        </a:p>
+      </dgm:t>
+    </dgm:pt>
+    <dgm:pt modelId="{73A5FE9A-475F-49CD-96EE-04D48421ACAD}" type="parTrans" cxnId="{46E82AC3-7D8D-47AF-88F2-87EFF7CB64DC}">
+      <dgm:prSet/>
+      <dgm:spPr/>
+      <dgm:t>
+        <a:bodyPr/>
+        <a:lstStyle/>
+        <a:p>
+          <a:endParaRPr lang="en-US"/>
+        </a:p>
+      </dgm:t>
+    </dgm:pt>
+    <dgm:pt modelId="{D90DC8A5-A09F-42C4-AEAF-D2FA2A781B71}" type="sibTrans" cxnId="{46E82AC3-7D8D-47AF-88F2-87EFF7CB64DC}">
+      <dgm:prSet/>
+      <dgm:spPr/>
+      <dgm:t>
+        <a:bodyPr/>
+        <a:lstStyle/>
+        <a:p>
+          <a:endParaRPr lang="en-US"/>
+        </a:p>
+      </dgm:t>
+    </dgm:pt>
+    <dgm:pt modelId="{D0E35388-525A-41CD-9021-2E7E0ED973D4}">
+      <dgm:prSet/>
+      <dgm:spPr/>
+      <dgm:t>
+        <a:bodyPr/>
+        <a:lstStyle/>
+        <a:p>
+          <a:r>
+            <a:rPr lang="en-US"/>
+            <a:t>Noah Nannen</a:t>
+          </a:r>
+        </a:p>
+      </dgm:t>
+    </dgm:pt>
+    <dgm:pt modelId="{A7D9BADF-5559-4DBB-BD73-C82AAB3B8798}" type="parTrans" cxnId="{1BBBCC7A-5916-4036-A3B5-C580479C70EF}">
+      <dgm:prSet/>
+      <dgm:spPr/>
+      <dgm:t>
+        <a:bodyPr/>
+        <a:lstStyle/>
+        <a:p>
+          <a:endParaRPr lang="en-US"/>
+        </a:p>
+      </dgm:t>
+    </dgm:pt>
+    <dgm:pt modelId="{4922682A-EE4C-44DA-A92F-429B47D6EBAA}" type="sibTrans" cxnId="{1BBBCC7A-5916-4036-A3B5-C580479C70EF}">
+      <dgm:prSet/>
+      <dgm:spPr/>
+      <dgm:t>
+        <a:bodyPr/>
+        <a:lstStyle/>
+        <a:p>
+          <a:endParaRPr lang="en-US"/>
+        </a:p>
+      </dgm:t>
+    </dgm:pt>
+    <dgm:pt modelId="{86A89ABA-1A05-4167-82DC-899AADA8E7F6}">
+      <dgm:prSet/>
+      <dgm:spPr/>
+      <dgm:t>
+        <a:bodyPr/>
+        <a:lstStyle/>
+        <a:p>
+          <a:r>
+            <a:rPr lang="en-US" dirty="0"/>
+            <a:t>User Interface Developer</a:t>
+          </a:r>
+        </a:p>
+      </dgm:t>
+    </dgm:pt>
+    <dgm:pt modelId="{C12C2C3F-350D-4CBA-BEA6-57C030EDDF4D}" type="parTrans" cxnId="{DE173ABE-34E8-4229-B228-A83AA288416D}">
+      <dgm:prSet/>
+      <dgm:spPr/>
+      <dgm:t>
+        <a:bodyPr/>
+        <a:lstStyle/>
+        <a:p>
+          <a:endParaRPr lang="en-US"/>
+        </a:p>
+      </dgm:t>
+    </dgm:pt>
+    <dgm:pt modelId="{476EBD3C-EB70-48CC-A3AC-DB4389909017}" type="sibTrans" cxnId="{DE173ABE-34E8-4229-B228-A83AA288416D}">
+      <dgm:prSet/>
+      <dgm:spPr/>
+      <dgm:t>
+        <a:bodyPr/>
+        <a:lstStyle/>
+        <a:p>
+          <a:endParaRPr lang="en-US"/>
+        </a:p>
+      </dgm:t>
+    </dgm:pt>
+    <dgm:pt modelId="{DED48862-4FDE-4239-A49B-456DF439E50B}">
+      <dgm:prSet/>
+      <dgm:spPr/>
+      <dgm:t>
+        <a:bodyPr/>
+        <a:lstStyle/>
+        <a:p>
+          <a:r>
+            <a:rPr lang="en-US"/>
+            <a:t>Shlok Sheth </a:t>
+          </a:r>
+        </a:p>
+      </dgm:t>
+    </dgm:pt>
+    <dgm:pt modelId="{A20DBB7C-1D38-47C3-997A-BC1C71E8930F}" type="parTrans" cxnId="{62B84DC3-665D-43D7-9644-BFF90AAD36AE}">
+      <dgm:prSet/>
+      <dgm:spPr/>
+      <dgm:t>
+        <a:bodyPr/>
+        <a:lstStyle/>
+        <a:p>
+          <a:endParaRPr lang="en-US"/>
+        </a:p>
+      </dgm:t>
+    </dgm:pt>
+    <dgm:pt modelId="{CCC10950-908F-4A05-94CE-2ED4688B1F31}" type="sibTrans" cxnId="{62B84DC3-665D-43D7-9644-BFF90AAD36AE}">
+      <dgm:prSet/>
+      <dgm:spPr/>
+      <dgm:t>
+        <a:bodyPr/>
+        <a:lstStyle/>
+        <a:p>
+          <a:endParaRPr lang="en-US"/>
+        </a:p>
+      </dgm:t>
+    </dgm:pt>
+    <dgm:pt modelId="{556B2152-F82B-4829-A929-F6B87CF55539}">
+      <dgm:prSet/>
+      <dgm:spPr/>
+      <dgm:t>
+        <a:bodyPr/>
+        <a:lstStyle/>
+        <a:p>
+          <a:r>
+            <a:rPr lang="en-US"/>
+            <a:t>Full Stack Developer</a:t>
+          </a:r>
+        </a:p>
+      </dgm:t>
+    </dgm:pt>
+    <dgm:pt modelId="{C5F43E5D-CCFE-4A8A-9C53-5603D00B1107}" type="parTrans" cxnId="{AFC9630A-9CC1-4A7D-9415-73BFE6D0019F}">
+      <dgm:prSet/>
+      <dgm:spPr/>
+      <dgm:t>
+        <a:bodyPr/>
+        <a:lstStyle/>
+        <a:p>
+          <a:endParaRPr lang="en-US"/>
+        </a:p>
+      </dgm:t>
+    </dgm:pt>
+    <dgm:pt modelId="{2BF16078-6ABF-4D1B-9896-D5F5175F8DBD}" type="sibTrans" cxnId="{AFC9630A-9CC1-4A7D-9415-73BFE6D0019F}">
+      <dgm:prSet/>
+      <dgm:spPr/>
+      <dgm:t>
+        <a:bodyPr/>
+        <a:lstStyle/>
+        <a:p>
+          <a:endParaRPr lang="en-US"/>
+        </a:p>
+      </dgm:t>
+    </dgm:pt>
+    <dgm:pt modelId="{CC89BF67-3C61-4CCF-859D-6DBB1B99880D}">
+      <dgm:prSet/>
+      <dgm:spPr/>
+      <dgm:t>
+        <a:bodyPr/>
+        <a:lstStyle/>
+        <a:p>
+          <a:r>
+            <a:rPr lang="en-US"/>
+            <a:t>Bronwyn Wedig</a:t>
+          </a:r>
+        </a:p>
+      </dgm:t>
+    </dgm:pt>
+    <dgm:pt modelId="{AA08372F-39A2-4B35-84F3-13073FBC0C44}" type="parTrans" cxnId="{44AA00AF-BDC5-413E-B0C0-3E296BF0D94A}">
+      <dgm:prSet/>
+      <dgm:spPr/>
+      <dgm:t>
+        <a:bodyPr/>
+        <a:lstStyle/>
+        <a:p>
+          <a:endParaRPr lang="en-US"/>
+        </a:p>
+      </dgm:t>
+    </dgm:pt>
+    <dgm:pt modelId="{5AF6F61A-D622-4EA3-8B04-B5EB48D1521C}" type="sibTrans" cxnId="{44AA00AF-BDC5-413E-B0C0-3E296BF0D94A}">
+      <dgm:prSet/>
+      <dgm:spPr/>
+      <dgm:t>
+        <a:bodyPr/>
+        <a:lstStyle/>
+        <a:p>
+          <a:endParaRPr lang="en-US"/>
+        </a:p>
+      </dgm:t>
+    </dgm:pt>
+    <dgm:pt modelId="{C3290A82-3B3F-4381-8CAB-136465228672}">
+      <dgm:prSet/>
+      <dgm:spPr/>
+      <dgm:t>
+        <a:bodyPr/>
+        <a:lstStyle/>
+        <a:p>
+          <a:r>
+            <a:rPr lang="en-US" dirty="0"/>
+            <a:t>Front End Manager</a:t>
+          </a:r>
+        </a:p>
+      </dgm:t>
+    </dgm:pt>
+    <dgm:pt modelId="{88987F86-72F5-431C-911E-3A0B8625925E}" type="parTrans" cxnId="{7DFBF4AC-1D55-4A5B-9FC2-07D5602F982F}">
+      <dgm:prSet/>
+      <dgm:spPr/>
+      <dgm:t>
+        <a:bodyPr/>
+        <a:lstStyle/>
+        <a:p>
+          <a:endParaRPr lang="en-US"/>
+        </a:p>
+      </dgm:t>
+    </dgm:pt>
+    <dgm:pt modelId="{B70C5770-3DB7-499E-B4F3-15A815C6763C}" type="sibTrans" cxnId="{7DFBF4AC-1D55-4A5B-9FC2-07D5602F982F}">
+      <dgm:prSet/>
+      <dgm:spPr/>
+      <dgm:t>
+        <a:bodyPr/>
+        <a:lstStyle/>
+        <a:p>
+          <a:endParaRPr lang="en-US"/>
+        </a:p>
+      </dgm:t>
+    </dgm:pt>
+    <dgm:pt modelId="{9882A9C7-2372-4C59-9C0A-19C38905E08B}">
+      <dgm:prSet/>
+      <dgm:spPr/>
+      <dgm:t>
+        <a:bodyPr/>
+        <a:lstStyle/>
+        <a:p>
+          <a:r>
+            <a:rPr lang="en-US" dirty="0"/>
+            <a:t>Chris </a:t>
+          </a:r>
+          <a:r>
+            <a:rPr lang="en-US" dirty="0" err="1"/>
+            <a:t>Aungst</a:t>
+          </a:r>
+          <a:endParaRPr lang="en-US" dirty="0"/>
+        </a:p>
+      </dgm:t>
+    </dgm:pt>
+    <dgm:pt modelId="{6927DD29-45BC-45E9-95E5-BA2DBC3B4F10}" type="parTrans" cxnId="{18DDE061-C9B2-4317-8EF5-ED6588EE119C}">
+      <dgm:prSet/>
+      <dgm:spPr/>
+      <dgm:t>
+        <a:bodyPr/>
+        <a:lstStyle/>
+        <a:p>
+          <a:endParaRPr lang="en-US"/>
+        </a:p>
+      </dgm:t>
+    </dgm:pt>
+    <dgm:pt modelId="{F1FAD724-96D5-4BAB-8DC4-66103C7951D3}" type="sibTrans" cxnId="{18DDE061-C9B2-4317-8EF5-ED6588EE119C}">
+      <dgm:prSet/>
+      <dgm:spPr/>
+      <dgm:t>
+        <a:bodyPr/>
+        <a:lstStyle/>
+        <a:p>
+          <a:endParaRPr lang="en-US"/>
+        </a:p>
+      </dgm:t>
+    </dgm:pt>
+    <dgm:pt modelId="{665CBA34-2F38-46B9-A308-9C741E8DC476}">
+      <dgm:prSet/>
+      <dgm:spPr/>
+      <dgm:t>
+        <a:bodyPr/>
+        <a:lstStyle/>
+        <a:p>
+          <a:r>
+            <a:rPr lang="en-US" dirty="0"/>
+            <a:t>Project Sponsor</a:t>
+          </a:r>
+        </a:p>
+      </dgm:t>
+    </dgm:pt>
+    <dgm:pt modelId="{A79EB0CE-4E86-4C40-B167-A5F8131FF314}" type="parTrans" cxnId="{C2ACB21E-65A3-49D7-B8CC-B6968A380706}">
+      <dgm:prSet/>
+      <dgm:spPr/>
+      <dgm:t>
+        <a:bodyPr/>
+        <a:lstStyle/>
+        <a:p>
+          <a:endParaRPr lang="en-US"/>
+        </a:p>
+      </dgm:t>
+    </dgm:pt>
+    <dgm:pt modelId="{05CB89A0-FDFC-4536-BE16-F4688F40A37F}" type="sibTrans" cxnId="{C2ACB21E-65A3-49D7-B8CC-B6968A380706}">
+      <dgm:prSet/>
+      <dgm:spPr/>
+      <dgm:t>
+        <a:bodyPr/>
+        <a:lstStyle/>
+        <a:p>
+          <a:endParaRPr lang="en-US"/>
+        </a:p>
+      </dgm:t>
+    </dgm:pt>
+    <dgm:pt modelId="{32248442-902A-4040-A86B-88DBF4BD514A}" type="pres">
+      <dgm:prSet presAssocID="{4D8EFA5B-A929-4579-8D39-7156050C8575}" presName="Name0" presStyleCnt="0">
+        <dgm:presLayoutVars>
+          <dgm:dir/>
+          <dgm:animLvl val="lvl"/>
+          <dgm:resizeHandles val="exact"/>
+        </dgm:presLayoutVars>
+      </dgm:prSet>
+      <dgm:spPr/>
+    </dgm:pt>
+    <dgm:pt modelId="{7216E608-CD3A-4BFC-B8A2-FE6CB5DFB5EF}" type="pres">
+      <dgm:prSet presAssocID="{EA65ECFE-7273-4156-A465-726FBBB7A5EF}" presName="linNode" presStyleCnt="0"/>
+      <dgm:spPr/>
+    </dgm:pt>
+    <dgm:pt modelId="{EC8A3A16-4ED0-4200-8FF3-283D92CB710D}" type="pres">
+      <dgm:prSet presAssocID="{EA65ECFE-7273-4156-A465-726FBBB7A5EF}" presName="parentText" presStyleLbl="node1" presStyleIdx="0" presStyleCnt="6" custLinFactNeighborX="0" custLinFactNeighborY="1276">
+        <dgm:presLayoutVars>
+          <dgm:chMax val="1"/>
+          <dgm:bulletEnabled val="1"/>
+        </dgm:presLayoutVars>
+      </dgm:prSet>
+      <dgm:spPr/>
+    </dgm:pt>
+    <dgm:pt modelId="{6FEFBAF4-9FAB-4B9A-AC1B-71AF5BC67D21}" type="pres">
+      <dgm:prSet presAssocID="{EA65ECFE-7273-4156-A465-726FBBB7A5EF}" presName="descendantText" presStyleLbl="alignAccFollowNode1" presStyleIdx="0" presStyleCnt="6">
+        <dgm:presLayoutVars>
+          <dgm:bulletEnabled val="1"/>
+        </dgm:presLayoutVars>
+      </dgm:prSet>
+      <dgm:spPr/>
+    </dgm:pt>
+    <dgm:pt modelId="{985F20CD-96E4-4824-A0AC-6D1489DDAC07}" type="pres">
+      <dgm:prSet presAssocID="{893E9E46-DF43-4B73-9894-AE92E5509AD1}" presName="sp" presStyleCnt="0"/>
+      <dgm:spPr/>
+    </dgm:pt>
+    <dgm:pt modelId="{CB187C26-43E0-4068-AB22-0BDFC8CCB926}" type="pres">
+      <dgm:prSet presAssocID="{7CE6808E-0B4D-4FA7-BEB8-03BE537E9F36}" presName="linNode" presStyleCnt="0"/>
+      <dgm:spPr/>
+    </dgm:pt>
+    <dgm:pt modelId="{F2B91B8F-47A1-46D8-B263-CE3D8259829B}" type="pres">
+      <dgm:prSet presAssocID="{7CE6808E-0B4D-4FA7-BEB8-03BE537E9F36}" presName="parentText" presStyleLbl="node1" presStyleIdx="1" presStyleCnt="6">
+        <dgm:presLayoutVars>
+          <dgm:chMax val="1"/>
+          <dgm:bulletEnabled val="1"/>
+        </dgm:presLayoutVars>
+      </dgm:prSet>
+      <dgm:spPr/>
+    </dgm:pt>
+    <dgm:pt modelId="{13026DC3-21EF-49AC-8E20-EC52A7212BA3}" type="pres">
+      <dgm:prSet presAssocID="{7CE6808E-0B4D-4FA7-BEB8-03BE537E9F36}" presName="descendantText" presStyleLbl="alignAccFollowNode1" presStyleIdx="1" presStyleCnt="6">
+        <dgm:presLayoutVars>
+          <dgm:bulletEnabled val="1"/>
+        </dgm:presLayoutVars>
+      </dgm:prSet>
+      <dgm:spPr/>
+    </dgm:pt>
+    <dgm:pt modelId="{B70D7FEC-8327-4062-9252-C27AA8E4F593}" type="pres">
+      <dgm:prSet presAssocID="{13F5E189-1773-4717-A545-79B061BFB205}" presName="sp" presStyleCnt="0"/>
+      <dgm:spPr/>
+    </dgm:pt>
+    <dgm:pt modelId="{B728A5E6-9633-41A3-9188-93B1F4639E55}" type="pres">
+      <dgm:prSet presAssocID="{D0E35388-525A-41CD-9021-2E7E0ED973D4}" presName="linNode" presStyleCnt="0"/>
+      <dgm:spPr/>
+    </dgm:pt>
+    <dgm:pt modelId="{0FB892DD-EB20-42AC-ACFE-853D2CBB4887}" type="pres">
+      <dgm:prSet presAssocID="{D0E35388-525A-41CD-9021-2E7E0ED973D4}" presName="parentText" presStyleLbl="node1" presStyleIdx="2" presStyleCnt="6">
+        <dgm:presLayoutVars>
+          <dgm:chMax val="1"/>
+          <dgm:bulletEnabled val="1"/>
+        </dgm:presLayoutVars>
+      </dgm:prSet>
+      <dgm:spPr/>
+    </dgm:pt>
+    <dgm:pt modelId="{93E8F156-AE58-4048-B5BF-CEFEC53AED24}" type="pres">
+      <dgm:prSet presAssocID="{D0E35388-525A-41CD-9021-2E7E0ED973D4}" presName="descendantText" presStyleLbl="alignAccFollowNode1" presStyleIdx="2" presStyleCnt="6">
+        <dgm:presLayoutVars>
+          <dgm:bulletEnabled val="1"/>
+        </dgm:presLayoutVars>
+      </dgm:prSet>
+      <dgm:spPr/>
+    </dgm:pt>
+    <dgm:pt modelId="{B878DDC9-EE45-4867-9EDC-F288597DE0E2}" type="pres">
+      <dgm:prSet presAssocID="{4922682A-EE4C-44DA-A92F-429B47D6EBAA}" presName="sp" presStyleCnt="0"/>
+      <dgm:spPr/>
+    </dgm:pt>
+    <dgm:pt modelId="{06B300E4-2F80-43C2-92A4-13710BCFA052}" type="pres">
+      <dgm:prSet presAssocID="{DED48862-4FDE-4239-A49B-456DF439E50B}" presName="linNode" presStyleCnt="0"/>
+      <dgm:spPr/>
+    </dgm:pt>
+    <dgm:pt modelId="{78E70463-462B-470E-9930-5F234961BD23}" type="pres">
+      <dgm:prSet presAssocID="{DED48862-4FDE-4239-A49B-456DF439E50B}" presName="parentText" presStyleLbl="node1" presStyleIdx="3" presStyleCnt="6">
+        <dgm:presLayoutVars>
+          <dgm:chMax val="1"/>
+          <dgm:bulletEnabled val="1"/>
+        </dgm:presLayoutVars>
+      </dgm:prSet>
+      <dgm:spPr/>
+    </dgm:pt>
+    <dgm:pt modelId="{67D83FF0-A66A-4B03-A44C-33B21125776E}" type="pres">
+      <dgm:prSet presAssocID="{DED48862-4FDE-4239-A49B-456DF439E50B}" presName="descendantText" presStyleLbl="alignAccFollowNode1" presStyleIdx="3" presStyleCnt="6">
+        <dgm:presLayoutVars>
+          <dgm:bulletEnabled val="1"/>
+        </dgm:presLayoutVars>
+      </dgm:prSet>
+      <dgm:spPr/>
+    </dgm:pt>
+    <dgm:pt modelId="{A684AAF7-5632-47F5-A743-1B603131D5BE}" type="pres">
+      <dgm:prSet presAssocID="{CCC10950-908F-4A05-94CE-2ED4688B1F31}" presName="sp" presStyleCnt="0"/>
+      <dgm:spPr/>
+    </dgm:pt>
+    <dgm:pt modelId="{16E92550-2809-415D-A10C-E77FC190EFB0}" type="pres">
+      <dgm:prSet presAssocID="{CC89BF67-3C61-4CCF-859D-6DBB1B99880D}" presName="linNode" presStyleCnt="0"/>
+      <dgm:spPr/>
+    </dgm:pt>
+    <dgm:pt modelId="{E5DC52BA-BB11-4AB7-B1A3-125FCB11F172}" type="pres">
+      <dgm:prSet presAssocID="{CC89BF67-3C61-4CCF-859D-6DBB1B99880D}" presName="parentText" presStyleLbl="node1" presStyleIdx="4" presStyleCnt="6">
+        <dgm:presLayoutVars>
+          <dgm:chMax val="1"/>
+          <dgm:bulletEnabled val="1"/>
+        </dgm:presLayoutVars>
+      </dgm:prSet>
+      <dgm:spPr/>
+    </dgm:pt>
+    <dgm:pt modelId="{DC26793B-3ADF-44F4-89A2-A9A73E66F8E5}" type="pres">
+      <dgm:prSet presAssocID="{CC89BF67-3C61-4CCF-859D-6DBB1B99880D}" presName="descendantText" presStyleLbl="alignAccFollowNode1" presStyleIdx="4" presStyleCnt="6">
+        <dgm:presLayoutVars>
+          <dgm:bulletEnabled val="1"/>
+        </dgm:presLayoutVars>
+      </dgm:prSet>
+      <dgm:spPr/>
+    </dgm:pt>
+    <dgm:pt modelId="{A2683CAC-12EA-4CEB-B8BB-2FC2529CC70B}" type="pres">
+      <dgm:prSet presAssocID="{5AF6F61A-D622-4EA3-8B04-B5EB48D1521C}" presName="sp" presStyleCnt="0"/>
+      <dgm:spPr/>
+    </dgm:pt>
+    <dgm:pt modelId="{614DDEED-6E25-437F-9FB2-C0BF603EFCAA}" type="pres">
+      <dgm:prSet presAssocID="{9882A9C7-2372-4C59-9C0A-19C38905E08B}" presName="linNode" presStyleCnt="0"/>
+      <dgm:spPr/>
+    </dgm:pt>
+    <dgm:pt modelId="{3B8DEC48-9274-4000-946D-3F08DF263119}" type="pres">
+      <dgm:prSet presAssocID="{9882A9C7-2372-4C59-9C0A-19C38905E08B}" presName="parentText" presStyleLbl="node1" presStyleIdx="5" presStyleCnt="6">
+        <dgm:presLayoutVars>
+          <dgm:chMax val="1"/>
+          <dgm:bulletEnabled val="1"/>
+        </dgm:presLayoutVars>
+      </dgm:prSet>
+      <dgm:spPr/>
+    </dgm:pt>
+    <dgm:pt modelId="{10024F90-684F-449F-8404-39BCC9105708}" type="pres">
+      <dgm:prSet presAssocID="{9882A9C7-2372-4C59-9C0A-19C38905E08B}" presName="descendantText" presStyleLbl="alignAccFollowNode1" presStyleIdx="5" presStyleCnt="6">
+        <dgm:presLayoutVars>
+          <dgm:bulletEnabled val="1"/>
+        </dgm:presLayoutVars>
+      </dgm:prSet>
+      <dgm:spPr/>
+    </dgm:pt>
+  </dgm:ptLst>
+  <dgm:cxnLst>
+    <dgm:cxn modelId="{E8D01900-8542-41CB-98B9-38D7B5D3B16C}" type="presOf" srcId="{665CBA34-2F38-46B9-A308-9C741E8DC476}" destId="{10024F90-684F-449F-8404-39BCC9105708}" srcOrd="0" destOrd="0" presId="urn:microsoft.com/office/officeart/2005/8/layout/vList5"/>
+    <dgm:cxn modelId="{6F4E5903-A6A1-440E-842F-95CED7D7E6A9}" type="presOf" srcId="{4D8EFA5B-A929-4579-8D39-7156050C8575}" destId="{32248442-902A-4040-A86B-88DBF4BD514A}" srcOrd="0" destOrd="0" presId="urn:microsoft.com/office/officeart/2005/8/layout/vList5"/>
+    <dgm:cxn modelId="{EDE53308-148C-4116-80CB-E3C6C5B52F36}" srcId="{EA65ECFE-7273-4156-A465-726FBBB7A5EF}" destId="{1F387302-3FAB-49B4-AE6A-1D438559D29E}" srcOrd="0" destOrd="0" parTransId="{BBA5EBDA-2191-44B5-B083-CD46D3864ECC}" sibTransId="{2648B335-6FFD-4876-BECD-C95861D20824}"/>
+    <dgm:cxn modelId="{AFC9630A-9CC1-4A7D-9415-73BFE6D0019F}" srcId="{DED48862-4FDE-4239-A49B-456DF439E50B}" destId="{556B2152-F82B-4829-A929-F6B87CF55539}" srcOrd="0" destOrd="0" parTransId="{C5F43E5D-CCFE-4A8A-9C53-5603D00B1107}" sibTransId="{2BF16078-6ABF-4D1B-9896-D5F5175F8DBD}"/>
+    <dgm:cxn modelId="{C2ACB21E-65A3-49D7-B8CC-B6968A380706}" srcId="{9882A9C7-2372-4C59-9C0A-19C38905E08B}" destId="{665CBA34-2F38-46B9-A308-9C741E8DC476}" srcOrd="0" destOrd="0" parTransId="{A79EB0CE-4E86-4C40-B167-A5F8131FF314}" sibTransId="{05CB89A0-FDFC-4536-BE16-F4688F40A37F}"/>
+    <dgm:cxn modelId="{AD6E712D-5731-41B7-BDF4-53D9D9D4E8C5}" type="presOf" srcId="{86A89ABA-1A05-4167-82DC-899AADA8E7F6}" destId="{93E8F156-AE58-4048-B5BF-CEFEC53AED24}" srcOrd="0" destOrd="0" presId="urn:microsoft.com/office/officeart/2005/8/layout/vList5"/>
+    <dgm:cxn modelId="{493D6F35-F7B3-45FC-AB40-039B0B8C0EAA}" type="presOf" srcId="{EA65ECFE-7273-4156-A465-726FBBB7A5EF}" destId="{EC8A3A16-4ED0-4200-8FF3-283D92CB710D}" srcOrd="0" destOrd="0" presId="urn:microsoft.com/office/officeart/2005/8/layout/vList5"/>
+    <dgm:cxn modelId="{18DDE061-C9B2-4317-8EF5-ED6588EE119C}" srcId="{4D8EFA5B-A929-4579-8D39-7156050C8575}" destId="{9882A9C7-2372-4C59-9C0A-19C38905E08B}" srcOrd="5" destOrd="0" parTransId="{6927DD29-45BC-45E9-95E5-BA2DBC3B4F10}" sibTransId="{F1FAD724-96D5-4BAB-8DC4-66103C7951D3}"/>
+    <dgm:cxn modelId="{5C67BE43-C5FF-43BD-9417-0164983FDFBF}" srcId="{4D8EFA5B-A929-4579-8D39-7156050C8575}" destId="{EA65ECFE-7273-4156-A465-726FBBB7A5EF}" srcOrd="0" destOrd="0" parTransId="{A3A086E3-53DE-40AF-AB56-FC13F13E229D}" sibTransId="{893E9E46-DF43-4B73-9894-AE92E5509AD1}"/>
+    <dgm:cxn modelId="{11BE4667-0E31-4674-BC35-A4A9F8269223}" type="presOf" srcId="{D0E35388-525A-41CD-9021-2E7E0ED973D4}" destId="{0FB892DD-EB20-42AC-ACFE-853D2CBB4887}" srcOrd="0" destOrd="0" presId="urn:microsoft.com/office/officeart/2005/8/layout/vList5"/>
+    <dgm:cxn modelId="{F940EA53-DD34-49A1-9F36-313D17862176}" type="presOf" srcId="{C3290A82-3B3F-4381-8CAB-136465228672}" destId="{DC26793B-3ADF-44F4-89A2-A9A73E66F8E5}" srcOrd="0" destOrd="0" presId="urn:microsoft.com/office/officeart/2005/8/layout/vList5"/>
+    <dgm:cxn modelId="{1BBBCC7A-5916-4036-A3B5-C580479C70EF}" srcId="{4D8EFA5B-A929-4579-8D39-7156050C8575}" destId="{D0E35388-525A-41CD-9021-2E7E0ED973D4}" srcOrd="2" destOrd="0" parTransId="{A7D9BADF-5559-4DBB-BD73-C82AAB3B8798}" sibTransId="{4922682A-EE4C-44DA-A92F-429B47D6EBAA}"/>
+    <dgm:cxn modelId="{10A08D9B-686E-47E6-B59A-15868D162A7B}" type="presOf" srcId="{9882A9C7-2372-4C59-9C0A-19C38905E08B}" destId="{3B8DEC48-9274-4000-946D-3F08DF263119}" srcOrd="0" destOrd="0" presId="urn:microsoft.com/office/officeart/2005/8/layout/vList5"/>
+    <dgm:cxn modelId="{97F318AC-F9A5-49FC-89B8-B5640D7CFFA5}" type="presOf" srcId="{27DA4637-2004-46D0-8AF6-6FF76E48612B}" destId="{13026DC3-21EF-49AC-8E20-EC52A7212BA3}" srcOrd="0" destOrd="0" presId="urn:microsoft.com/office/officeart/2005/8/layout/vList5"/>
+    <dgm:cxn modelId="{7DFBF4AC-1D55-4A5B-9FC2-07D5602F982F}" srcId="{CC89BF67-3C61-4CCF-859D-6DBB1B99880D}" destId="{C3290A82-3B3F-4381-8CAB-136465228672}" srcOrd="0" destOrd="0" parTransId="{88987F86-72F5-431C-911E-3A0B8625925E}" sibTransId="{B70C5770-3DB7-499E-B4F3-15A815C6763C}"/>
+    <dgm:cxn modelId="{1E6E42AE-EBB6-470C-B393-8644D521BDD4}" type="presOf" srcId="{556B2152-F82B-4829-A929-F6B87CF55539}" destId="{67D83FF0-A66A-4B03-A44C-33B21125776E}" srcOrd="0" destOrd="0" presId="urn:microsoft.com/office/officeart/2005/8/layout/vList5"/>
+    <dgm:cxn modelId="{44AA00AF-BDC5-413E-B0C0-3E296BF0D94A}" srcId="{4D8EFA5B-A929-4579-8D39-7156050C8575}" destId="{CC89BF67-3C61-4CCF-859D-6DBB1B99880D}" srcOrd="4" destOrd="0" parTransId="{AA08372F-39A2-4B35-84F3-13073FBC0C44}" sibTransId="{5AF6F61A-D622-4EA3-8B04-B5EB48D1521C}"/>
+    <dgm:cxn modelId="{00E1D7B1-18D0-48A0-993D-738FA38334B7}" type="presOf" srcId="{CC89BF67-3C61-4CCF-859D-6DBB1B99880D}" destId="{E5DC52BA-BB11-4AB7-B1A3-125FCB11F172}" srcOrd="0" destOrd="0" presId="urn:microsoft.com/office/officeart/2005/8/layout/vList5"/>
+    <dgm:cxn modelId="{DE173ABE-34E8-4229-B228-A83AA288416D}" srcId="{D0E35388-525A-41CD-9021-2E7E0ED973D4}" destId="{86A89ABA-1A05-4167-82DC-899AADA8E7F6}" srcOrd="0" destOrd="0" parTransId="{C12C2C3F-350D-4CBA-BEA6-57C030EDDF4D}" sibTransId="{476EBD3C-EB70-48CC-A3AC-DB4389909017}"/>
+    <dgm:cxn modelId="{46E82AC3-7D8D-47AF-88F2-87EFF7CB64DC}" srcId="{7CE6808E-0B4D-4FA7-BEB8-03BE537E9F36}" destId="{27DA4637-2004-46D0-8AF6-6FF76E48612B}" srcOrd="0" destOrd="0" parTransId="{73A5FE9A-475F-49CD-96EE-04D48421ACAD}" sibTransId="{D90DC8A5-A09F-42C4-AEAF-D2FA2A781B71}"/>
+    <dgm:cxn modelId="{62B84DC3-665D-43D7-9644-BFF90AAD36AE}" srcId="{4D8EFA5B-A929-4579-8D39-7156050C8575}" destId="{DED48862-4FDE-4239-A49B-456DF439E50B}" srcOrd="3" destOrd="0" parTransId="{A20DBB7C-1D38-47C3-997A-BC1C71E8930F}" sibTransId="{CCC10950-908F-4A05-94CE-2ED4688B1F31}"/>
+    <dgm:cxn modelId="{186E7ECD-1F57-4005-956A-DD9C581D60DE}" type="presOf" srcId="{1F387302-3FAB-49B4-AE6A-1D438559D29E}" destId="{6FEFBAF4-9FAB-4B9A-AC1B-71AF5BC67D21}" srcOrd="0" destOrd="0" presId="urn:microsoft.com/office/officeart/2005/8/layout/vList5"/>
+    <dgm:cxn modelId="{BA53D5D0-E8CC-4EB3-98C1-BB901B08CAB8}" type="presOf" srcId="{DED48862-4FDE-4239-A49B-456DF439E50B}" destId="{78E70463-462B-470E-9930-5F234961BD23}" srcOrd="0" destOrd="0" presId="urn:microsoft.com/office/officeart/2005/8/layout/vList5"/>
+    <dgm:cxn modelId="{AF9480F4-A40A-43EC-98B0-8D2B6BE875AA}" type="presOf" srcId="{7CE6808E-0B4D-4FA7-BEB8-03BE537E9F36}" destId="{F2B91B8F-47A1-46D8-B263-CE3D8259829B}" srcOrd="0" destOrd="0" presId="urn:microsoft.com/office/officeart/2005/8/layout/vList5"/>
+    <dgm:cxn modelId="{FB467DF6-86A5-45EC-9416-B27904C66E3A}" srcId="{4D8EFA5B-A929-4579-8D39-7156050C8575}" destId="{7CE6808E-0B4D-4FA7-BEB8-03BE537E9F36}" srcOrd="1" destOrd="0" parTransId="{1D3574A5-0353-4975-AA8A-8536E59950D9}" sibTransId="{13F5E189-1773-4717-A545-79B061BFB205}"/>
+    <dgm:cxn modelId="{1A7B7B7B-3A28-44F5-B03E-3FF64A572FF2}" type="presParOf" srcId="{32248442-902A-4040-A86B-88DBF4BD514A}" destId="{7216E608-CD3A-4BFC-B8A2-FE6CB5DFB5EF}" srcOrd="0" destOrd="0" presId="urn:microsoft.com/office/officeart/2005/8/layout/vList5"/>
+    <dgm:cxn modelId="{B3C9CE76-66D4-489F-9001-EA8D745186B9}" type="presParOf" srcId="{7216E608-CD3A-4BFC-B8A2-FE6CB5DFB5EF}" destId="{EC8A3A16-4ED0-4200-8FF3-283D92CB710D}" srcOrd="0" destOrd="0" presId="urn:microsoft.com/office/officeart/2005/8/layout/vList5"/>
+    <dgm:cxn modelId="{481F43C6-DBCC-4967-99FD-CD477C42B427}" type="presParOf" srcId="{7216E608-CD3A-4BFC-B8A2-FE6CB5DFB5EF}" destId="{6FEFBAF4-9FAB-4B9A-AC1B-71AF5BC67D21}" srcOrd="1" destOrd="0" presId="urn:microsoft.com/office/officeart/2005/8/layout/vList5"/>
+    <dgm:cxn modelId="{B9C95444-CAAB-4E77-9A14-00B8A133EC5A}" type="presParOf" srcId="{32248442-902A-4040-A86B-88DBF4BD514A}" destId="{985F20CD-96E4-4824-A0AC-6D1489DDAC07}" srcOrd="1" destOrd="0" presId="urn:microsoft.com/office/officeart/2005/8/layout/vList5"/>
+    <dgm:cxn modelId="{A62FF202-27FC-409D-A811-51F7E6DE208B}" type="presParOf" srcId="{32248442-902A-4040-A86B-88DBF4BD514A}" destId="{CB187C26-43E0-4068-AB22-0BDFC8CCB926}" srcOrd="2" destOrd="0" presId="urn:microsoft.com/office/officeart/2005/8/layout/vList5"/>
+    <dgm:cxn modelId="{FCE9EAF9-F8AD-48A9-A100-68A89CC37A4B}" type="presParOf" srcId="{CB187C26-43E0-4068-AB22-0BDFC8CCB926}" destId="{F2B91B8F-47A1-46D8-B263-CE3D8259829B}" srcOrd="0" destOrd="0" presId="urn:microsoft.com/office/officeart/2005/8/layout/vList5"/>
+    <dgm:cxn modelId="{8334258A-7E3A-421F-A9C3-CA4E935DB29B}" type="presParOf" srcId="{CB187C26-43E0-4068-AB22-0BDFC8CCB926}" destId="{13026DC3-21EF-49AC-8E20-EC52A7212BA3}" srcOrd="1" destOrd="0" presId="urn:microsoft.com/office/officeart/2005/8/layout/vList5"/>
+    <dgm:cxn modelId="{9D5366D6-2642-44B6-A63D-844BCB98F460}" type="presParOf" srcId="{32248442-902A-4040-A86B-88DBF4BD514A}" destId="{B70D7FEC-8327-4062-9252-C27AA8E4F593}" srcOrd="3" destOrd="0" presId="urn:microsoft.com/office/officeart/2005/8/layout/vList5"/>
+    <dgm:cxn modelId="{0D4A338E-5F79-4312-B783-C39F99069FD9}" type="presParOf" srcId="{32248442-902A-4040-A86B-88DBF4BD514A}" destId="{B728A5E6-9633-41A3-9188-93B1F4639E55}" srcOrd="4" destOrd="0" presId="urn:microsoft.com/office/officeart/2005/8/layout/vList5"/>
+    <dgm:cxn modelId="{026E88BC-3666-4EAF-BB84-C4A9FA5E3FB8}" type="presParOf" srcId="{B728A5E6-9633-41A3-9188-93B1F4639E55}" destId="{0FB892DD-EB20-42AC-ACFE-853D2CBB4887}" srcOrd="0" destOrd="0" presId="urn:microsoft.com/office/officeart/2005/8/layout/vList5"/>
+    <dgm:cxn modelId="{BA586134-2976-45DC-A145-61E24BA6FA22}" type="presParOf" srcId="{B728A5E6-9633-41A3-9188-93B1F4639E55}" destId="{93E8F156-AE58-4048-B5BF-CEFEC53AED24}" srcOrd="1" destOrd="0" presId="urn:microsoft.com/office/officeart/2005/8/layout/vList5"/>
+    <dgm:cxn modelId="{A96F8EFB-A51E-4D61-8DD7-B46E499AE7BF}" type="presParOf" srcId="{32248442-902A-4040-A86B-88DBF4BD514A}" destId="{B878DDC9-EE45-4867-9EDC-F288597DE0E2}" srcOrd="5" destOrd="0" presId="urn:microsoft.com/office/officeart/2005/8/layout/vList5"/>
+    <dgm:cxn modelId="{1463880A-99A5-4F73-B012-FA79DE420184}" type="presParOf" srcId="{32248442-902A-4040-A86B-88DBF4BD514A}" destId="{06B300E4-2F80-43C2-92A4-13710BCFA052}" srcOrd="6" destOrd="0" presId="urn:microsoft.com/office/officeart/2005/8/layout/vList5"/>
+    <dgm:cxn modelId="{58C9C2CC-179F-453F-8E57-294226D49E90}" type="presParOf" srcId="{06B300E4-2F80-43C2-92A4-13710BCFA052}" destId="{78E70463-462B-470E-9930-5F234961BD23}" srcOrd="0" destOrd="0" presId="urn:microsoft.com/office/officeart/2005/8/layout/vList5"/>
+    <dgm:cxn modelId="{6E559D28-39E2-4F15-9908-682E7C767F80}" type="presParOf" srcId="{06B300E4-2F80-43C2-92A4-13710BCFA052}" destId="{67D83FF0-A66A-4B03-A44C-33B21125776E}" srcOrd="1" destOrd="0" presId="urn:microsoft.com/office/officeart/2005/8/layout/vList5"/>
+    <dgm:cxn modelId="{D1B712AE-8050-409C-89A6-3A3A129A6416}" type="presParOf" srcId="{32248442-902A-4040-A86B-88DBF4BD514A}" destId="{A684AAF7-5632-47F5-A743-1B603131D5BE}" srcOrd="7" destOrd="0" presId="urn:microsoft.com/office/officeart/2005/8/layout/vList5"/>
+    <dgm:cxn modelId="{487A4A56-A4E8-4CC9-8A38-36978AD5CFDE}" type="presParOf" srcId="{32248442-902A-4040-A86B-88DBF4BD514A}" destId="{16E92550-2809-415D-A10C-E77FC190EFB0}" srcOrd="8" destOrd="0" presId="urn:microsoft.com/office/officeart/2005/8/layout/vList5"/>
+    <dgm:cxn modelId="{FC154249-FABE-4313-83C7-8E930B61CAC2}" type="presParOf" srcId="{16E92550-2809-415D-A10C-E77FC190EFB0}" destId="{E5DC52BA-BB11-4AB7-B1A3-125FCB11F172}" srcOrd="0" destOrd="0" presId="urn:microsoft.com/office/officeart/2005/8/layout/vList5"/>
+    <dgm:cxn modelId="{1CCBEC20-439E-44A1-9376-7AFCD336A935}" type="presParOf" srcId="{16E92550-2809-415D-A10C-E77FC190EFB0}" destId="{DC26793B-3ADF-44F4-89A2-A9A73E66F8E5}" srcOrd="1" destOrd="0" presId="urn:microsoft.com/office/officeart/2005/8/layout/vList5"/>
+    <dgm:cxn modelId="{C9333877-0547-4B70-860F-5425AD55779F}" type="presParOf" srcId="{32248442-902A-4040-A86B-88DBF4BD514A}" destId="{A2683CAC-12EA-4CEB-B8BB-2FC2529CC70B}" srcOrd="9" destOrd="0" presId="urn:microsoft.com/office/officeart/2005/8/layout/vList5"/>
+    <dgm:cxn modelId="{C814987B-B2BA-440E-9367-2CF97B67DF2D}" type="presParOf" srcId="{32248442-902A-4040-A86B-88DBF4BD514A}" destId="{614DDEED-6E25-437F-9FB2-C0BF603EFCAA}" srcOrd="10" destOrd="0" presId="urn:microsoft.com/office/officeart/2005/8/layout/vList5"/>
+    <dgm:cxn modelId="{DCFBA88E-6240-4280-9528-C52BADF3E376}" type="presParOf" srcId="{614DDEED-6E25-437F-9FB2-C0BF603EFCAA}" destId="{3B8DEC48-9274-4000-946D-3F08DF263119}" srcOrd="0" destOrd="0" presId="urn:microsoft.com/office/officeart/2005/8/layout/vList5"/>
+    <dgm:cxn modelId="{BF97BDA0-B1B7-48DB-BB98-7C2D4D3D1001}" type="presParOf" srcId="{614DDEED-6E25-437F-9FB2-C0BF603EFCAA}" destId="{10024F90-684F-449F-8404-39BCC9105708}" srcOrd="1" destOrd="0" presId="urn:microsoft.com/office/officeart/2005/8/layout/vList5"/>
+  </dgm:cxnLst>
+  <dgm:bg/>
+  <dgm:whole/>
+  <dgm:extLst>
+    <a:ext uri="http://schemas.microsoft.com/office/drawing/2008/diagram">
+      <dsp:dataModelExt xmlns:dsp="http://schemas.microsoft.com/office/drawing/2008/diagram" relId="rId6" minVer="http://schemas.openxmlformats.org/drawingml/2006/diagram"/>
+    </a:ext>
+  </dgm:extLst>
+</dgm:dataModel>
+</file>
+
+<file path=ppt/diagrams/drawing1.xml><?xml version="1.0" encoding="utf-8"?>
+<dsp:drawing xmlns:dgm="http://schemas.openxmlformats.org/drawingml/2006/diagram" xmlns:dsp="http://schemas.microsoft.com/office/drawing/2008/diagram" xmlns:a="http://schemas.openxmlformats.org/drawingml/2006/main">
+  <dsp:spTree>
+    <dsp:nvGrpSpPr>
+      <dsp:cNvPr id="0" name=""/>
+      <dsp:cNvGrpSpPr/>
+    </dsp:nvGrpSpPr>
+    <dsp:grpSpPr/>
+    <dsp:sp modelId="{6FEFBAF4-9FAB-4B9A-AC1B-71AF5BC67D21}">
+      <dsp:nvSpPr>
+        <dsp:cNvPr id="0" name=""/>
+        <dsp:cNvSpPr/>
+      </dsp:nvSpPr>
+      <dsp:spPr>
+        <a:xfrm rot="5400000">
+          <a:off x="5382277" y="-2345151"/>
+          <a:ext cx="478968" cy="5291069"/>
+        </a:xfrm>
+        <a:prstGeom prst="round2SameRect">
+          <a:avLst/>
+        </a:prstGeom>
+        <a:solidFill>
+          <a:schemeClr val="accent5">
+            <a:tint val="40000"/>
+            <a:alpha val="90000"/>
+            <a:hueOff val="0"/>
+            <a:satOff val="0"/>
+            <a:lumOff val="0"/>
+            <a:alphaOff val="0"/>
+          </a:schemeClr>
+        </a:solidFill>
+        <a:ln w="12700" cap="flat" cmpd="sng" algn="ctr">
+          <a:solidFill>
+            <a:schemeClr val="accent5">
+              <a:tint val="40000"/>
+              <a:alpha val="90000"/>
+              <a:hueOff val="0"/>
+              <a:satOff val="0"/>
+              <a:lumOff val="0"/>
+              <a:alphaOff val="0"/>
+            </a:schemeClr>
+          </a:solidFill>
+          <a:prstDash val="solid"/>
+          <a:miter lim="800000"/>
+        </a:ln>
+        <a:effectLst/>
+      </dsp:spPr>
+      <dsp:style>
+        <a:lnRef idx="2">
+          <a:scrgbClr r="0" g="0" b="0"/>
+        </a:lnRef>
+        <a:fillRef idx="1">
+          <a:scrgbClr r="0" g="0" b="0"/>
+        </a:fillRef>
+        <a:effectRef idx="0">
+          <a:scrgbClr r="0" g="0" b="0"/>
+        </a:effectRef>
+        <a:fontRef idx="minor"/>
+      </dsp:style>
+      <dsp:txBody>
+        <a:bodyPr spcFirstLastPara="0" vert="horz" wrap="square" lIns="91440" tIns="45720" rIns="91440" bIns="45720" numCol="1" spcCol="1270" anchor="ctr" anchorCtr="0">
+          <a:noAutofit/>
+        </a:bodyPr>
+        <a:lstStyle/>
+        <a:p>
+          <a:pPr marL="228600" lvl="1" indent="-228600" algn="l" defTabSz="1066800">
+            <a:lnSpc>
+              <a:spcPct val="90000"/>
+            </a:lnSpc>
+            <a:spcBef>
+              <a:spcPct val="0"/>
+            </a:spcBef>
+            <a:spcAft>
+              <a:spcPct val="15000"/>
+            </a:spcAft>
+            <a:buChar char="•"/>
+          </a:pPr>
+          <a:r>
+            <a:rPr lang="en-US" sz="2400" kern="1200"/>
+            <a:t>Team Lead</a:t>
+          </a:r>
+        </a:p>
+      </dsp:txBody>
+      <dsp:txXfrm rot="-5400000">
+        <a:off x="2976227" y="84280"/>
+        <a:ext cx="5267688" cy="432206"/>
+      </dsp:txXfrm>
+    </dsp:sp>
+    <dsp:sp modelId="{EC8A3A16-4ED0-4200-8FF3-283D92CB710D}">
+      <dsp:nvSpPr>
+        <dsp:cNvPr id="0" name=""/>
+        <dsp:cNvSpPr/>
+      </dsp:nvSpPr>
+      <dsp:spPr>
+        <a:xfrm>
+          <a:off x="0" y="8667"/>
+          <a:ext cx="2976226" cy="598710"/>
+        </a:xfrm>
+        <a:prstGeom prst="roundRect">
+          <a:avLst/>
+        </a:prstGeom>
+        <a:solidFill>
+          <a:schemeClr val="accent5">
+            <a:hueOff val="0"/>
+            <a:satOff val="0"/>
+            <a:lumOff val="0"/>
+            <a:alphaOff val="0"/>
+          </a:schemeClr>
+        </a:solidFill>
+        <a:ln w="12700" cap="flat" cmpd="sng" algn="ctr">
+          <a:solidFill>
+            <a:schemeClr val="lt1">
+              <a:hueOff val="0"/>
+              <a:satOff val="0"/>
+              <a:lumOff val="0"/>
+              <a:alphaOff val="0"/>
+            </a:schemeClr>
+          </a:solidFill>
+          <a:prstDash val="solid"/>
+          <a:miter lim="800000"/>
+        </a:ln>
+        <a:effectLst/>
+      </dsp:spPr>
+      <dsp:style>
+        <a:lnRef idx="2">
+          <a:scrgbClr r="0" g="0" b="0"/>
+        </a:lnRef>
+        <a:fillRef idx="1">
+          <a:scrgbClr r="0" g="0" b="0"/>
+        </a:fillRef>
+        <a:effectRef idx="0">
+          <a:scrgbClr r="0" g="0" b="0"/>
+        </a:effectRef>
+        <a:fontRef idx="minor">
+          <a:schemeClr val="lt1"/>
+        </a:fontRef>
+      </dsp:style>
+      <dsp:txBody>
+        <a:bodyPr spcFirstLastPara="0" vert="horz" wrap="square" lIns="99060" tIns="49530" rIns="99060" bIns="49530" numCol="1" spcCol="1270" anchor="ctr" anchorCtr="0">
+          <a:noAutofit/>
+        </a:bodyPr>
+        <a:lstStyle/>
+        <a:p>
+          <a:pPr marL="0" lvl="0" indent="0" algn="ctr" defTabSz="1155700">
+            <a:lnSpc>
+              <a:spcPct val="90000"/>
+            </a:lnSpc>
+            <a:spcBef>
+              <a:spcPct val="0"/>
+            </a:spcBef>
+            <a:spcAft>
+              <a:spcPct val="35000"/>
+            </a:spcAft>
+            <a:buNone/>
+          </a:pPr>
+          <a:r>
+            <a:rPr lang="en-US" sz="2600" kern="1200" dirty="0"/>
+            <a:t>Sam Gerstner</a:t>
+          </a:r>
+        </a:p>
+      </dsp:txBody>
+      <dsp:txXfrm>
+        <a:off x="29227" y="37894"/>
+        <a:ext cx="2917772" cy="540256"/>
+      </dsp:txXfrm>
+    </dsp:sp>
+    <dsp:sp modelId="{13026DC3-21EF-49AC-8E20-EC52A7212BA3}">
+      <dsp:nvSpPr>
+        <dsp:cNvPr id="0" name=""/>
+        <dsp:cNvSpPr/>
+      </dsp:nvSpPr>
+      <dsp:spPr>
+        <a:xfrm rot="5400000">
+          <a:off x="5382277" y="-1716505"/>
+          <a:ext cx="478968" cy="5291069"/>
+        </a:xfrm>
+        <a:prstGeom prst="round2SameRect">
+          <a:avLst/>
+        </a:prstGeom>
+        <a:solidFill>
+          <a:schemeClr val="accent5">
+            <a:tint val="40000"/>
+            <a:alpha val="90000"/>
+            <a:hueOff val="-340292"/>
+            <a:satOff val="-2499"/>
+            <a:lumOff val="-283"/>
+            <a:alphaOff val="0"/>
+          </a:schemeClr>
+        </a:solidFill>
+        <a:ln w="12700" cap="flat" cmpd="sng" algn="ctr">
+          <a:solidFill>
+            <a:schemeClr val="accent5">
+              <a:tint val="40000"/>
+              <a:alpha val="90000"/>
+              <a:hueOff val="-340292"/>
+              <a:satOff val="-2499"/>
+              <a:lumOff val="-283"/>
+              <a:alphaOff val="0"/>
+            </a:schemeClr>
+          </a:solidFill>
+          <a:prstDash val="solid"/>
+          <a:miter lim="800000"/>
+        </a:ln>
+        <a:effectLst/>
+      </dsp:spPr>
+      <dsp:style>
+        <a:lnRef idx="2">
+          <a:scrgbClr r="0" g="0" b="0"/>
+        </a:lnRef>
+        <a:fillRef idx="1">
+          <a:scrgbClr r="0" g="0" b="0"/>
+        </a:fillRef>
+        <a:effectRef idx="0">
+          <a:scrgbClr r="0" g="0" b="0"/>
+        </a:effectRef>
+        <a:fontRef idx="minor"/>
+      </dsp:style>
+      <dsp:txBody>
+        <a:bodyPr spcFirstLastPara="0" vert="horz" wrap="square" lIns="91440" tIns="45720" rIns="91440" bIns="45720" numCol="1" spcCol="1270" anchor="ctr" anchorCtr="0">
+          <a:noAutofit/>
+        </a:bodyPr>
+        <a:lstStyle/>
+        <a:p>
+          <a:pPr marL="228600" lvl="1" indent="-228600" algn="l" defTabSz="1066800">
+            <a:lnSpc>
+              <a:spcPct val="90000"/>
+            </a:lnSpc>
+            <a:spcBef>
+              <a:spcPct val="0"/>
+            </a:spcBef>
+            <a:spcAft>
+              <a:spcPct val="15000"/>
+            </a:spcAft>
+            <a:buChar char="•"/>
+          </a:pPr>
+          <a:r>
+            <a:rPr lang="en-US" sz="2400" kern="1200"/>
+            <a:t>Backend Developer</a:t>
+          </a:r>
+        </a:p>
+      </dsp:txBody>
+      <dsp:txXfrm rot="-5400000">
+        <a:off x="2976227" y="712926"/>
+        <a:ext cx="5267688" cy="432206"/>
+      </dsp:txXfrm>
+    </dsp:sp>
+    <dsp:sp modelId="{F2B91B8F-47A1-46D8-B263-CE3D8259829B}">
+      <dsp:nvSpPr>
+        <dsp:cNvPr id="0" name=""/>
+        <dsp:cNvSpPr/>
+      </dsp:nvSpPr>
+      <dsp:spPr>
+        <a:xfrm>
+          <a:off x="0" y="629674"/>
+          <a:ext cx="2976226" cy="598710"/>
+        </a:xfrm>
+        <a:prstGeom prst="roundRect">
+          <a:avLst/>
+        </a:prstGeom>
+        <a:solidFill>
+          <a:schemeClr val="accent5">
+            <a:hueOff val="-302211"/>
+            <a:satOff val="115"/>
+            <a:lumOff val="-1412"/>
+            <a:alphaOff val="0"/>
+          </a:schemeClr>
+        </a:solidFill>
+        <a:ln w="12700" cap="flat" cmpd="sng" algn="ctr">
+          <a:solidFill>
+            <a:schemeClr val="lt1">
+              <a:hueOff val="0"/>
+              <a:satOff val="0"/>
+              <a:lumOff val="0"/>
+              <a:alphaOff val="0"/>
+            </a:schemeClr>
+          </a:solidFill>
+          <a:prstDash val="solid"/>
+          <a:miter lim="800000"/>
+        </a:ln>
+        <a:effectLst/>
+      </dsp:spPr>
+      <dsp:style>
+        <a:lnRef idx="2">
+          <a:scrgbClr r="0" g="0" b="0"/>
+        </a:lnRef>
+        <a:fillRef idx="1">
+          <a:scrgbClr r="0" g="0" b="0"/>
+        </a:fillRef>
+        <a:effectRef idx="0">
+          <a:scrgbClr r="0" g="0" b="0"/>
+        </a:effectRef>
+        <a:fontRef idx="minor">
+          <a:schemeClr val="lt1"/>
+        </a:fontRef>
+      </dsp:style>
+      <dsp:txBody>
+        <a:bodyPr spcFirstLastPara="0" vert="horz" wrap="square" lIns="99060" tIns="49530" rIns="99060" bIns="49530" numCol="1" spcCol="1270" anchor="ctr" anchorCtr="0">
+          <a:noAutofit/>
+        </a:bodyPr>
+        <a:lstStyle/>
+        <a:p>
+          <a:pPr marL="0" lvl="0" indent="0" algn="ctr" defTabSz="1155700">
+            <a:lnSpc>
+              <a:spcPct val="90000"/>
+            </a:lnSpc>
+            <a:spcBef>
+              <a:spcPct val="0"/>
+            </a:spcBef>
+            <a:spcAft>
+              <a:spcPct val="35000"/>
+            </a:spcAft>
+            <a:buNone/>
+          </a:pPr>
+          <a:r>
+            <a:rPr lang="en-US" sz="2600" kern="1200"/>
+            <a:t>Alexander Frenette</a:t>
+          </a:r>
+        </a:p>
+      </dsp:txBody>
+      <dsp:txXfrm>
+        <a:off x="29227" y="658901"/>
+        <a:ext cx="2917772" cy="540256"/>
+      </dsp:txXfrm>
+    </dsp:sp>
+    <dsp:sp modelId="{93E8F156-AE58-4048-B5BF-CEFEC53AED24}">
+      <dsp:nvSpPr>
+        <dsp:cNvPr id="0" name=""/>
+        <dsp:cNvSpPr/>
+      </dsp:nvSpPr>
+      <dsp:spPr>
+        <a:xfrm rot="5400000">
+          <a:off x="5382277" y="-1087859"/>
+          <a:ext cx="478968" cy="5291069"/>
+        </a:xfrm>
+        <a:prstGeom prst="round2SameRect">
+          <a:avLst/>
+        </a:prstGeom>
+        <a:solidFill>
+          <a:schemeClr val="accent5">
+            <a:tint val="40000"/>
+            <a:alpha val="90000"/>
+            <a:hueOff val="-680584"/>
+            <a:satOff val="-4999"/>
+            <a:lumOff val="-566"/>
+            <a:alphaOff val="0"/>
+          </a:schemeClr>
+        </a:solidFill>
+        <a:ln w="12700" cap="flat" cmpd="sng" algn="ctr">
+          <a:solidFill>
+            <a:schemeClr val="accent5">
+              <a:tint val="40000"/>
+              <a:alpha val="90000"/>
+              <a:hueOff val="-680584"/>
+              <a:satOff val="-4999"/>
+              <a:lumOff val="-566"/>
+              <a:alphaOff val="0"/>
+            </a:schemeClr>
+          </a:solidFill>
+          <a:prstDash val="solid"/>
+          <a:miter lim="800000"/>
+        </a:ln>
+        <a:effectLst/>
+      </dsp:spPr>
+      <dsp:style>
+        <a:lnRef idx="2">
+          <a:scrgbClr r="0" g="0" b="0"/>
+        </a:lnRef>
+        <a:fillRef idx="1">
+          <a:scrgbClr r="0" g="0" b="0"/>
+        </a:fillRef>
+        <a:effectRef idx="0">
+          <a:scrgbClr r="0" g="0" b="0"/>
+        </a:effectRef>
+        <a:fontRef idx="minor"/>
+      </dsp:style>
+      <dsp:txBody>
+        <a:bodyPr spcFirstLastPara="0" vert="horz" wrap="square" lIns="91440" tIns="45720" rIns="91440" bIns="45720" numCol="1" spcCol="1270" anchor="ctr" anchorCtr="0">
+          <a:noAutofit/>
+        </a:bodyPr>
+        <a:lstStyle/>
+        <a:p>
+          <a:pPr marL="228600" lvl="1" indent="-228600" algn="l" defTabSz="1066800">
+            <a:lnSpc>
+              <a:spcPct val="90000"/>
+            </a:lnSpc>
+            <a:spcBef>
+              <a:spcPct val="0"/>
+            </a:spcBef>
+            <a:spcAft>
+              <a:spcPct val="15000"/>
+            </a:spcAft>
+            <a:buChar char="•"/>
+          </a:pPr>
+          <a:r>
+            <a:rPr lang="en-US" sz="2400" kern="1200" dirty="0"/>
+            <a:t>User Interface Developer</a:t>
+          </a:r>
+        </a:p>
+      </dsp:txBody>
+      <dsp:txXfrm rot="-5400000">
+        <a:off x="2976227" y="1341572"/>
+        <a:ext cx="5267688" cy="432206"/>
+      </dsp:txXfrm>
+    </dsp:sp>
+    <dsp:sp modelId="{0FB892DD-EB20-42AC-ACFE-853D2CBB4887}">
+      <dsp:nvSpPr>
+        <dsp:cNvPr id="0" name=""/>
+        <dsp:cNvSpPr/>
+      </dsp:nvSpPr>
+      <dsp:spPr>
+        <a:xfrm>
+          <a:off x="0" y="1258319"/>
+          <a:ext cx="2976226" cy="598710"/>
+        </a:xfrm>
+        <a:prstGeom prst="roundRect">
+          <a:avLst/>
+        </a:prstGeom>
+        <a:solidFill>
+          <a:schemeClr val="accent5">
+            <a:hueOff val="-604422"/>
+            <a:satOff val="231"/>
+            <a:lumOff val="-2824"/>
+            <a:alphaOff val="0"/>
+          </a:schemeClr>
+        </a:solidFill>
+        <a:ln w="12700" cap="flat" cmpd="sng" algn="ctr">
+          <a:solidFill>
+            <a:schemeClr val="lt1">
+              <a:hueOff val="0"/>
+              <a:satOff val="0"/>
+              <a:lumOff val="0"/>
+              <a:alphaOff val="0"/>
+            </a:schemeClr>
+          </a:solidFill>
+          <a:prstDash val="solid"/>
+          <a:miter lim="800000"/>
+        </a:ln>
+        <a:effectLst/>
+      </dsp:spPr>
+      <dsp:style>
+        <a:lnRef idx="2">
+          <a:scrgbClr r="0" g="0" b="0"/>
+        </a:lnRef>
+        <a:fillRef idx="1">
+          <a:scrgbClr r="0" g="0" b="0"/>
+        </a:fillRef>
+        <a:effectRef idx="0">
+          <a:scrgbClr r="0" g="0" b="0"/>
+        </a:effectRef>
+        <a:fontRef idx="minor">
+          <a:schemeClr val="lt1"/>
+        </a:fontRef>
+      </dsp:style>
+      <dsp:txBody>
+        <a:bodyPr spcFirstLastPara="0" vert="horz" wrap="square" lIns="99060" tIns="49530" rIns="99060" bIns="49530" numCol="1" spcCol="1270" anchor="ctr" anchorCtr="0">
+          <a:noAutofit/>
+        </a:bodyPr>
+        <a:lstStyle/>
+        <a:p>
+          <a:pPr marL="0" lvl="0" indent="0" algn="ctr" defTabSz="1155700">
+            <a:lnSpc>
+              <a:spcPct val="90000"/>
+            </a:lnSpc>
+            <a:spcBef>
+              <a:spcPct val="0"/>
+            </a:spcBef>
+            <a:spcAft>
+              <a:spcPct val="35000"/>
+            </a:spcAft>
+            <a:buNone/>
+          </a:pPr>
+          <a:r>
+            <a:rPr lang="en-US" sz="2600" kern="1200"/>
+            <a:t>Noah Nannen</a:t>
+          </a:r>
+        </a:p>
+      </dsp:txBody>
+      <dsp:txXfrm>
+        <a:off x="29227" y="1287546"/>
+        <a:ext cx="2917772" cy="540256"/>
+      </dsp:txXfrm>
+    </dsp:sp>
+    <dsp:sp modelId="{67D83FF0-A66A-4B03-A44C-33B21125776E}">
+      <dsp:nvSpPr>
+        <dsp:cNvPr id="0" name=""/>
+        <dsp:cNvSpPr/>
+      </dsp:nvSpPr>
+      <dsp:spPr>
+        <a:xfrm rot="5400000">
+          <a:off x="5382277" y="-459213"/>
+          <a:ext cx="478968" cy="5291069"/>
+        </a:xfrm>
+        <a:prstGeom prst="round2SameRect">
+          <a:avLst/>
+        </a:prstGeom>
+        <a:solidFill>
+          <a:schemeClr val="accent5">
+            <a:tint val="40000"/>
+            <a:alpha val="90000"/>
+            <a:hueOff val="-1020876"/>
+            <a:satOff val="-7498"/>
+            <a:lumOff val="-849"/>
+            <a:alphaOff val="0"/>
+          </a:schemeClr>
+        </a:solidFill>
+        <a:ln w="12700" cap="flat" cmpd="sng" algn="ctr">
+          <a:solidFill>
+            <a:schemeClr val="accent5">
+              <a:tint val="40000"/>
+              <a:alpha val="90000"/>
+              <a:hueOff val="-1020876"/>
+              <a:satOff val="-7498"/>
+              <a:lumOff val="-849"/>
+              <a:alphaOff val="0"/>
+            </a:schemeClr>
+          </a:solidFill>
+          <a:prstDash val="solid"/>
+          <a:miter lim="800000"/>
+        </a:ln>
+        <a:effectLst/>
+      </dsp:spPr>
+      <dsp:style>
+        <a:lnRef idx="2">
+          <a:scrgbClr r="0" g="0" b="0"/>
+        </a:lnRef>
+        <a:fillRef idx="1">
+          <a:scrgbClr r="0" g="0" b="0"/>
+        </a:fillRef>
+        <a:effectRef idx="0">
+          <a:scrgbClr r="0" g="0" b="0"/>
+        </a:effectRef>
+        <a:fontRef idx="minor"/>
+      </dsp:style>
+      <dsp:txBody>
+        <a:bodyPr spcFirstLastPara="0" vert="horz" wrap="square" lIns="91440" tIns="45720" rIns="91440" bIns="45720" numCol="1" spcCol="1270" anchor="ctr" anchorCtr="0">
+          <a:noAutofit/>
+        </a:bodyPr>
+        <a:lstStyle/>
+        <a:p>
+          <a:pPr marL="228600" lvl="1" indent="-228600" algn="l" defTabSz="1066800">
+            <a:lnSpc>
+              <a:spcPct val="90000"/>
+            </a:lnSpc>
+            <a:spcBef>
+              <a:spcPct val="0"/>
+            </a:spcBef>
+            <a:spcAft>
+              <a:spcPct val="15000"/>
+            </a:spcAft>
+            <a:buChar char="•"/>
+          </a:pPr>
+          <a:r>
+            <a:rPr lang="en-US" sz="2400" kern="1200"/>
+            <a:t>Full Stack Developer</a:t>
+          </a:r>
+        </a:p>
+      </dsp:txBody>
+      <dsp:txXfrm rot="-5400000">
+        <a:off x="2976227" y="1970218"/>
+        <a:ext cx="5267688" cy="432206"/>
+      </dsp:txXfrm>
+    </dsp:sp>
+    <dsp:sp modelId="{78E70463-462B-470E-9930-5F234961BD23}">
+      <dsp:nvSpPr>
+        <dsp:cNvPr id="0" name=""/>
+        <dsp:cNvSpPr/>
+      </dsp:nvSpPr>
+      <dsp:spPr>
+        <a:xfrm>
+          <a:off x="0" y="1886965"/>
+          <a:ext cx="2976226" cy="598710"/>
+        </a:xfrm>
+        <a:prstGeom prst="roundRect">
+          <a:avLst/>
+        </a:prstGeom>
+        <a:solidFill>
+          <a:schemeClr val="accent5">
+            <a:hueOff val="-906634"/>
+            <a:satOff val="346"/>
+            <a:lumOff val="-4235"/>
+            <a:alphaOff val="0"/>
+          </a:schemeClr>
+        </a:solidFill>
+        <a:ln w="12700" cap="flat" cmpd="sng" algn="ctr">
+          <a:solidFill>
+            <a:schemeClr val="lt1">
+              <a:hueOff val="0"/>
+              <a:satOff val="0"/>
+              <a:lumOff val="0"/>
+              <a:alphaOff val="0"/>
+            </a:schemeClr>
+          </a:solidFill>
+          <a:prstDash val="solid"/>
+          <a:miter lim="800000"/>
+        </a:ln>
+        <a:effectLst/>
+      </dsp:spPr>
+      <dsp:style>
+        <a:lnRef idx="2">
+          <a:scrgbClr r="0" g="0" b="0"/>
+        </a:lnRef>
+        <a:fillRef idx="1">
+          <a:scrgbClr r="0" g="0" b="0"/>
+        </a:fillRef>
+        <a:effectRef idx="0">
+          <a:scrgbClr r="0" g="0" b="0"/>
+        </a:effectRef>
+        <a:fontRef idx="minor">
+          <a:schemeClr val="lt1"/>
+        </a:fontRef>
+      </dsp:style>
+      <dsp:txBody>
+        <a:bodyPr spcFirstLastPara="0" vert="horz" wrap="square" lIns="99060" tIns="49530" rIns="99060" bIns="49530" numCol="1" spcCol="1270" anchor="ctr" anchorCtr="0">
+          <a:noAutofit/>
+        </a:bodyPr>
+        <a:lstStyle/>
+        <a:p>
+          <a:pPr marL="0" lvl="0" indent="0" algn="ctr" defTabSz="1155700">
+            <a:lnSpc>
+              <a:spcPct val="90000"/>
+            </a:lnSpc>
+            <a:spcBef>
+              <a:spcPct val="0"/>
+            </a:spcBef>
+            <a:spcAft>
+              <a:spcPct val="35000"/>
+            </a:spcAft>
+            <a:buNone/>
+          </a:pPr>
+          <a:r>
+            <a:rPr lang="en-US" sz="2600" kern="1200"/>
+            <a:t>Shlok Sheth </a:t>
+          </a:r>
+        </a:p>
+      </dsp:txBody>
+      <dsp:txXfrm>
+        <a:off x="29227" y="1916192"/>
+        <a:ext cx="2917772" cy="540256"/>
+      </dsp:txXfrm>
+    </dsp:sp>
+    <dsp:sp modelId="{DC26793B-3ADF-44F4-89A2-A9A73E66F8E5}">
+      <dsp:nvSpPr>
+        <dsp:cNvPr id="0" name=""/>
+        <dsp:cNvSpPr/>
+      </dsp:nvSpPr>
+      <dsp:spPr>
+        <a:xfrm rot="5400000">
+          <a:off x="5382277" y="169431"/>
+          <a:ext cx="478968" cy="5291069"/>
+        </a:xfrm>
+        <a:prstGeom prst="round2SameRect">
+          <a:avLst/>
+        </a:prstGeom>
+        <a:solidFill>
+          <a:schemeClr val="accent5">
+            <a:tint val="40000"/>
+            <a:alpha val="90000"/>
+            <a:hueOff val="-1361168"/>
+            <a:satOff val="-9998"/>
+            <a:lumOff val="-1132"/>
+            <a:alphaOff val="0"/>
+          </a:schemeClr>
+        </a:solidFill>
+        <a:ln w="12700" cap="flat" cmpd="sng" algn="ctr">
+          <a:solidFill>
+            <a:schemeClr val="accent5">
+              <a:tint val="40000"/>
+              <a:alpha val="90000"/>
+              <a:hueOff val="-1361168"/>
+              <a:satOff val="-9998"/>
+              <a:lumOff val="-1132"/>
+              <a:alphaOff val="0"/>
+            </a:schemeClr>
+          </a:solidFill>
+          <a:prstDash val="solid"/>
+          <a:miter lim="800000"/>
+        </a:ln>
+        <a:effectLst/>
+      </dsp:spPr>
+      <dsp:style>
+        <a:lnRef idx="2">
+          <a:scrgbClr r="0" g="0" b="0"/>
+        </a:lnRef>
+        <a:fillRef idx="1">
+          <a:scrgbClr r="0" g="0" b="0"/>
+        </a:fillRef>
+        <a:effectRef idx="0">
+          <a:scrgbClr r="0" g="0" b="0"/>
+        </a:effectRef>
+        <a:fontRef idx="minor"/>
+      </dsp:style>
+      <dsp:txBody>
+        <a:bodyPr spcFirstLastPara="0" vert="horz" wrap="square" lIns="91440" tIns="45720" rIns="91440" bIns="45720" numCol="1" spcCol="1270" anchor="ctr" anchorCtr="0">
+          <a:noAutofit/>
+        </a:bodyPr>
+        <a:lstStyle/>
+        <a:p>
+          <a:pPr marL="228600" lvl="1" indent="-228600" algn="l" defTabSz="1066800">
+            <a:lnSpc>
+              <a:spcPct val="90000"/>
+            </a:lnSpc>
+            <a:spcBef>
+              <a:spcPct val="0"/>
+            </a:spcBef>
+            <a:spcAft>
+              <a:spcPct val="15000"/>
+            </a:spcAft>
+            <a:buChar char="•"/>
+          </a:pPr>
+          <a:r>
+            <a:rPr lang="en-US" sz="2400" kern="1200" dirty="0"/>
+            <a:t>Front End Manager</a:t>
+          </a:r>
+        </a:p>
+      </dsp:txBody>
+      <dsp:txXfrm rot="-5400000">
+        <a:off x="2976227" y="2598863"/>
+        <a:ext cx="5267688" cy="432206"/>
+      </dsp:txXfrm>
+    </dsp:sp>
+    <dsp:sp modelId="{E5DC52BA-BB11-4AB7-B1A3-125FCB11F172}">
+      <dsp:nvSpPr>
+        <dsp:cNvPr id="0" name=""/>
+        <dsp:cNvSpPr/>
+      </dsp:nvSpPr>
+      <dsp:spPr>
+        <a:xfrm>
+          <a:off x="0" y="2515611"/>
+          <a:ext cx="2976226" cy="598710"/>
+        </a:xfrm>
+        <a:prstGeom prst="roundRect">
+          <a:avLst/>
+        </a:prstGeom>
+        <a:solidFill>
+          <a:schemeClr val="accent5">
+            <a:hueOff val="-1208845"/>
+            <a:satOff val="462"/>
+            <a:lumOff val="-5647"/>
+            <a:alphaOff val="0"/>
+          </a:schemeClr>
+        </a:solidFill>
+        <a:ln w="12700" cap="flat" cmpd="sng" algn="ctr">
+          <a:solidFill>
+            <a:schemeClr val="lt1">
+              <a:hueOff val="0"/>
+              <a:satOff val="0"/>
+              <a:lumOff val="0"/>
+              <a:alphaOff val="0"/>
+            </a:schemeClr>
+          </a:solidFill>
+          <a:prstDash val="solid"/>
+          <a:miter lim="800000"/>
+        </a:ln>
+        <a:effectLst/>
+      </dsp:spPr>
+      <dsp:style>
+        <a:lnRef idx="2">
+          <a:scrgbClr r="0" g="0" b="0"/>
+        </a:lnRef>
+        <a:fillRef idx="1">
+          <a:scrgbClr r="0" g="0" b="0"/>
+        </a:fillRef>
+        <a:effectRef idx="0">
+          <a:scrgbClr r="0" g="0" b="0"/>
+        </a:effectRef>
+        <a:fontRef idx="minor">
+          <a:schemeClr val="lt1"/>
+        </a:fontRef>
+      </dsp:style>
+      <dsp:txBody>
+        <a:bodyPr spcFirstLastPara="0" vert="horz" wrap="square" lIns="99060" tIns="49530" rIns="99060" bIns="49530" numCol="1" spcCol="1270" anchor="ctr" anchorCtr="0">
+          <a:noAutofit/>
+        </a:bodyPr>
+        <a:lstStyle/>
+        <a:p>
+          <a:pPr marL="0" lvl="0" indent="0" algn="ctr" defTabSz="1155700">
+            <a:lnSpc>
+              <a:spcPct val="90000"/>
+            </a:lnSpc>
+            <a:spcBef>
+              <a:spcPct val="0"/>
+            </a:spcBef>
+            <a:spcAft>
+              <a:spcPct val="35000"/>
+            </a:spcAft>
+            <a:buNone/>
+          </a:pPr>
+          <a:r>
+            <a:rPr lang="en-US" sz="2600" kern="1200"/>
+            <a:t>Bronwyn Wedig</a:t>
+          </a:r>
+        </a:p>
+      </dsp:txBody>
+      <dsp:txXfrm>
+        <a:off x="29227" y="2544838"/>
+        <a:ext cx="2917772" cy="540256"/>
+      </dsp:txXfrm>
+    </dsp:sp>
+    <dsp:sp modelId="{10024F90-684F-449F-8404-39BCC9105708}">
+      <dsp:nvSpPr>
+        <dsp:cNvPr id="0" name=""/>
+        <dsp:cNvSpPr/>
+      </dsp:nvSpPr>
+      <dsp:spPr>
+        <a:xfrm rot="5400000">
+          <a:off x="5382277" y="798077"/>
+          <a:ext cx="478968" cy="5291069"/>
+        </a:xfrm>
+        <a:prstGeom prst="round2SameRect">
+          <a:avLst/>
+        </a:prstGeom>
+        <a:solidFill>
+          <a:schemeClr val="accent5">
+            <a:tint val="40000"/>
+            <a:alpha val="90000"/>
+            <a:hueOff val="-1701460"/>
+            <a:satOff val="-12497"/>
+            <a:lumOff val="-1415"/>
+            <a:alphaOff val="0"/>
+          </a:schemeClr>
+        </a:solidFill>
+        <a:ln w="12700" cap="flat" cmpd="sng" algn="ctr">
+          <a:solidFill>
+            <a:schemeClr val="accent5">
+              <a:tint val="40000"/>
+              <a:alpha val="90000"/>
+              <a:hueOff val="-1701460"/>
+              <a:satOff val="-12497"/>
+              <a:lumOff val="-1415"/>
+              <a:alphaOff val="0"/>
+            </a:schemeClr>
+          </a:solidFill>
+          <a:prstDash val="solid"/>
+          <a:miter lim="800000"/>
+        </a:ln>
+        <a:effectLst/>
+      </dsp:spPr>
+      <dsp:style>
+        <a:lnRef idx="2">
+          <a:scrgbClr r="0" g="0" b="0"/>
+        </a:lnRef>
+        <a:fillRef idx="1">
+          <a:scrgbClr r="0" g="0" b="0"/>
+        </a:fillRef>
+        <a:effectRef idx="0">
+          <a:scrgbClr r="0" g="0" b="0"/>
+        </a:effectRef>
+        <a:fontRef idx="minor"/>
+      </dsp:style>
+      <dsp:txBody>
+        <a:bodyPr spcFirstLastPara="0" vert="horz" wrap="square" lIns="91440" tIns="45720" rIns="91440" bIns="45720" numCol="1" spcCol="1270" anchor="ctr" anchorCtr="0">
+          <a:noAutofit/>
+        </a:bodyPr>
+        <a:lstStyle/>
+        <a:p>
+          <a:pPr marL="228600" lvl="1" indent="-228600" algn="l" defTabSz="1066800">
+            <a:lnSpc>
+              <a:spcPct val="90000"/>
+            </a:lnSpc>
+            <a:spcBef>
+              <a:spcPct val="0"/>
+            </a:spcBef>
+            <a:spcAft>
+              <a:spcPct val="15000"/>
+            </a:spcAft>
+            <a:buChar char="•"/>
+          </a:pPr>
+          <a:r>
+            <a:rPr lang="en-US" sz="2400" kern="1200" dirty="0"/>
+            <a:t>Project Sponsor</a:t>
+          </a:r>
+        </a:p>
+      </dsp:txBody>
+      <dsp:txXfrm rot="-5400000">
+        <a:off x="2976227" y="3227509"/>
+        <a:ext cx="5267688" cy="432206"/>
+      </dsp:txXfrm>
+    </dsp:sp>
+    <dsp:sp modelId="{3B8DEC48-9274-4000-946D-3F08DF263119}">
+      <dsp:nvSpPr>
+        <dsp:cNvPr id="0" name=""/>
+        <dsp:cNvSpPr/>
+      </dsp:nvSpPr>
+      <dsp:spPr>
+        <a:xfrm>
+          <a:off x="0" y="3144257"/>
+          <a:ext cx="2976226" cy="598710"/>
+        </a:xfrm>
+        <a:prstGeom prst="roundRect">
+          <a:avLst/>
+        </a:prstGeom>
+        <a:solidFill>
+          <a:schemeClr val="accent5">
+            <a:hueOff val="-1511056"/>
+            <a:satOff val="577"/>
+            <a:lumOff val="-7059"/>
+            <a:alphaOff val="0"/>
+          </a:schemeClr>
+        </a:solidFill>
+        <a:ln w="12700" cap="flat" cmpd="sng" algn="ctr">
+          <a:solidFill>
+            <a:schemeClr val="lt1">
+              <a:hueOff val="0"/>
+              <a:satOff val="0"/>
+              <a:lumOff val="0"/>
+              <a:alphaOff val="0"/>
+            </a:schemeClr>
+          </a:solidFill>
+          <a:prstDash val="solid"/>
+          <a:miter lim="800000"/>
+        </a:ln>
+        <a:effectLst/>
+      </dsp:spPr>
+      <dsp:style>
+        <a:lnRef idx="2">
+          <a:scrgbClr r="0" g="0" b="0"/>
+        </a:lnRef>
+        <a:fillRef idx="1">
+          <a:scrgbClr r="0" g="0" b="0"/>
+        </a:fillRef>
+        <a:effectRef idx="0">
+          <a:scrgbClr r="0" g="0" b="0"/>
+        </a:effectRef>
+        <a:fontRef idx="minor">
+          <a:schemeClr val="lt1"/>
+        </a:fontRef>
+      </dsp:style>
+      <dsp:txBody>
+        <a:bodyPr spcFirstLastPara="0" vert="horz" wrap="square" lIns="99060" tIns="49530" rIns="99060" bIns="49530" numCol="1" spcCol="1270" anchor="ctr" anchorCtr="0">
+          <a:noAutofit/>
+        </a:bodyPr>
+        <a:lstStyle/>
+        <a:p>
+          <a:pPr marL="0" lvl="0" indent="0" algn="ctr" defTabSz="1155700">
+            <a:lnSpc>
+              <a:spcPct val="90000"/>
+            </a:lnSpc>
+            <a:spcBef>
+              <a:spcPct val="0"/>
+            </a:spcBef>
+            <a:spcAft>
+              <a:spcPct val="35000"/>
+            </a:spcAft>
+            <a:buNone/>
+          </a:pPr>
+          <a:r>
+            <a:rPr lang="en-US" sz="2600" kern="1200" dirty="0"/>
+            <a:t>Chris </a:t>
+          </a:r>
+          <a:r>
+            <a:rPr lang="en-US" sz="2600" kern="1200" dirty="0" err="1"/>
+            <a:t>Aungst</a:t>
+          </a:r>
+          <a:endParaRPr lang="en-US" sz="2600" kern="1200" dirty="0"/>
+        </a:p>
+      </dsp:txBody>
+      <dsp:txXfrm>
+        <a:off x="29227" y="3173484"/>
+        <a:ext cx="2917772" cy="540256"/>
+      </dsp:txXfrm>
+    </dsp:sp>
+  </dsp:spTree>
+</dsp:drawing>
+</file>
+
+<file path=ppt/diagrams/layout1.xml><?xml version="1.0" encoding="utf-8"?>
+<dgm:layoutDef xmlns:dgm="http://schemas.openxmlformats.org/drawingml/2006/diagram" xmlns:a="http://schemas.openxmlformats.org/drawingml/2006/main" uniqueId="urn:microsoft.com/office/officeart/2005/8/layout/vList5">
+  <dgm:title val=""/>
+  <dgm:desc val=""/>
+  <dgm:catLst>
+    <dgm:cat type="list" pri="15000"/>
+    <dgm:cat type="convert" pri="2000"/>
+  </dgm:catLst>
+  <dgm:sampData>
+    <dgm:dataModel>
+      <dgm:ptLst>
+        <dgm:pt modelId="0" type="doc"/>
+        <dgm:pt modelId="1">
+          <dgm:prSet phldr="1"/>
+        </dgm:pt>
+        <dgm:pt modelId="11">
+          <dgm:prSet phldr="1"/>
+        </dgm:pt>
+        <dgm:pt modelId="12">
+          <dgm:prSet phldr="1"/>
+        </dgm:pt>
+        <dgm:pt modelId="2">
+          <dgm:prSet phldr="1"/>
+        </dgm:pt>
+        <dgm:pt modelId="21">
+          <dgm:prSet phldr="1"/>
+        </dgm:pt>
+        <dgm:pt modelId="22">
+          <dgm:prSet phldr="1"/>
+        </dgm:pt>
+        <dgm:pt modelId="3">
+          <dgm:prSet phldr="1"/>
+        </dgm:pt>
+        <dgm:pt modelId="31">
+          <dgm:prSet phldr="1"/>
+        </dgm:pt>
+        <dgm:pt modelId="32">
+          <dgm:prSet phldr="1"/>
+        </dgm:pt>
+      </dgm:ptLst>
+      <dgm:cxnLst>
+        <dgm:cxn modelId="4" srcId="0" destId="1" srcOrd="0" destOrd="0"/>
+        <dgm:cxn modelId="5" srcId="0" destId="2" srcOrd="1" destOrd="0"/>
+        <dgm:cxn modelId="6" srcId="0" destId="3" srcOrd="2" destOrd="0"/>
+        <dgm:cxn modelId="13" srcId="1" destId="11" srcOrd="0" destOrd="0"/>
+        <dgm:cxn modelId="14" srcId="1" destId="12" srcOrd="1" destOrd="0"/>
+        <dgm:cxn modelId="23" srcId="2" destId="21" srcOrd="0" destOrd="0"/>
+        <dgm:cxn modelId="24" srcId="2" destId="22" srcOrd="1" destOrd="0"/>
+        <dgm:cxn modelId="33" srcId="3" destId="31" srcOrd="0" destOrd="0"/>
+        <dgm:cxn modelId="34" srcId="3" destId="32" srcOrd="1" destOrd="0"/>
+      </dgm:cxnLst>
+      <dgm:bg/>
+      <dgm:whole/>
+    </dgm:dataModel>
+  </dgm:sampData>
+  <dgm:styleData>
+    <dgm:dataModel>
+      <dgm:ptLst>
+        <dgm:pt modelId="0" type="doc"/>
+        <dgm:pt modelId="1"/>
+        <dgm:pt modelId="11"/>
+        <dgm:pt modelId="2"/>
+        <dgm:pt modelId="21"/>
+      </dgm:ptLst>
+      <dgm:cxnLst>
+        <dgm:cxn modelId="4" srcId="0" destId="1" srcOrd="0" destOrd="0"/>
+        <dgm:cxn modelId="5" srcId="0" destId="2" srcOrd="1" destOrd="0"/>
+        <dgm:cxn modelId="13" srcId="1" destId="11" srcOrd="0" destOrd="0"/>
+        <dgm:cxn modelId="23" srcId="2" destId="21" srcOrd="0" destOrd="0"/>
+      </dgm:cxnLst>
+      <dgm:bg/>
+      <dgm:whole/>
+    </dgm:dataModel>
+  </dgm:styleData>
+  <dgm:clrData>
+    <dgm:dataModel>
+      <dgm:ptLst>
+        <dgm:pt modelId="0" type="doc"/>
+        <dgm:pt modelId="1"/>
+        <dgm:pt modelId="11"/>
+        <dgm:pt modelId="2"/>
+        <dgm:pt modelId="21"/>
+        <dgm:pt modelId="3"/>
+        <dgm:pt modelId="31"/>
+        <dgm:pt modelId="4"/>
+        <dgm:pt modelId="41"/>
+      </dgm:ptLst>
+      <dgm:cxnLst>
+        <dgm:cxn modelId="5" srcId="0" destId="1" srcOrd="0" destOrd="0"/>
+        <dgm:cxn modelId="6" srcId="0" destId="2" srcOrd="1" destOrd="0"/>
+        <dgm:cxn modelId="7" srcId="0" destId="3" srcOrd="2" destOrd="0"/>
+        <dgm:cxn modelId="8" srcId="0" destId="4" srcOrd="3" destOrd="0"/>
+        <dgm:cxn modelId="13" srcId="1" destId="11" srcOrd="0" destOrd="0"/>
+        <dgm:cxn modelId="23" srcId="2" destId="21" srcOrd="0" destOrd="0"/>
+        <dgm:cxn modelId="33" srcId="3" destId="31" srcOrd="0" destOrd="0"/>
+        <dgm:cxn modelId="43" srcId="4" destId="41" srcOrd="0" destOrd="0"/>
+      </dgm:cxnLst>
+      <dgm:bg/>
+      <dgm:whole/>
+    </dgm:dataModel>
+  </dgm:clrData>
+  <dgm:layoutNode name="Name0">
+    <dgm:varLst>
+      <dgm:dir/>
+      <dgm:animLvl val="lvl"/>
+      <dgm:resizeHandles val="exact"/>
+    </dgm:varLst>
+    <dgm:choose name="Name1">
+      <dgm:if name="Name2" func="var" arg="dir" op="equ" val="norm">
+        <dgm:alg type="lin">
+          <dgm:param type="linDir" val="fromT"/>
+          <dgm:param type="nodeHorzAlign" val="l"/>
+        </dgm:alg>
+      </dgm:if>
+      <dgm:else name="Name3">
+        <dgm:alg type="lin">
+          <dgm:param type="linDir" val="fromT"/>
+          <dgm:param type="nodeHorzAlign" val="r"/>
+        </dgm:alg>
+      </dgm:else>
+    </dgm:choose>
+    <dgm:shape xmlns:r="http://schemas.openxmlformats.org/officeDocument/2006/relationships" r:blip="">
+      <dgm:adjLst/>
+    </dgm:shape>
+    <dgm:presOf/>
+    <dgm:constrLst>
+      <dgm:constr type="h" for="ch" forName="linNode" refType="h"/>
+      <dgm:constr type="w" for="ch" forName="linNode" refType="w"/>
+      <dgm:constr type="h" for="ch" forName="sp" refType="h" fact="0.05"/>
+      <dgm:constr type="primFontSz" for="des" forName="parentText" op="equ" val="65"/>
+      <dgm:constr type="secFontSz" for="des" forName="descendantText" op="equ"/>
+    </dgm:constrLst>
+    <dgm:ruleLst/>
+    <dgm:forEach name="Name4" axis="ch" ptType="node">
+      <dgm:layoutNode name="linNode">
+        <dgm:choose name="Name5">
+          <dgm:if name="Name6" func="var" arg="dir" op="equ" val="norm">
+            <dgm:alg type="lin">
+              <dgm:param type="linDir" val="fromL"/>
+            </dgm:alg>
+          </dgm:if>
+          <dgm:else name="Name7">
+            <dgm:alg type="lin">
+              <dgm:param type="linDir" val="fromR"/>
+            </dgm:alg>
+          </dgm:else>
+        </dgm:choose>
+        <dgm:shape xmlns:r="http://schemas.openxmlformats.org/officeDocument/2006/relationships" r:blip="">
+          <dgm:adjLst/>
+        </dgm:shape>
+        <dgm:presOf/>
+        <dgm:constrLst>
+          <dgm:constr type="w" for="ch" forName="parentText" refType="w" fact="0.36"/>
+          <dgm:constr type="w" for="ch" forName="descendantText" refType="w" fact="0.64"/>
+          <dgm:constr type="h" for="ch" forName="parentText" refType="h"/>
+          <dgm:constr type="h" for="ch" forName="descendantText" refType="h" refFor="ch" refForName="parentText" fact="0.8"/>
+        </dgm:constrLst>
+        <dgm:ruleLst/>
+        <dgm:layoutNode name="parentText">
+          <dgm:varLst>
+            <dgm:chMax val="1"/>
+            <dgm:bulletEnabled val="1"/>
+          </dgm:varLst>
+          <dgm:alg type="tx"/>
+          <dgm:shape xmlns:r="http://schemas.openxmlformats.org/officeDocument/2006/relationships" type="roundRect" r:blip="" zOrderOff="3">
+            <dgm:adjLst/>
+          </dgm:shape>
+          <dgm:presOf axis="self" ptType="node"/>
+          <dgm:constrLst>
+            <dgm:constr type="tMarg" refType="primFontSz" fact="0.15"/>
+            <dgm:constr type="bMarg" refType="primFontSz" fact="0.15"/>
+            <dgm:constr type="lMarg" refType="primFontSz" fact="0.3"/>
+            <dgm:constr type="rMarg" refType="primFontSz" fact="0.3"/>
+          </dgm:constrLst>
+          <dgm:ruleLst>
+            <dgm:rule type="primFontSz" val="5" fact="NaN" max="NaN"/>
+          </dgm:ruleLst>
+        </dgm:layoutNode>
+        <dgm:choose name="Name8">
+          <dgm:if name="Name9" axis="ch" ptType="node" func="cnt" op="gte" val="1">
+            <dgm:layoutNode name="descendantText" styleLbl="alignAccFollowNode1">
+              <dgm:varLst>
+                <dgm:bulletEnabled val="1"/>
+              </dgm:varLst>
+              <dgm:alg type="tx">
+                <dgm:param type="stBulletLvl" val="1"/>
+                <dgm:param type="txAnchorVertCh" val="mid"/>
+              </dgm:alg>
+              <dgm:choose name="Name10">
+                <dgm:if name="Name11" func="var" arg="dir" op="equ" val="norm">
+                  <dgm:shape xmlns:r="http://schemas.openxmlformats.org/officeDocument/2006/relationships" rot="90" type="round2SameRect" r:blip="">
+                    <dgm:adjLst/>
+                  </dgm:shape>
+                </dgm:if>
+                <dgm:else name="Name12">
+                  <dgm:shape xmlns:r="http://schemas.openxmlformats.org/officeDocument/2006/relationships" rot="-90" type="round2SameRect" r:blip="">
+                    <dgm:adjLst/>
+                  </dgm:shape>
+                </dgm:else>
+              </dgm:choose>
+              <dgm:presOf axis="des" ptType="node"/>
+              <dgm:constrLst>
+                <dgm:constr type="secFontSz" val="65"/>
+                <dgm:constr type="primFontSz" refType="secFontSz"/>
+                <dgm:constr type="lMarg" refType="secFontSz" fact="0.3"/>
+                <dgm:constr type="rMarg" refType="secFontSz" fact="0.3"/>
+                <dgm:constr type="tMarg" refType="secFontSz" fact="0.15"/>
+                <dgm:constr type="bMarg" refType="secFontSz" fact="0.15"/>
+              </dgm:constrLst>
+              <dgm:ruleLst>
+                <dgm:rule type="secFontSz" val="5" fact="NaN" max="NaN"/>
+              </dgm:ruleLst>
+            </dgm:layoutNode>
+          </dgm:if>
+          <dgm:else name="Name13"/>
+        </dgm:choose>
+      </dgm:layoutNode>
+      <dgm:forEach name="Name14" axis="followSib" ptType="sibTrans" cnt="1">
+        <dgm:layoutNode name="sp">
+          <dgm:alg type="sp"/>
+          <dgm:shape xmlns:r="http://schemas.openxmlformats.org/officeDocument/2006/relationships" r:blip="">
+            <dgm:adjLst/>
+          </dgm:shape>
+          <dgm:presOf/>
+          <dgm:constrLst/>
+          <dgm:ruleLst/>
+        </dgm:layoutNode>
+      </dgm:forEach>
+    </dgm:forEach>
+  </dgm:layoutNode>
+</dgm:layoutDef>
+</file>
+
+<file path=ppt/diagrams/quickStyle1.xml><?xml version="1.0" encoding="utf-8"?>
+<dgm:styleDef xmlns:dgm="http://schemas.openxmlformats.org/drawingml/2006/diagram" xmlns:a="http://schemas.openxmlformats.org/drawingml/2006/main" uniqueId="urn:microsoft.com/office/officeart/2005/8/quickstyle/simple1">
+  <dgm:title val=""/>
+  <dgm:desc val=""/>
+  <dgm:catLst>
+    <dgm:cat type="simple" pri="10100"/>
+  </dgm:catLst>
+  <dgm:scene3d>
+    <a:camera prst="orthographicFront"/>
+    <a:lightRig rig="threePt" dir="t"/>
+  </dgm:scene3d>
+  <dgm:styleLbl name="node0">
+    <dgm:scene3d>
+      <a:camera prst="orthographicFront"/>
+      <a:lightRig rig="threePt" dir="t"/>
+    </dgm:scene3d>
+    <dgm:sp3d/>
+    <dgm:txPr/>
+    <dgm:style>
+      <a:lnRef idx="2">
+        <a:scrgbClr r="0" g="0" b="0"/>
+      </a:lnRef>
+      <a:fillRef idx="1">
+        <a:scrgbClr r="0" g="0" b="0"/>
+      </a:fillRef>
+      <a:effectRef idx="0">
+        <a:scrgbClr r="0" g="0" b="0"/>
+      </a:effectRef>
+      <a:fontRef idx="minor">
+        <a:schemeClr val="lt1"/>
+      </a:fontRef>
+    </dgm:style>
+  </dgm:styleLbl>
+  <dgm:styleLbl name="lnNode1">
+    <dgm:scene3d>
+      <a:camera prst="orthographicFront"/>
+      <a:lightRig rig="threePt" dir="t"/>
+    </dgm:scene3d>
+    <dgm:sp3d/>
+    <dgm:txPr/>
+    <dgm:style>
+      <a:lnRef idx="2">
+        <a:scrgbClr r="0" g="0" b="0"/>
+      </a:lnRef>
+      <a:fillRef idx="1">
+        <a:scrgbClr r="0" g="0" b="0"/>
+      </a:fillRef>
+      <a:effectRef idx="0">
+        <a:scrgbClr r="0" g="0" b="0"/>
+      </a:effectRef>
+      <a:fontRef idx="minor">
+        <a:schemeClr val="lt1"/>
+      </a:fontRef>
+    </dgm:style>
+  </dgm:styleLbl>
+  <dgm:styleLbl name="vennNode1">
+    <dgm:scene3d>
+      <a:camera prst="orthographicFront"/>
+      <a:lightRig rig="threePt" dir="t"/>
+    </dgm:scene3d>
+    <dgm:sp3d/>
+    <dgm:txPr/>
+    <dgm:style>
+      <a:lnRef idx="2">
+        <a:scrgbClr r="0" g="0" b="0"/>
+      </a:lnRef>
+      <a:fillRef idx="1">
+        <a:scrgbClr r="0" g="0" b="0"/>
+      </a:fillRef>
+      <a:effectRef idx="0">
+        <a:scrgbClr r="0" g="0" b="0"/>
+      </a:effectRef>
+      <a:fontRef idx="minor">
+        <a:schemeClr val="tx1"/>
+      </a:fontRef>
+    </dgm:style>
+  </dgm:styleLbl>
+  <dgm:styleLbl name="alignNode1">
+    <dgm:scene3d>
+      <a:camera prst="orthographicFront"/>
+      <a:lightRig rig="threePt" dir="t"/>
+    </dgm:scene3d>
+    <dgm:sp3d/>
+    <dgm:txPr/>
+    <dgm:style>
+      <a:lnRef idx="2">
+        <a:scrgbClr r="0" g="0" b="0"/>
+      </a:lnRef>
+      <a:fillRef idx="1">
+        <a:scrgbClr r="0" g="0" b="0"/>
+      </a:fillRef>
+      <a:effectRef idx="0">
+        <a:scrgbClr r="0" g="0" b="0"/>
+      </a:effectRef>
+      <a:fontRef idx="minor">
+        <a:schemeClr val="lt1"/>
+      </a:fontRef>
+    </dgm:style>
+  </dgm:styleLbl>
+  <dgm:styleLbl name="node1">
+    <dgm:scene3d>
+      <a:camera prst="orthographicFront"/>
+      <a:lightRig rig="threePt" dir="t"/>
+    </dgm:scene3d>
+    <dgm:sp3d/>
+    <dgm:txPr/>
+    <dgm:style>
+      <a:lnRef idx="2">
+        <a:scrgbClr r="0" g="0" b="0"/>
+      </a:lnRef>
+      <a:fillRef idx="1">
+        <a:scrgbClr r="0" g="0" b="0"/>
+      </a:fillRef>
+      <a:effectRef idx="0">
+        <a:scrgbClr r="0" g="0" b="0"/>
+      </a:effectRef>
+      <a:fontRef idx="minor">
+        <a:schemeClr val="lt1"/>
+      </a:fontRef>
+    </dgm:style>
+  </dgm:styleLbl>
+  <dgm:styleLbl name="node2">
+    <dgm:scene3d>
+      <a:camera prst="orthographicFront"/>
+      <a:lightRig rig="threePt" dir="t"/>
+    </dgm:scene3d>
+    <dgm:sp3d/>
+    <dgm:txPr/>
+    <dgm:style>
+      <a:lnRef idx="2">
+        <a:scrgbClr r="0" g="0" b="0"/>
+      </a:lnRef>
+      <a:fillRef idx="1">
+        <a:scrgbClr r="0" g="0" b="0"/>
+      </a:fillRef>
+      <a:effectRef idx="0">
+        <a:scrgbClr r="0" g="0" b="0"/>
+      </a:effectRef>
+      <a:fontRef idx="minor">
+        <a:schemeClr val="lt1"/>
+      </a:fontRef>
+    </dgm:style>
+  </dgm:styleLbl>
+  <dgm:styleLbl name="node3">
+    <dgm:scene3d>
+      <a:camera prst="orthographicFront"/>
+      <a:lightRig rig="threePt" dir="t"/>
+    </dgm:scene3d>
+    <dgm:sp3d/>
+    <dgm:txPr/>
+    <dgm:style>
+      <a:lnRef idx="2">
+        <a:scrgbClr r="0" g="0" b="0"/>
+      </a:lnRef>
+      <a:fillRef idx="1">
+        <a:scrgbClr r="0" g="0" b="0"/>
+      </a:fillRef>
+      <a:effectRef idx="0">
+        <a:scrgbClr r="0" g="0" b="0"/>
+      </a:effectRef>
+      <a:fontRef idx="minor">
+        <a:schemeClr val="lt1"/>
+      </a:fontRef>
+    </dgm:style>
+  </dgm:styleLbl>
+  <dgm:styleLbl name="node4">
+    <dgm:scene3d>
+      <a:camera prst="orthographicFront"/>
+      <a:lightRig rig="threePt" dir="t"/>
+    </dgm:scene3d>
+    <dgm:sp3d/>
+    <dgm:txPr/>
+    <dgm:style>
+      <a:lnRef idx="2">
+        <a:scrgbClr r="0" g="0" b="0"/>
+      </a:lnRef>
+      <a:fillRef idx="1">
+        <a:scrgbClr r="0" g="0" b="0"/>
+      </a:fillRef>
+      <a:effectRef idx="0">
+        <a:scrgbClr r="0" g="0" b="0"/>
+      </a:effectRef>
+      <a:fontRef idx="minor">
+        <a:schemeClr val="lt1"/>
+      </a:fontRef>
+    </dgm:style>
+  </dgm:styleLbl>
+  <dgm:styleLbl name="fgImgPlace1">
+    <dgm:scene3d>
+      <a:camera prst="orthographicFront"/>
+      <a:lightRig rig="threePt" dir="t"/>
+    </dgm:scene3d>
+    <dgm:sp3d/>
+    <dgm:txPr/>
+    <dgm:style>
+      <a:lnRef idx="2">
+        <a:scrgbClr r="0" g="0" b="0"/>
+      </a:lnRef>
+      <a:fillRef idx="1">
+        <a:scrgbClr r="0" g="0" b="0"/>
+      </a:fillRef>
+      <a:effectRef idx="0">
+        <a:scrgbClr r="0" g="0" b="0"/>
+      </a:effectRef>
+      <a:fontRef idx="minor"/>
+    </dgm:style>
+  </dgm:styleLbl>
+  <dgm:styleLbl name="alignImgPlace1">
+    <dgm:scene3d>
+      <a:camera prst="orthographicFront"/>
+      <a:lightRig rig="threePt" dir="t"/>
+    </dgm:scene3d>
+    <dgm:sp3d/>
+    <dgm:txPr/>
+    <dgm:style>
+      <a:lnRef idx="2">
+        <a:scrgbClr r="0" g="0" b="0"/>
+      </a:lnRef>
+      <a:fillRef idx="1">
+        <a:scrgbClr r="0" g="0" b="0"/>
+      </a:fillRef>
+      <a:effectRef idx="0">
+        <a:scrgbClr r="0" g="0" b="0"/>
+      </a:effectRef>
+      <a:fontRef idx="minor"/>
+    </dgm:style>
+  </dgm:styleLbl>
+  <dgm:styleLbl name="bgImgPlace1">
+    <dgm:scene3d>
+      <a:camera prst="orthographicFront"/>
+      <a:lightRig rig="threePt" dir="t"/>
+    </dgm:scene3d>
+    <dgm:sp3d/>
+    <dgm:txPr/>
+    <dgm:style>
+      <a:lnRef idx="2">
+        <a:scrgbClr r="0" g="0" b="0"/>
+      </a:lnRef>
+      <a:fillRef idx="1">
+        <a:scrgbClr r="0" g="0" b="0"/>
+      </a:fillRef>
+      <a:effectRef idx="0">
+        <a:scrgbClr r="0" g="0" b="0"/>
+      </a:effectRef>
+      <a:fontRef idx="minor"/>
+    </dgm:style>
+  </dgm:styleLbl>
+  <dgm:styleLbl name="sibTrans2D1">
+    <dgm:scene3d>
+      <a:camera prst="orthographicFront"/>
+      <a:lightRig rig="threePt" dir="t"/>
+    </dgm:scene3d>
+    <dgm:sp3d/>
+    <dgm:txPr/>
+    <dgm:style>
+      <a:lnRef idx="0">
+        <a:scrgbClr r="0" g="0" b="0"/>
+      </a:lnRef>
+      <a:fillRef idx="1">
+        <a:scrgbClr r="0" g="0" b="0"/>
+      </a:fillRef>
+      <a:effectRef idx="0">
+        <a:scrgbClr r="0" g="0" b="0"/>
+      </a:effectRef>
+      <a:fontRef idx="minor">
+        <a:schemeClr val="lt1"/>
+      </a:fontRef>
+    </dgm:style>
+  </dgm:styleLbl>
+  <dgm:styleLbl name="fgSibTrans2D1">
+    <dgm:scene3d>
+      <a:camera prst="orthographicFront"/>
+      <a:lightRig rig="threePt" dir="t"/>
+    </dgm:scene3d>
+    <dgm:sp3d/>
+    <dgm:txPr/>
+    <dgm:style>
+      <a:lnRef idx="0">
+        <a:scrgbClr r="0" g="0" b="0"/>
+      </a:lnRef>
+      <a:fillRef idx="1">
+        <a:scrgbClr r="0" g="0" b="0"/>
+      </a:fillRef>
+      <a:effectRef idx="0">
+        <a:scrgbClr r="0" g="0" b="0"/>
+      </a:effectRef>
+      <a:fontRef idx="minor">
+        <a:schemeClr val="lt1"/>
+      </a:fontRef>
+    </dgm:style>
+  </dgm:styleLbl>
+  <dgm:styleLbl name="bgSibTrans2D1">
+    <dgm:scene3d>
+      <a:camera prst="orthographicFront"/>
+      <a:lightRig rig="threePt" dir="t"/>
+    </dgm:scene3d>
+    <dgm:sp3d/>
+    <dgm:txPr/>
+    <dgm:style>
+      <a:lnRef idx="0">
+        <a:scrgbClr r="0" g="0" b="0"/>
+      </a:lnRef>
+      <a:fillRef idx="1">
+        <a:scrgbClr r="0" g="0" b="0"/>
+      </a:fillRef>
+      <a:effectRef idx="0">
+        <a:scrgbClr r="0" g="0" b="0"/>
+      </a:effectRef>
+      <a:fontRef idx="minor">
+        <a:schemeClr val="lt1"/>
+      </a:fontRef>
+    </dgm:style>
+  </dgm:styleLbl>
+  <dgm:styleLbl name="sibTrans1D1">
+    <dgm:scene3d>
+      <a:camera prst="orthographicFront"/>
+      <a:lightRig rig="threePt" dir="t"/>
+    </dgm:scene3d>
+    <dgm:sp3d/>
+    <dgm:txPr/>
+    <dgm:style>
+      <a:lnRef idx="1">
+        <a:scrgbClr r="0" g="0" b="0"/>
+      </a:lnRef>
+      <a:fillRef idx="0">
+        <a:scrgbClr r="0" g="0" b="0"/>
+      </a:fillRef>
+      <a:effectRef idx="0">
+        <a:scrgbClr r="0" g="0" b="0"/>
+      </a:effectRef>
+      <a:fontRef idx="minor"/>
+    </dgm:style>
+  </dgm:styleLbl>
+  <dgm:styleLbl name="callout">
+    <dgm:scene3d>
+      <a:camera prst="orthographicFront"/>
+      <a:lightRig rig="threePt" dir="t"/>
+    </dgm:scene3d>
+    <dgm:sp3d/>
+    <dgm:txPr/>
+    <dgm:style>
+      <a:lnRef idx="2">
+        <a:scrgbClr r="0" g="0" b="0"/>
+      </a:lnRef>
+      <a:fillRef idx="1">
+        <a:scrgbClr r="0" g="0" b="0"/>
+      </a:fillRef>
+      <a:effectRef idx="0">
+        <a:scrgbClr r="0" g="0" b="0"/>
+      </a:effectRef>
+      <a:fontRef idx="minor"/>
+    </dgm:style>
+  </dgm:styleLbl>
+  <dgm:styleLbl name="asst0">
+    <dgm:scene3d>
+      <a:camera prst="orthographicFront"/>
+      <a:lightRig rig="threePt" dir="t"/>
+    </dgm:scene3d>
+    <dgm:sp3d/>
+    <dgm:txPr/>
+    <dgm:style>
+      <a:lnRef idx="2">
+        <a:scrgbClr r="0" g="0" b="0"/>
+      </a:lnRef>
+      <a:fillRef idx="1">
+        <a:scrgbClr r="0" g="0" b="0"/>
+      </a:fillRef>
+      <a:effectRef idx="0">
+        <a:scrgbClr r="0" g="0" b="0"/>
+      </a:effectRef>
+      <a:fontRef idx="minor">
+        <a:schemeClr val="lt1"/>
+      </a:fontRef>
+    </dgm:style>
+  </dgm:styleLbl>
+  <dgm:styleLbl name="asst1">
+    <dgm:scene3d>
+      <a:camera prst="orthographicFront"/>
+      <a:lightRig rig="threePt" dir="t"/>
+    </dgm:scene3d>
+    <dgm:sp3d/>
+    <dgm:txPr/>
+    <dgm:style>
+      <a:lnRef idx="2">
+        <a:scrgbClr r="0" g="0" b="0"/>
+      </a:lnRef>
+      <a:fillRef idx="1">
+        <a:scrgbClr r="0" g="0" b="0"/>
+      </a:fillRef>
+      <a:effectRef idx="0">
+        <a:scrgbClr r="0" g="0" b="0"/>
+      </a:effectRef>
+      <a:fontRef idx="minor">
+        <a:schemeClr val="lt1"/>
+      </a:fontRef>
+    </dgm:style>
+  </dgm:styleLbl>
+  <dgm:styleLbl name="asst2">
+    <dgm:scene3d>
+      <a:camera prst="orthographicFront"/>
+      <a:lightRig rig="threePt" dir="t"/>
+    </dgm:scene3d>
+    <dgm:sp3d/>
+    <dgm:txPr/>
+    <dgm:style>
+      <a:lnRef idx="2">
+        <a:scrgbClr r="0" g="0" b="0"/>
+      </a:lnRef>
+      <a:fillRef idx="1">
+        <a:scrgbClr r="0" g="0" b="0"/>
+      </a:fillRef>
+      <a:effectRef idx="0">
+        <a:scrgbClr r="0" g="0" b="0"/>
+      </a:effectRef>
+      <a:fontRef idx="minor">
+        <a:schemeClr val="lt1"/>
+      </a:fontRef>
+    </dgm:style>
+  </dgm:styleLbl>
+  <dgm:styleLbl name="asst3">
+    <dgm:scene3d>
+      <a:camera prst="orthographicFront"/>
+      <a:lightRig rig="threePt" dir="t"/>
+    </dgm:scene3d>
+    <dgm:sp3d/>
+    <dgm:txPr/>
+    <dgm:style>
+      <a:lnRef idx="2">
+        <a:scrgbClr r="0" g="0" b="0"/>
+      </a:lnRef>
+      <a:fillRef idx="1">
+        <a:scrgbClr r="0" g="0" b="0"/>
+      </a:fillRef>
+      <a:effectRef idx="0">
+        <a:scrgbClr r="0" g="0" b="0"/>
+      </a:effectRef>
+      <a:fontRef idx="minor">
+        <a:schemeClr val="lt1"/>
+      </a:fontRef>
+    </dgm:style>
+  </dgm:styleLbl>
+  <dgm:styleLbl name="asst4">
+    <dgm:scene3d>
+      <a:camera prst="orthographicFront"/>
+      <a:lightRig rig="threePt" dir="t"/>
+    </dgm:scene3d>
+    <dgm:sp3d/>
+    <dgm:txPr/>
+    <dgm:style>
+      <a:lnRef idx="2">
+        <a:scrgbClr r="0" g="0" b="0"/>
+      </a:lnRef>
+      <a:fillRef idx="1">
+        <a:scrgbClr r="0" g="0" b="0"/>
+      </a:fillRef>
+      <a:effectRef idx="0">
+        <a:scrgbClr r="0" g="0" b="0"/>
+      </a:effectRef>
+      <a:fontRef idx="minor">
+        <a:schemeClr val="lt1"/>
+      </a:fontRef>
+    </dgm:style>
+  </dgm:styleLbl>
+  <dgm:styleLbl name="parChTrans2D1">
+    <dgm:scene3d>
+      <a:camera prst="orthographicFront"/>
+      <a:lightRig rig="threePt" dir="t"/>
+    </dgm:scene3d>
+    <dgm:sp3d/>
+    <dgm:txPr/>
+    <dgm:style>
+      <a:lnRef idx="2">
+        <a:scrgbClr r="0" g="0" b="0"/>
+      </a:lnRef>
+      <a:fillRef idx="1">
+        <a:scrgbClr r="0" g="0" b="0"/>
+      </a:fillRef>
+      <a:effectRef idx="0">
+        <a:scrgbClr r="0" g="0" b="0"/>
+      </a:effectRef>
+      <a:fontRef idx="minor">
+        <a:schemeClr val="lt1"/>
+      </a:fontRef>
+    </dgm:style>
+  </dgm:styleLbl>
+  <dgm:styleLbl name="parChTrans2D2">
+    <dgm:scene3d>
+      <a:camera prst="orthographicFront"/>
+      <a:lightRig rig="threePt" dir="t"/>
+    </dgm:scene3d>
+    <dgm:sp3d/>
+    <dgm:txPr/>
+    <dgm:style>
+      <a:lnRef idx="2">
+        <a:scrgbClr r="0" g="0" b="0"/>
+      </a:lnRef>
+      <a:fillRef idx="1">
+        <a:scrgbClr r="0" g="0" b="0"/>
+      </a:fillRef>
+      <a:effectRef idx="0">
+        <a:scrgbClr r="0" g="0" b="0"/>
+      </a:effectRef>
+      <a:fontRef idx="minor">
+        <a:schemeClr val="lt1"/>
+      </a:fontRef>
+    </dgm:style>
+  </dgm:styleLbl>
+  <dgm:styleLbl name="parChTrans2D3">
+    <dgm:scene3d>
+      <a:camera prst="orthographicFront"/>
+      <a:lightRig rig="threePt" dir="t"/>
+    </dgm:scene3d>
+    <dgm:sp3d/>
+    <dgm:txPr/>
+    <dgm:style>
+      <a:lnRef idx="2">
+        <a:scrgbClr r="0" g="0" b="0"/>
+      </a:lnRef>
+      <a:fillRef idx="1">
+        <a:scrgbClr r="0" g="0" b="0"/>
+      </a:fillRef>
+      <a:effectRef idx="0">
+        <a:scrgbClr r="0" g="0" b="0"/>
+      </a:effectRef>
+      <a:fontRef idx="minor">
+        <a:schemeClr val="lt1"/>
+      </a:fontRef>
+    </dgm:style>
+  </dgm:styleLbl>
+  <dgm:styleLbl name="parChTrans2D4">
+    <dgm:scene3d>
+      <a:camera prst="orthographicFront"/>
+      <a:lightRig rig="threePt" dir="t"/>
+    </dgm:scene3d>
+    <dgm:sp3d/>
+    <dgm:txPr/>
+    <dgm:style>
+      <a:lnRef idx="2">
+        <a:scrgbClr r="0" g="0" b="0"/>
+      </a:lnRef>
+      <a:fillRef idx="1">
+        <a:scrgbClr r="0" g="0" b="0"/>
+      </a:fillRef>
+      <a:effectRef idx="0">
+        <a:scrgbClr r="0" g="0" b="0"/>
+      </a:effectRef>
+      <a:fontRef idx="minor">
+        <a:schemeClr val="lt1"/>
+      </a:fontRef>
+    </dgm:style>
+  </dgm:styleLbl>
+  <dgm:styleLbl name="parChTrans1D1">
+    <dgm:scene3d>
+      <a:camera prst="orthographicFront"/>
+      <a:lightRig rig="threePt" dir="t"/>
+    </dgm:scene3d>
+    <dgm:sp3d/>
+    <dgm:txPr/>
+    <dgm:style>
+      <a:lnRef idx="2">
+        <a:scrgbClr r="0" g="0" b="0"/>
+      </a:lnRef>
+      <a:fillRef idx="0">
+        <a:scrgbClr r="0" g="0" b="0"/>
+      </a:fillRef>
+      <a:effectRef idx="0">
+        <a:scrgbClr r="0" g="0" b="0"/>
+      </a:effectRef>
+      <a:fontRef idx="minor"/>
+    </dgm:style>
+  </dgm:styleLbl>
+  <dgm:styleLbl name="parChTrans1D2">
+    <dgm:scene3d>
+      <a:camera prst="orthographicFront"/>
+      <a:lightRig rig="threePt" dir="t"/>
+    </dgm:scene3d>
+    <dgm:sp3d/>
+    <dgm:txPr/>
+    <dgm:style>
+      <a:lnRef idx="2">
+        <a:scrgbClr r="0" g="0" b="0"/>
+      </a:lnRef>
+      <a:fillRef idx="0">
+        <a:scrgbClr r="0" g="0" b="0"/>
+      </a:fillRef>
+      <a:effectRef idx="0">
+        <a:scrgbClr r="0" g="0" b="0"/>
+      </a:effectRef>
+      <a:fontRef idx="minor"/>
+    </dgm:style>
+  </dgm:styleLbl>
+  <dgm:styleLbl name="parChTrans1D3">
+    <dgm:scene3d>
+      <a:camera prst="orthographicFront"/>
+      <a:lightRig rig="threePt" dir="t"/>
+    </dgm:scene3d>
+    <dgm:sp3d/>
+    <dgm:txPr/>
+    <dgm:style>
+      <a:lnRef idx="2">
+        <a:scrgbClr r="0" g="0" b="0"/>
+      </a:lnRef>
+      <a:fillRef idx="0">
+        <a:scrgbClr r="0" g="0" b="0"/>
+      </a:fillRef>
+      <a:effectRef idx="0">
+        <a:scrgbClr r="0" g="0" b="0"/>
+      </a:effectRef>
+      <a:fontRef idx="minor"/>
+    </dgm:style>
+  </dgm:styleLbl>
+  <dgm:styleLbl name="parChTrans1D4">
+    <dgm:scene3d>
+      <a:camera prst="orthographicFront"/>
+      <a:lightRig rig="threePt" dir="t"/>
+    </dgm:scene3d>
+    <dgm:sp3d/>
+    <dgm:txPr/>
+    <dgm:style>
+      <a:lnRef idx="2">
+        <a:scrgbClr r="0" g="0" b="0"/>
+      </a:lnRef>
+      <a:fillRef idx="0">
+        <a:scrgbClr r="0" g="0" b="0"/>
+      </a:fillRef>
+      <a:effectRef idx="0">
+        <a:scrgbClr r="0" g="0" b="0"/>
+      </a:effectRef>
+      <a:fontRef idx="minor"/>
+    </dgm:style>
+  </dgm:styleLbl>
+  <dgm:styleLbl name="fgAcc1">
+    <dgm:scene3d>
+      <a:camera prst="orthographicFront"/>
+      <a:lightRig rig="threePt" dir="t"/>
+    </dgm:scene3d>
+    <dgm:sp3d/>
+    <dgm:txPr/>
+    <dgm:style>
+      <a:lnRef idx="2">
+        <a:scrgbClr r="0" g="0" b="0"/>
+      </a:lnRef>
+      <a:fillRef idx="1">
+        <a:scrgbClr r="0" g="0" b="0"/>
+      </a:fillRef>
+      <a:effectRef idx="0">
+        <a:scrgbClr r="0" g="0" b="0"/>
+      </a:effectRef>
+      <a:fontRef idx="minor"/>
+    </dgm:style>
+  </dgm:styleLbl>
+  <dgm:styleLbl name="conFgAcc1">
+    <dgm:scene3d>
+      <a:camera prst="orthographicFront"/>
+      <a:lightRig rig="threePt" dir="t"/>
+    </dgm:scene3d>
+    <dgm:sp3d/>
+    <dgm:txPr/>
+    <dgm:style>
+      <a:lnRef idx="2">
+        <a:scrgbClr r="0" g="0" b="0"/>
+      </a:lnRef>
+      <a:fillRef idx="1">
+        <a:scrgbClr r="0" g="0" b="0"/>
+      </a:fillRef>
+      <a:effectRef idx="0">
+        <a:scrgbClr r="0" g="0" b="0"/>
+      </a:effectRef>
+      <a:fontRef idx="minor"/>
+    </dgm:style>
+  </dgm:styleLbl>
+  <dgm:styleLbl name="alignAcc1">
+    <dgm:scene3d>
+      <a:camera prst="orthographicFront"/>
+      <a:lightRig rig="threePt" dir="t"/>
+    </dgm:scene3d>
+    <dgm:sp3d/>
+    <dgm:txPr/>
+    <dgm:style>
+      <a:lnRef idx="2">
+        <a:scrgbClr r="0" g="0" b="0"/>
+      </a:lnRef>
+      <a:fillRef idx="1">
+        <a:scrgbClr r="0" g="0" b="0"/>
+      </a:fillRef>
+      <a:effectRef idx="0">
+        <a:scrgbClr r="0" g="0" b="0"/>
+      </a:effectRef>
+      <a:fontRef idx="minor"/>
+    </dgm:style>
+  </dgm:styleLbl>
+  <dgm:styleLbl name="trAlignAcc1">
+    <dgm:scene3d>
+      <a:camera prst="orthographicFront"/>
+      <a:lightRig rig="threePt" dir="t"/>
+    </dgm:scene3d>
+    <dgm:sp3d/>
+    <dgm:txPr/>
+    <dgm:style>
+      <a:lnRef idx="1">
+        <a:scrgbClr r="0" g="0" b="0"/>
+      </a:lnRef>
+      <a:fillRef idx="1">
+        <a:scrgbClr r="0" g="0" b="0"/>
+      </a:fillRef>
+      <a:effectRef idx="0">
+        <a:scrgbClr r="0" g="0" b="0"/>
+      </a:effectRef>
+      <a:fontRef idx="minor"/>
+    </dgm:style>
+  </dgm:styleLbl>
+  <dgm:styleLbl name="bgAcc1">
+    <dgm:scene3d>
+      <a:camera prst="orthographicFront"/>
+      <a:lightRig rig="threePt" dir="t"/>
+    </dgm:scene3d>
+    <dgm:sp3d/>
+    <dgm:txPr/>
+    <dgm:style>
+      <a:lnRef idx="2">
+        <a:scrgbClr r="0" g="0" b="0"/>
+      </a:lnRef>
+      <a:fillRef idx="1">
+        <a:scrgbClr r="0" g="0" b="0"/>
+      </a:fillRef>
+      <a:effectRef idx="0">
+        <a:scrgbClr r="0" g="0" b="0"/>
+      </a:effectRef>
+      <a:fontRef idx="minor"/>
+    </dgm:style>
+  </dgm:styleLbl>
+  <dgm:styleLbl name="solidFgAcc1">
+    <dgm:scene3d>
+      <a:camera prst="orthographicFront"/>
+      <a:lightRig rig="threePt" dir="t"/>
+    </dgm:scene3d>
+    <dgm:sp3d/>
+    <dgm:txPr/>
+    <dgm:style>
+      <a:lnRef idx="2">
+        <a:scrgbClr r="0" g="0" b="0"/>
+      </a:lnRef>
+      <a:fillRef idx="1">
+        <a:scrgbClr r="0" g="0" b="0"/>
+      </a:fillRef>
+      <a:effectRef idx="0">
+        <a:scrgbClr r="0" g="0" b="0"/>
+      </a:effectRef>
+      <a:fontRef idx="minor"/>
+    </dgm:style>
+  </dgm:styleLbl>
+  <dgm:styleLbl name="solidAlignAcc1">
+    <dgm:scene3d>
+      <a:camera prst="orthographicFront"/>
+      <a:lightRig rig="threePt" dir="t"/>
+    </dgm:scene3d>
+    <dgm:sp3d/>
+    <dgm:txPr/>
+    <dgm:style>
+      <a:lnRef idx="2">
+        <a:scrgbClr r="0" g="0" b="0"/>
+      </a:lnRef>
+      <a:fillRef idx="1">
+        <a:scrgbClr r="0" g="0" b="0"/>
+      </a:fillRef>
+      <a:effectRef idx="0">
+        <a:scrgbClr r="0" g="0" b="0"/>
+      </a:effectRef>
+      <a:fontRef idx="minor"/>
+    </dgm:style>
+  </dgm:styleLbl>
+  <dgm:styleLbl name="solidBgAcc1">
+    <dgm:scene3d>
+      <a:camera prst="orthographicFront"/>
+      <a:lightRig rig="threePt" dir="t"/>
+    </dgm:scene3d>
+    <dgm:sp3d/>
+    <dgm:txPr/>
+    <dgm:style>
+      <a:lnRef idx="2">
+        <a:scrgbClr r="0" g="0" b="0"/>
+      </a:lnRef>
+      <a:fillRef idx="1">
+        <a:scrgbClr r="0" g="0" b="0"/>
+      </a:fillRef>
+      <a:effectRef idx="0">
+        <a:scrgbClr r="0" g="0" b="0"/>
+      </a:effectRef>
+      <a:fontRef idx="minor"/>
+    </dgm:style>
+  </dgm:styleLbl>
+  <dgm:styleLbl name="fgAccFollowNode1">
+    <dgm:scene3d>
+      <a:camera prst="orthographicFront"/>
+      <a:lightRig rig="threePt" dir="t"/>
+    </dgm:scene3d>
+    <dgm:sp3d/>
+    <dgm:txPr/>
+    <dgm:style>
+      <a:lnRef idx="2">
+        <a:scrgbClr r="0" g="0" b="0"/>
+      </a:lnRef>
+      <a:fillRef idx="1">
+        <a:scrgbClr r="0" g="0" b="0"/>
+      </a:fillRef>
+      <a:effectRef idx="0">
+        <a:scrgbClr r="0" g="0" b="0"/>
+      </a:effectRef>
+      <a:fontRef idx="minor"/>
+    </dgm:style>
+  </dgm:styleLbl>
+  <dgm:styleLbl name="alignAccFollowNode1">
+    <dgm:scene3d>
+      <a:camera prst="orthographicFront"/>
+      <a:lightRig rig="threePt" dir="t"/>
+    </dgm:scene3d>
+    <dgm:sp3d/>
+    <dgm:txPr/>
+    <dgm:style>
+      <a:lnRef idx="2">
+        <a:scrgbClr r="0" g="0" b="0"/>
+      </a:lnRef>
+      <a:fillRef idx="1">
+        <a:scrgbClr r="0" g="0" b="0"/>
+      </a:fillRef>
+      <a:effectRef idx="0">
+        <a:scrgbClr r="0" g="0" b="0"/>
+      </a:effectRef>
+      <a:fontRef idx="minor"/>
+    </dgm:style>
+  </dgm:styleLbl>
+  <dgm:styleLbl name="bgAccFollowNode1">
+    <dgm:scene3d>
+      <a:camera prst="orthographicFront"/>
+      <a:lightRig rig="threePt" dir="t"/>
+    </dgm:scene3d>
+    <dgm:sp3d/>
+    <dgm:txPr/>
+    <dgm:style>
+      <a:lnRef idx="2">
+        <a:scrgbClr r="0" g="0" b="0"/>
+      </a:lnRef>
+      <a:fillRef idx="1">
+        <a:scrgbClr r="0" g="0" b="0"/>
+      </a:fillRef>
+      <a:effectRef idx="0">
+        <a:scrgbClr r="0" g="0" b="0"/>
+      </a:effectRef>
+      <a:fontRef idx="minor"/>
+    </dgm:style>
+  </dgm:styleLbl>
+  <dgm:styleLbl name="fgAcc0">
+    <dgm:scene3d>
+      <a:camera prst="orthographicFront"/>
+      <a:lightRig rig="threePt" dir="t"/>
+    </dgm:scene3d>
+    <dgm:sp3d/>
+    <dgm:txPr/>
+    <dgm:style>
+      <a:lnRef idx="2">
+        <a:scrgbClr r="0" g="0" b="0"/>
+      </a:lnRef>
+      <a:fillRef idx="1">
+        <a:scrgbClr r="0" g="0" b="0"/>
+      </a:fillRef>
+      <a:effectRef idx="0">
+        <a:scrgbClr r="0" g="0" b="0"/>
+      </a:effectRef>
+      <a:fontRef idx="minor"/>
+    </dgm:style>
+  </dgm:styleLbl>
+  <dgm:styleLbl name="fgAcc2">
+    <dgm:scene3d>
+      <a:camera prst="orthographicFront"/>
+      <a:lightRig rig="threePt" dir="t"/>
+    </dgm:scene3d>
+    <dgm:sp3d/>
+    <dgm:txPr/>
+    <dgm:style>
+      <a:lnRef idx="2">
+        <a:scrgbClr r="0" g="0" b="0"/>
+      </a:lnRef>
+      <a:fillRef idx="1">
+        <a:scrgbClr r="0" g="0" b="0"/>
+      </a:fillRef>
+      <a:effectRef idx="0">
+        <a:scrgbClr r="0" g="0" b="0"/>
+      </a:effectRef>
+      <a:fontRef idx="minor"/>
+    </dgm:style>
+  </dgm:styleLbl>
+  <dgm:styleLbl name="fgAcc3">
+    <dgm:scene3d>
+      <a:camera prst="orthographicFront"/>
+      <a:lightRig rig="threePt" dir="t"/>
+    </dgm:scene3d>
+    <dgm:sp3d/>
+    <dgm:txPr/>
+    <dgm:style>
+      <a:lnRef idx="2">
+        <a:scrgbClr r="0" g="0" b="0"/>
+      </a:lnRef>
+      <a:fillRef idx="1">
+        <a:scrgbClr r="0" g="0" b="0"/>
+      </a:fillRef>
+      <a:effectRef idx="0">
+        <a:scrgbClr r="0" g="0" b="0"/>
+      </a:effectRef>
+      <a:fontRef idx="minor"/>
+    </dgm:style>
+  </dgm:styleLbl>
+  <dgm:styleLbl name="fgAcc4">
+    <dgm:scene3d>
+      <a:camera prst="orthographicFront"/>
+      <a:lightRig rig="threePt" dir="t"/>
+    </dgm:scene3d>
+    <dgm:sp3d/>
+    <dgm:txPr/>
+    <dgm:style>
+      <a:lnRef idx="2">
+        <a:scrgbClr r="0" g="0" b="0"/>
+      </a:lnRef>
+      <a:fillRef idx="1">
+        <a:scrgbClr r="0" g="0" b="0"/>
+      </a:fillRef>
+      <a:effectRef idx="0">
+        <a:scrgbClr r="0" g="0" b="0"/>
+      </a:effectRef>
+      <a:fontRef idx="minor"/>
+    </dgm:style>
+  </dgm:styleLbl>
+  <dgm:styleLbl name="bgShp">
+    <dgm:scene3d>
+      <a:camera prst="orthographicFront"/>
+      <a:lightRig rig="threePt" dir="t"/>
+    </dgm:scene3d>
+    <dgm:sp3d/>
+    <dgm:txPr/>
+    <dgm:style>
+      <a:lnRef idx="0">
+        <a:scrgbClr r="0" g="0" b="0"/>
+      </a:lnRef>
+      <a:fillRef idx="1">
+        <a:scrgbClr r="0" g="0" b="0"/>
+      </a:fillRef>
+      <a:effectRef idx="0">
+        <a:scrgbClr r="0" g="0" b="0"/>
+      </a:effectRef>
+      <a:fontRef idx="minor"/>
+    </dgm:style>
+  </dgm:styleLbl>
+  <dgm:styleLbl name="dkBgShp">
+    <dgm:scene3d>
+      <a:camera prst="orthographicFront"/>
+      <a:lightRig rig="threePt" dir="t"/>
+    </dgm:scene3d>
+    <dgm:sp3d/>
+    <dgm:txPr/>
+    <dgm:style>
+      <a:lnRef idx="0">
+        <a:scrgbClr r="0" g="0" b="0"/>
+      </a:lnRef>
+      <a:fillRef idx="1">
+        <a:scrgbClr r="0" g="0" b="0"/>
+      </a:fillRef>
+      <a:effectRef idx="0">
+        <a:scrgbClr r="0" g="0" b="0"/>
+      </a:effectRef>
+      <a:fontRef idx="minor"/>
+    </dgm:style>
+  </dgm:styleLbl>
+  <dgm:styleLbl name="trBgShp">
+    <dgm:scene3d>
+      <a:camera prst="orthographicFront"/>
+      <a:lightRig rig="threePt" dir="t"/>
+    </dgm:scene3d>
+    <dgm:sp3d/>
+    <dgm:txPr/>
+    <dgm:style>
+      <a:lnRef idx="0">
+        <a:scrgbClr r="0" g="0" b="0"/>
+      </a:lnRef>
+      <a:fillRef idx="1">
+        <a:scrgbClr r="0" g="0" b="0"/>
+      </a:fillRef>
+      <a:effectRef idx="0">
+        <a:scrgbClr r="0" g="0" b="0"/>
+      </a:effectRef>
+      <a:fontRef idx="minor"/>
+    </dgm:style>
+  </dgm:styleLbl>
+  <dgm:styleLbl name="fgShp">
+    <dgm:scene3d>
+      <a:camera prst="orthographicFront"/>
+      <a:lightRig rig="threePt" dir="t"/>
+    </dgm:scene3d>
+    <dgm:sp3d/>
+    <dgm:txPr/>
+    <dgm:style>
+      <a:lnRef idx="2">
+        <a:scrgbClr r="0" g="0" b="0"/>
+      </a:lnRef>
+      <a:fillRef idx="1">
+        <a:scrgbClr r="0" g="0" b="0"/>
+      </a:fillRef>
+      <a:effectRef idx="0">
+        <a:scrgbClr r="0" g="0" b="0"/>
+      </a:effectRef>
+      <a:fontRef idx="minor"/>
+    </dgm:style>
+  </dgm:styleLbl>
+  <dgm:styleLbl name="revTx">
+    <dgm:scene3d>
+      <a:camera prst="orthographicFront"/>
+      <a:lightRig rig="threePt" dir="t"/>
+    </dgm:scene3d>
+    <dgm:sp3d/>
+    <dgm:txPr/>
+    <dgm:style>
+      <a:lnRef idx="0">
+        <a:scrgbClr r="0" g="0" b="0"/>
+      </a:lnRef>
+      <a:fillRef idx="0">
+        <a:scrgbClr r="0" g="0" b="0"/>
+      </a:fillRef>
+      <a:effectRef idx="0">
+        <a:scrgbClr r="0" g="0" b="0"/>
+      </a:effectRef>
+      <a:fontRef idx="minor"/>
+    </dgm:style>
+  </dgm:styleLbl>
+</dgm:styleDef>
 </file>
 
 <file path=ppt/slideLayouts/slideLayout1.xml><?xml version="1.0" encoding="utf-8"?>
@@ -5519,6 +9207,281 @@
           <p:cNvPr id="2" name="Title 1">
             <a:extLst>
               <a:ext uri="{FF2B5EF4-FFF2-40B4-BE49-F238E27FC236}">
+                <a16:creationId xmlns:a16="http://schemas.microsoft.com/office/drawing/2014/main" id="{6685AF5D-8314-44F7-67EA-820DF7FE3A08}"/>
+              </a:ext>
+            </a:extLst>
+          </p:cNvPr>
+          <p:cNvSpPr>
+            <a:spLocks noGrp="1"/>
+          </p:cNvSpPr>
+          <p:nvPr>
+            <p:ph type="title"/>
+          </p:nvPr>
+        </p:nvSpPr>
+        <p:spPr/>
+        <p:txBody>
+          <a:bodyPr/>
+          <a:lstStyle/>
+          <a:p>
+            <a:r>
+              <a:rPr lang="en-US" dirty="0"/>
+              <a:t>Team Introduction</a:t>
+            </a:r>
+          </a:p>
+        </p:txBody>
+      </p:sp>
+      <p:graphicFrame>
+        <p:nvGraphicFramePr>
+          <p:cNvPr id="10" name="Content Placeholder 2">
+            <a:extLst>
+              <a:ext uri="{FF2B5EF4-FFF2-40B4-BE49-F238E27FC236}">
+                <a16:creationId xmlns:a16="http://schemas.microsoft.com/office/drawing/2014/main" id="{7225C978-C5FC-F201-A063-12F3FD25AE43}"/>
+              </a:ext>
+            </a:extLst>
+          </p:cNvPr>
+          <p:cNvGraphicFramePr>
+            <a:graphicFrameLocks noGrp="1"/>
+          </p:cNvGraphicFramePr>
+          <p:nvPr>
+            <p:ph idx="1"/>
+            <p:extLst>
+              <p:ext uri="{D42A27DB-BD31-4B8C-83A1-F6EECF244321}">
+                <p14:modId xmlns:p14="http://schemas.microsoft.com/office/powerpoint/2010/main" val="2070233972"/>
+              </p:ext>
+            </p:extLst>
+          </p:nvPr>
+        </p:nvGraphicFramePr>
+        <p:xfrm>
+          <a:off x="80720" y="2334732"/>
+          <a:ext cx="8267296" cy="3743996"/>
+        </p:xfrm>
+        <a:graphic>
+          <a:graphicData uri="http://schemas.openxmlformats.org/drawingml/2006/diagram">
+            <dgm:relIds xmlns:dgm="http://schemas.openxmlformats.org/drawingml/2006/diagram" xmlns:r="http://schemas.openxmlformats.org/officeDocument/2006/relationships" r:dm="rId2" r:lo="rId3" r:qs="rId4" r:cs="rId5"/>
+          </a:graphicData>
+        </a:graphic>
+      </p:graphicFrame>
+      <p:pic>
+        <p:nvPicPr>
+          <p:cNvPr id="4" name="Picture 3" descr="A person wearing glasses&#10;&#10;Description automatically generated with medium confidence">
+            <a:extLst>
+              <a:ext uri="{FF2B5EF4-FFF2-40B4-BE49-F238E27FC236}">
+                <a16:creationId xmlns:a16="http://schemas.microsoft.com/office/drawing/2014/main" id="{4F02E6AA-BECA-B00B-9994-F3844D5287D1}"/>
+              </a:ext>
+            </a:extLst>
+          </p:cNvPr>
+          <p:cNvPicPr>
+            <a:picLocks noChangeAspect="1"/>
+          </p:cNvPicPr>
+          <p:nvPr/>
+        </p:nvPicPr>
+        <p:blipFill>
+          <a:blip r:embed="rId7">
+            <a:extLst>
+              <a:ext uri="{28A0092B-C50C-407E-A947-70E740481C1C}">
+                <a14:useLocalDpi xmlns:a14="http://schemas.microsoft.com/office/drawing/2010/main" val="0"/>
+              </a:ext>
+            </a:extLst>
+          </a:blip>
+          <a:stretch>
+            <a:fillRect/>
+          </a:stretch>
+        </p:blipFill>
+        <p:spPr>
+          <a:xfrm>
+            <a:off x="8477918" y="1204721"/>
+            <a:ext cx="1353185" cy="1353185"/>
+          </a:xfrm>
+          <a:prstGeom prst="rect">
+            <a:avLst/>
+          </a:prstGeom>
+        </p:spPr>
+      </p:pic>
+      <p:pic>
+        <p:nvPicPr>
+          <p:cNvPr id="5" name="Picture 4" descr="A person wearing glasses&#10;&#10;Description automatically generated with medium confidence">
+            <a:extLst>
+              <a:ext uri="{FF2B5EF4-FFF2-40B4-BE49-F238E27FC236}">
+                <a16:creationId xmlns:a16="http://schemas.microsoft.com/office/drawing/2014/main" id="{1ADDC5EA-2340-6100-8A39-982C5AE86CE3}"/>
+              </a:ext>
+            </a:extLst>
+          </p:cNvPr>
+          <p:cNvPicPr>
+            <a:picLocks noChangeAspect="1"/>
+          </p:cNvPicPr>
+          <p:nvPr/>
+        </p:nvPicPr>
+        <p:blipFill>
+          <a:blip r:embed="rId8" cstate="print">
+            <a:extLst>
+              <a:ext uri="{28A0092B-C50C-407E-A947-70E740481C1C}">
+                <a14:useLocalDpi xmlns:a14="http://schemas.microsoft.com/office/drawing/2010/main" val="0"/>
+              </a:ext>
+            </a:extLst>
+          </a:blip>
+          <a:stretch>
+            <a:fillRect/>
+          </a:stretch>
+        </p:blipFill>
+        <p:spPr>
+          <a:xfrm>
+            <a:off x="9961005" y="2183631"/>
+            <a:ext cx="1353185" cy="1353185"/>
+          </a:xfrm>
+          <a:prstGeom prst="rect">
+            <a:avLst/>
+          </a:prstGeom>
+        </p:spPr>
+      </p:pic>
+      <p:pic>
+        <p:nvPicPr>
+          <p:cNvPr id="6" name="Picture 5" descr="A picture containing wall, person, person, indoor&#10;&#10;Description automatically generated">
+            <a:extLst>
+              <a:ext uri="{FF2B5EF4-FFF2-40B4-BE49-F238E27FC236}">
+                <a16:creationId xmlns:a16="http://schemas.microsoft.com/office/drawing/2014/main" id="{4001C158-AEC5-2A4C-F458-14DC89E4E0EE}"/>
+              </a:ext>
+            </a:extLst>
+          </p:cNvPr>
+          <p:cNvPicPr>
+            <a:picLocks noChangeAspect="1"/>
+          </p:cNvPicPr>
+          <p:nvPr/>
+        </p:nvPicPr>
+        <p:blipFill rotWithShape="1">
+          <a:blip r:embed="rId9" cstate="print">
+            <a:extLst>
+              <a:ext uri="{28A0092B-C50C-407E-A947-70E740481C1C}">
+                <a14:useLocalDpi xmlns:a14="http://schemas.microsoft.com/office/drawing/2010/main" val="0"/>
+              </a:ext>
+            </a:extLst>
+          </a:blip>
+          <a:srcRect t="8528" b="11249"/>
+          <a:stretch/>
+        </p:blipFill>
+        <p:spPr>
+          <a:xfrm>
+            <a:off x="8477918" y="3277968"/>
+            <a:ext cx="1353185" cy="1368591"/>
+          </a:xfrm>
+          <a:prstGeom prst="rect">
+            <a:avLst/>
+          </a:prstGeom>
+        </p:spPr>
+      </p:pic>
+      <p:pic>
+        <p:nvPicPr>
+          <p:cNvPr id="11" name="Picture 10" descr="A picture containing wall, indoor, laying&#10;&#10;Description automatically generated">
+            <a:extLst>
+              <a:ext uri="{FF2B5EF4-FFF2-40B4-BE49-F238E27FC236}">
+                <a16:creationId xmlns:a16="http://schemas.microsoft.com/office/drawing/2014/main" id="{2D29F09A-3930-D769-4EEC-4551244712E5}"/>
+              </a:ext>
+            </a:extLst>
+          </p:cNvPr>
+          <p:cNvPicPr>
+            <a:picLocks noChangeAspect="1"/>
+          </p:cNvPicPr>
+          <p:nvPr/>
+        </p:nvPicPr>
+        <p:blipFill>
+          <a:blip r:embed="rId10">
+            <a:extLst>
+              <a:ext uri="{28A0092B-C50C-407E-A947-70E740481C1C}">
+                <a14:useLocalDpi xmlns:a14="http://schemas.microsoft.com/office/drawing/2010/main" val="0"/>
+              </a:ext>
+            </a:extLst>
+          </a:blip>
+          <a:srcRect l="23799" t="26810" r="20735" b="27440"/>
+          <a:stretch>
+            <a:fillRect/>
+          </a:stretch>
+        </p:blipFill>
+        <p:spPr bwMode="auto">
+          <a:xfrm>
+            <a:off x="10022599" y="4289545"/>
+            <a:ext cx="1229995" cy="1353185"/>
+          </a:xfrm>
+          <a:prstGeom prst="rect">
+            <a:avLst/>
+          </a:prstGeom>
+          <a:noFill/>
+        </p:spPr>
+      </p:pic>
+      <p:pic>
+        <p:nvPicPr>
+          <p:cNvPr id="12" name="Picture 11">
+            <a:extLst>
+              <a:ext uri="{FF2B5EF4-FFF2-40B4-BE49-F238E27FC236}">
+                <a16:creationId xmlns:a16="http://schemas.microsoft.com/office/drawing/2014/main" id="{21C7FC6A-6818-D0FE-663B-40822C6B1ACF}"/>
+              </a:ext>
+            </a:extLst>
+          </p:cNvPr>
+          <p:cNvPicPr>
+            <a:picLocks noChangeAspect="1"/>
+          </p:cNvPicPr>
+          <p:nvPr/>
+        </p:nvPicPr>
+        <p:blipFill>
+          <a:blip r:embed="rId11" cstate="print">
+            <a:extLst>
+              <a:ext uri="{28A0092B-C50C-407E-A947-70E740481C1C}">
+                <a14:useLocalDpi xmlns:a14="http://schemas.microsoft.com/office/drawing/2010/main" val="0"/>
+              </a:ext>
+            </a:extLst>
+          </a:blip>
+          <a:srcRect/>
+          <a:stretch>
+            <a:fillRect/>
+          </a:stretch>
+        </p:blipFill>
+        <p:spPr bwMode="auto">
+          <a:xfrm>
+            <a:off x="8563922" y="5273256"/>
+            <a:ext cx="1270000" cy="1428750"/>
+          </a:xfrm>
+          <a:prstGeom prst="rect">
+            <a:avLst/>
+          </a:prstGeom>
+          <a:noFill/>
+          <a:ln>
+            <a:noFill/>
+          </a:ln>
+        </p:spPr>
+      </p:pic>
+    </p:spTree>
+    <p:extLst>
+      <p:ext uri="{BB962C8B-B14F-4D97-AF65-F5344CB8AC3E}">
+        <p14:creationId xmlns:p14="http://schemas.microsoft.com/office/powerpoint/2010/main" val="754174659"/>
+      </p:ext>
+    </p:extLst>
+  </p:cSld>
+  <p:clrMapOvr>
+    <a:masterClrMapping/>
+  </p:clrMapOvr>
+</p:sld>
+</file>
+
+<file path=ppt/slides/slide3.xml><?xml version="1.0" encoding="utf-8"?>
+<p:sld xmlns:a="http://schemas.openxmlformats.org/drawingml/2006/main" xmlns:r="http://schemas.openxmlformats.org/officeDocument/2006/relationships" xmlns:p="http://schemas.openxmlformats.org/presentationml/2006/main">
+  <p:cSld>
+    <p:spTree>
+      <p:nvGrpSpPr>
+        <p:cNvPr id="1" name=""/>
+        <p:cNvGrpSpPr/>
+        <p:nvPr/>
+      </p:nvGrpSpPr>
+      <p:grpSpPr>
+        <a:xfrm>
+          <a:off x="0" y="0"/>
+          <a:ext cx="0" cy="0"/>
+          <a:chOff x="0" y="0"/>
+          <a:chExt cx="0" cy="0"/>
+        </a:xfrm>
+      </p:grpSpPr>
+      <p:sp>
+        <p:nvSpPr>
+          <p:cNvPr id="2" name="Title 1">
+            <a:extLst>
+              <a:ext uri="{FF2B5EF4-FFF2-40B4-BE49-F238E27FC236}">
                 <a16:creationId xmlns:a16="http://schemas.microsoft.com/office/drawing/2014/main" id="{0067F057-2BFF-4C1F-EAD2-9D876D612BD1}"/>
               </a:ext>
             </a:extLst>

</xml_diff>

<commit_message>
Update Mini Intro Presentation
Outlined entire presentation, added part of the development plan, and intro/hook.
</commit_message>
<xml_diff>
--- a/Teacher To-Do Mini Intro.pptx
+++ b/Teacher To-Do Mini Intro.pptx
@@ -7,7 +7,12 @@
   <p:sldIdLst>
     <p:sldId id="256" r:id="rId2"/>
     <p:sldId id="258" r:id="rId3"/>
-    <p:sldId id="257" r:id="rId4"/>
+    <p:sldId id="259" r:id="rId4"/>
+    <p:sldId id="260" r:id="rId5"/>
+    <p:sldId id="257" r:id="rId6"/>
+    <p:sldId id="261" r:id="rId7"/>
+    <p:sldId id="263" r:id="rId8"/>
+    <p:sldId id="262" r:id="rId9"/>
   </p:sldIdLst>
   <p:sldSz cx="12192000" cy="6858000"/>
   <p:notesSz cx="6858000" cy="9144000"/>
@@ -4111,7 +4116,7 @@
             <a:fld id="{73C3BD54-29B9-3D42-B178-776ED395AA85}" type="datetimeFigureOut">
               <a:rPr lang="en-US" smtClean="0"/>
               <a:pPr/>
-              <a:t>10/12/2022</a:t>
+              <a:t>10/13/2022</a:t>
             </a:fld>
             <a:endParaRPr lang="en-US" sz="1400"/>
           </a:p>
@@ -4361,7 +4366,7 @@
           <a:p>
             <a:fld id="{73C3BD54-29B9-3D42-B178-776ED395AA85}" type="datetimeFigureOut">
               <a:rPr lang="en-US" smtClean="0"/>
-              <a:t>10/12/2022</a:t>
+              <a:t>10/13/2022</a:t>
             </a:fld>
             <a:endParaRPr lang="en-US"/>
           </a:p>
@@ -4675,7 +4680,7 @@
           <a:p>
             <a:fld id="{73C3BD54-29B9-3D42-B178-776ED395AA85}" type="datetimeFigureOut">
               <a:rPr lang="en-US" smtClean="0"/>
-              <a:t>10/12/2022</a:t>
+              <a:t>10/13/2022</a:t>
             </a:fld>
             <a:endParaRPr lang="en-US"/>
           </a:p>
@@ -5189,7 +5194,7 @@
           <a:p>
             <a:fld id="{73C3BD54-29B9-3D42-B178-776ED395AA85}" type="datetimeFigureOut">
               <a:rPr lang="en-US" smtClean="0"/>
-              <a:t>10/12/2022</a:t>
+              <a:t>10/13/2022</a:t>
             </a:fld>
             <a:endParaRPr lang="en-US"/>
           </a:p>
@@ -5620,7 +5625,7 @@
           <a:p>
             <a:fld id="{73C3BD54-29B9-3D42-B178-776ED395AA85}" type="datetimeFigureOut">
               <a:rPr lang="en-US" smtClean="0"/>
-              <a:t>10/12/2022</a:t>
+              <a:t>10/13/2022</a:t>
             </a:fld>
             <a:endParaRPr lang="en-US"/>
           </a:p>
@@ -5885,7 +5890,7 @@
           <a:p>
             <a:fld id="{73C3BD54-29B9-3D42-B178-776ED395AA85}" type="datetimeFigureOut">
               <a:rPr lang="en-US" smtClean="0"/>
-              <a:t>10/12/2022</a:t>
+              <a:t>10/13/2022</a:t>
             </a:fld>
             <a:endParaRPr lang="en-US"/>
           </a:p>
@@ -6459,7 +6464,7 @@
           <a:p>
             <a:fld id="{73C3BD54-29B9-3D42-B178-776ED395AA85}" type="datetimeFigureOut">
               <a:rPr lang="en-US" smtClean="0"/>
-              <a:t>10/12/2022</a:t>
+              <a:t>10/13/2022</a:t>
             </a:fld>
             <a:endParaRPr lang="en-US"/>
           </a:p>
@@ -6762,7 +6767,7 @@
           <a:p>
             <a:fld id="{73C3BD54-29B9-3D42-B178-776ED395AA85}" type="datetimeFigureOut">
               <a:rPr lang="en-US" smtClean="0"/>
-              <a:t>10/12/2022</a:t>
+              <a:t>10/13/2022</a:t>
             </a:fld>
             <a:endParaRPr lang="en-US"/>
           </a:p>
@@ -7037,7 +7042,7 @@
           <a:p>
             <a:fld id="{73C3BD54-29B9-3D42-B178-776ED395AA85}" type="datetimeFigureOut">
               <a:rPr lang="en-US" smtClean="0"/>
-              <a:t>10/12/2022</a:t>
+              <a:t>10/13/2022</a:t>
             </a:fld>
             <a:endParaRPr lang="en-US"/>
           </a:p>
@@ -7508,7 +7513,7 @@
           <a:p>
             <a:fld id="{73C3BD54-29B9-3D42-B178-776ED395AA85}" type="datetimeFigureOut">
               <a:rPr lang="en-US" smtClean="0"/>
-              <a:t>10/12/2022</a:t>
+              <a:t>10/13/2022</a:t>
             </a:fld>
             <a:endParaRPr lang="en-US"/>
           </a:p>
@@ -7959,7 +7964,7 @@
           <a:p>
             <a:fld id="{73C3BD54-29B9-3D42-B178-776ED395AA85}" type="datetimeFigureOut">
               <a:rPr lang="en-US" smtClean="0"/>
-              <a:t>10/12/2022</a:t>
+              <a:t>10/13/2022</a:t>
             </a:fld>
             <a:endParaRPr lang="en-US"/>
           </a:p>
@@ -8355,7 +8360,7 @@
             <a:fld id="{73C3BD54-29B9-3D42-B178-776ED395AA85}" type="datetimeFigureOut">
               <a:rPr lang="en-US" smtClean="0"/>
               <a:pPr/>
-              <a:t>10/12/2022</a:t>
+              <a:t>10/13/2022</a:t>
             </a:fld>
             <a:endParaRPr lang="en-US" dirty="0"/>
           </a:p>
@@ -9482,6 +9487,203 @@
           <p:cNvPr id="2" name="Title 1">
             <a:extLst>
               <a:ext uri="{FF2B5EF4-FFF2-40B4-BE49-F238E27FC236}">
+                <a16:creationId xmlns:a16="http://schemas.microsoft.com/office/drawing/2014/main" id="{71CD8F4F-65FD-07BE-748C-09368B317A35}"/>
+              </a:ext>
+            </a:extLst>
+          </p:cNvPr>
+          <p:cNvSpPr>
+            <a:spLocks noGrp="1"/>
+          </p:cNvSpPr>
+          <p:nvPr>
+            <p:ph type="title"/>
+          </p:nvPr>
+        </p:nvSpPr>
+        <p:spPr/>
+        <p:txBody>
+          <a:bodyPr/>
+          <a:lstStyle/>
+          <a:p>
+            <a:r>
+              <a:rPr lang="en-US" dirty="0"/>
+              <a:t>Introduction</a:t>
+            </a:r>
+          </a:p>
+        </p:txBody>
+      </p:sp>
+      <p:sp>
+        <p:nvSpPr>
+          <p:cNvPr id="3" name="Content Placeholder 2">
+            <a:extLst>
+              <a:ext uri="{FF2B5EF4-FFF2-40B4-BE49-F238E27FC236}">
+                <a16:creationId xmlns:a16="http://schemas.microsoft.com/office/drawing/2014/main" id="{89A3D634-5782-B6B0-F169-31955CDA5044}"/>
+              </a:ext>
+            </a:extLst>
+          </p:cNvPr>
+          <p:cNvSpPr>
+            <a:spLocks noGrp="1"/>
+          </p:cNvSpPr>
+          <p:nvPr>
+            <p:ph idx="1"/>
+          </p:nvPr>
+        </p:nvSpPr>
+        <p:spPr>
+          <a:xfrm>
+            <a:off x="565148" y="2174052"/>
+            <a:ext cx="9959077" cy="3967955"/>
+          </a:xfrm>
+        </p:spPr>
+        <p:txBody>
+          <a:bodyPr>
+            <a:normAutofit/>
+          </a:bodyPr>
+          <a:lstStyle/>
+          <a:p>
+            <a:r>
+              <a:rPr lang="en-US" sz="2000" b="0" dirty="0">
+                <a:effectLst/>
+              </a:rPr>
+              <a:t>The education of children is critical to the future success of our entire society. In Arizona alone, there are an estimated 2,600 teaching positions that remain open this school year. In order </a:t>
+            </a:r>
+            <a:r>
+              <a:rPr lang="en-US" sz="2000" dirty="0"/>
+              <a:t>to help fill this gap and ensure the success of Arizona students, the Arizona Department of Education has started a new program that allows undergraduate education students the opportunity to fill some of these vacant positions and gain hands on experience in the classroom while finishing their degree.</a:t>
+            </a:r>
+            <a:br>
+              <a:rPr lang="en-US" sz="2000" dirty="0"/>
+            </a:br>
+            <a:endParaRPr lang="en-US" sz="2000" dirty="0"/>
+          </a:p>
+          <a:p>
+            <a:r>
+              <a:rPr lang="en-US" sz="2000" b="0" dirty="0">
+                <a:effectLst/>
+              </a:rPr>
+              <a:t>The College of Education is tasked with assisting NAU students who would like to enter these vacant positions. This involves ensuring that students meet a variety of requirements set out by AZDE, gathering supporting documentation and ensuring that each student has the support they need to be successful.</a:t>
+            </a:r>
+          </a:p>
+          <a:p>
+            <a:endParaRPr lang="en-US" dirty="0"/>
+          </a:p>
+        </p:txBody>
+      </p:sp>
+    </p:spTree>
+    <p:extLst>
+      <p:ext uri="{BB962C8B-B14F-4D97-AF65-F5344CB8AC3E}">
+        <p14:creationId xmlns:p14="http://schemas.microsoft.com/office/powerpoint/2010/main" val="221515814"/>
+      </p:ext>
+    </p:extLst>
+  </p:cSld>
+  <p:clrMapOvr>
+    <a:masterClrMapping/>
+  </p:clrMapOvr>
+</p:sld>
+</file>
+
+<file path=ppt/slides/slide4.xml><?xml version="1.0" encoding="utf-8"?>
+<p:sld xmlns:a="http://schemas.openxmlformats.org/drawingml/2006/main" xmlns:r="http://schemas.openxmlformats.org/officeDocument/2006/relationships" xmlns:p="http://schemas.openxmlformats.org/presentationml/2006/main">
+  <p:cSld>
+    <p:spTree>
+      <p:nvGrpSpPr>
+        <p:cNvPr id="1" name=""/>
+        <p:cNvGrpSpPr/>
+        <p:nvPr/>
+      </p:nvGrpSpPr>
+      <p:grpSpPr>
+        <a:xfrm>
+          <a:off x="0" y="0"/>
+          <a:ext cx="0" cy="0"/>
+          <a:chOff x="0" y="0"/>
+          <a:chExt cx="0" cy="0"/>
+        </a:xfrm>
+      </p:grpSpPr>
+      <p:sp>
+        <p:nvSpPr>
+          <p:cNvPr id="2" name="Title 1">
+            <a:extLst>
+              <a:ext uri="{FF2B5EF4-FFF2-40B4-BE49-F238E27FC236}">
+                <a16:creationId xmlns:a16="http://schemas.microsoft.com/office/drawing/2014/main" id="{0D81E11E-3E0E-2B6D-2EA2-0D2FCE6D92A0}"/>
+              </a:ext>
+            </a:extLst>
+          </p:cNvPr>
+          <p:cNvSpPr>
+            <a:spLocks noGrp="1"/>
+          </p:cNvSpPr>
+          <p:nvPr>
+            <p:ph type="title"/>
+          </p:nvPr>
+        </p:nvSpPr>
+        <p:spPr/>
+        <p:txBody>
+          <a:bodyPr/>
+          <a:lstStyle/>
+          <a:p>
+            <a:r>
+              <a:rPr lang="en-US" dirty="0"/>
+              <a:t>Client Intro</a:t>
+            </a:r>
+          </a:p>
+        </p:txBody>
+      </p:sp>
+      <p:sp>
+        <p:nvSpPr>
+          <p:cNvPr id="3" name="Content Placeholder 2">
+            <a:extLst>
+              <a:ext uri="{FF2B5EF4-FFF2-40B4-BE49-F238E27FC236}">
+                <a16:creationId xmlns:a16="http://schemas.microsoft.com/office/drawing/2014/main" id="{EF2E14F4-EE5C-20D8-36A9-4DA7DEF80ABF}"/>
+              </a:ext>
+            </a:extLst>
+          </p:cNvPr>
+          <p:cNvSpPr>
+            <a:spLocks noGrp="1"/>
+          </p:cNvSpPr>
+          <p:nvPr>
+            <p:ph idx="1"/>
+          </p:nvPr>
+        </p:nvSpPr>
+        <p:spPr/>
+        <p:txBody>
+          <a:bodyPr/>
+          <a:lstStyle/>
+          <a:p>
+            <a:endParaRPr lang="en-US"/>
+          </a:p>
+        </p:txBody>
+      </p:sp>
+    </p:spTree>
+    <p:extLst>
+      <p:ext uri="{BB962C8B-B14F-4D97-AF65-F5344CB8AC3E}">
+        <p14:creationId xmlns:p14="http://schemas.microsoft.com/office/powerpoint/2010/main" val="851727559"/>
+      </p:ext>
+    </p:extLst>
+  </p:cSld>
+  <p:clrMapOvr>
+    <a:masterClrMapping/>
+  </p:clrMapOvr>
+</p:sld>
+</file>
+
+<file path=ppt/slides/slide5.xml><?xml version="1.0" encoding="utf-8"?>
+<p:sld xmlns:a="http://schemas.openxmlformats.org/drawingml/2006/main" xmlns:r="http://schemas.openxmlformats.org/officeDocument/2006/relationships" xmlns:p="http://schemas.openxmlformats.org/presentationml/2006/main">
+  <p:cSld>
+    <p:spTree>
+      <p:nvGrpSpPr>
+        <p:cNvPr id="1" name=""/>
+        <p:cNvGrpSpPr/>
+        <p:nvPr/>
+      </p:nvGrpSpPr>
+      <p:grpSpPr>
+        <a:xfrm>
+          <a:off x="0" y="0"/>
+          <a:ext cx="0" cy="0"/>
+          <a:chOff x="0" y="0"/>
+          <a:chExt cx="0" cy="0"/>
+        </a:xfrm>
+      </p:grpSpPr>
+      <p:sp>
+        <p:nvSpPr>
+          <p:cNvPr id="2" name="Title 1">
+            <a:extLst>
+              <a:ext uri="{FF2B5EF4-FFF2-40B4-BE49-F238E27FC236}">
                 <a16:creationId xmlns:a16="http://schemas.microsoft.com/office/drawing/2014/main" id="{0067F057-2BFF-4C1F-EAD2-9D876D612BD1}"/>
               </a:ext>
             </a:extLst>
@@ -9606,6 +9808,275 @@
     <p:extLst>
       <p:ext uri="{BB962C8B-B14F-4D97-AF65-F5344CB8AC3E}">
         <p14:creationId xmlns:p14="http://schemas.microsoft.com/office/powerpoint/2010/main" val="2026533562"/>
+      </p:ext>
+    </p:extLst>
+  </p:cSld>
+  <p:clrMapOvr>
+    <a:masterClrMapping/>
+  </p:clrMapOvr>
+</p:sld>
+</file>
+
+<file path=ppt/slides/slide6.xml><?xml version="1.0" encoding="utf-8"?>
+<p:sld xmlns:a="http://schemas.openxmlformats.org/drawingml/2006/main" xmlns:r="http://schemas.openxmlformats.org/officeDocument/2006/relationships" xmlns:p="http://schemas.openxmlformats.org/presentationml/2006/main">
+  <p:cSld>
+    <p:spTree>
+      <p:nvGrpSpPr>
+        <p:cNvPr id="1" name=""/>
+        <p:cNvGrpSpPr/>
+        <p:nvPr/>
+      </p:nvGrpSpPr>
+      <p:grpSpPr>
+        <a:xfrm>
+          <a:off x="0" y="0"/>
+          <a:ext cx="0" cy="0"/>
+          <a:chOff x="0" y="0"/>
+          <a:chExt cx="0" cy="0"/>
+        </a:xfrm>
+      </p:grpSpPr>
+      <p:sp>
+        <p:nvSpPr>
+          <p:cNvPr id="2" name="Title 1">
+            <a:extLst>
+              <a:ext uri="{FF2B5EF4-FFF2-40B4-BE49-F238E27FC236}">
+                <a16:creationId xmlns:a16="http://schemas.microsoft.com/office/drawing/2014/main" id="{61FE5872-4037-FFB1-C20E-FAAA45565BC3}"/>
+              </a:ext>
+            </a:extLst>
+          </p:cNvPr>
+          <p:cNvSpPr>
+            <a:spLocks noGrp="1"/>
+          </p:cNvSpPr>
+          <p:nvPr>
+            <p:ph type="title"/>
+          </p:nvPr>
+        </p:nvSpPr>
+        <p:spPr/>
+        <p:txBody>
+          <a:bodyPr/>
+          <a:lstStyle/>
+          <a:p>
+            <a:r>
+              <a:rPr lang="en-US" dirty="0"/>
+              <a:t>Proposed Solution</a:t>
+            </a:r>
+          </a:p>
+        </p:txBody>
+      </p:sp>
+      <p:sp>
+        <p:nvSpPr>
+          <p:cNvPr id="3" name="Content Placeholder 2">
+            <a:extLst>
+              <a:ext uri="{FF2B5EF4-FFF2-40B4-BE49-F238E27FC236}">
+                <a16:creationId xmlns:a16="http://schemas.microsoft.com/office/drawing/2014/main" id="{9E16027E-8CA2-0945-550E-323438E6BEE5}"/>
+              </a:ext>
+            </a:extLst>
+          </p:cNvPr>
+          <p:cNvSpPr>
+            <a:spLocks noGrp="1"/>
+          </p:cNvSpPr>
+          <p:nvPr>
+            <p:ph idx="1"/>
+          </p:nvPr>
+        </p:nvSpPr>
+        <p:spPr/>
+        <p:txBody>
+          <a:bodyPr/>
+          <a:lstStyle/>
+          <a:p>
+            <a:endParaRPr lang="en-US"/>
+          </a:p>
+        </p:txBody>
+      </p:sp>
+    </p:spTree>
+    <p:extLst>
+      <p:ext uri="{BB962C8B-B14F-4D97-AF65-F5344CB8AC3E}">
+        <p14:creationId xmlns:p14="http://schemas.microsoft.com/office/powerpoint/2010/main" val="421176747"/>
+      </p:ext>
+    </p:extLst>
+  </p:cSld>
+  <p:clrMapOvr>
+    <a:masterClrMapping/>
+  </p:clrMapOvr>
+</p:sld>
+</file>
+
+<file path=ppt/slides/slide7.xml><?xml version="1.0" encoding="utf-8"?>
+<p:sld xmlns:a="http://schemas.openxmlformats.org/drawingml/2006/main" xmlns:r="http://schemas.openxmlformats.org/officeDocument/2006/relationships" xmlns:p="http://schemas.openxmlformats.org/presentationml/2006/main">
+  <p:cSld>
+    <p:spTree>
+      <p:nvGrpSpPr>
+        <p:cNvPr id="1" name=""/>
+        <p:cNvGrpSpPr/>
+        <p:nvPr/>
+      </p:nvGrpSpPr>
+      <p:grpSpPr>
+        <a:xfrm>
+          <a:off x="0" y="0"/>
+          <a:ext cx="0" cy="0"/>
+          <a:chOff x="0" y="0"/>
+          <a:chExt cx="0" cy="0"/>
+        </a:xfrm>
+      </p:grpSpPr>
+      <p:sp>
+        <p:nvSpPr>
+          <p:cNvPr id="2" name="Title 1">
+            <a:extLst>
+              <a:ext uri="{FF2B5EF4-FFF2-40B4-BE49-F238E27FC236}">
+                <a16:creationId xmlns:a16="http://schemas.microsoft.com/office/drawing/2014/main" id="{8266902E-CA48-A7C2-D28B-44005F121BAF}"/>
+              </a:ext>
+            </a:extLst>
+          </p:cNvPr>
+          <p:cNvSpPr>
+            <a:spLocks noGrp="1"/>
+          </p:cNvSpPr>
+          <p:nvPr>
+            <p:ph type="title"/>
+          </p:nvPr>
+        </p:nvSpPr>
+        <p:spPr/>
+        <p:txBody>
+          <a:bodyPr/>
+          <a:lstStyle/>
+          <a:p>
+            <a:r>
+              <a:rPr lang="en-US" dirty="0"/>
+              <a:t>Plan for Development</a:t>
+            </a:r>
+          </a:p>
+        </p:txBody>
+      </p:sp>
+      <p:sp>
+        <p:nvSpPr>
+          <p:cNvPr id="3" name="Content Placeholder 2">
+            <a:extLst>
+              <a:ext uri="{FF2B5EF4-FFF2-40B4-BE49-F238E27FC236}">
+                <a16:creationId xmlns:a16="http://schemas.microsoft.com/office/drawing/2014/main" id="{78DD6069-A294-608E-3F3D-02D0390DC922}"/>
+              </a:ext>
+            </a:extLst>
+          </p:cNvPr>
+          <p:cNvSpPr>
+            <a:spLocks noGrp="1"/>
+          </p:cNvSpPr>
+          <p:nvPr>
+            <p:ph idx="1"/>
+          </p:nvPr>
+        </p:nvSpPr>
+        <p:spPr>
+          <a:xfrm>
+            <a:off x="565149" y="2211536"/>
+            <a:ext cx="10597432" cy="3441743"/>
+          </a:xfrm>
+        </p:spPr>
+        <p:txBody>
+          <a:bodyPr/>
+          <a:lstStyle/>
+          <a:p>
+            <a:r>
+              <a:rPr lang="en-US" dirty="0"/>
+              <a:t>We plan to have bi-weekly meetings with our client to have high-level discussions or requirements and obtain feedback on design choices.</a:t>
+            </a:r>
+          </a:p>
+          <a:p>
+            <a:r>
+              <a:rPr lang="en-US" dirty="0"/>
+              <a:t>We have already begun our technical investigation and have started acquiring some resources that may take longer to obtain like CAS integration.</a:t>
+            </a:r>
+          </a:p>
+          <a:p>
+            <a:r>
+              <a:rPr lang="en-US" dirty="0"/>
+              <a:t>Because we are handling student records, we must take student privacy into account to ensure data integrity.</a:t>
+            </a:r>
+          </a:p>
+        </p:txBody>
+      </p:sp>
+    </p:spTree>
+    <p:extLst>
+      <p:ext uri="{BB962C8B-B14F-4D97-AF65-F5344CB8AC3E}">
+        <p14:creationId xmlns:p14="http://schemas.microsoft.com/office/powerpoint/2010/main" val="956222019"/>
+      </p:ext>
+    </p:extLst>
+  </p:cSld>
+  <p:clrMapOvr>
+    <a:masterClrMapping/>
+  </p:clrMapOvr>
+</p:sld>
+</file>
+
+<file path=ppt/slides/slide8.xml><?xml version="1.0" encoding="utf-8"?>
+<p:sld xmlns:a="http://schemas.openxmlformats.org/drawingml/2006/main" xmlns:r="http://schemas.openxmlformats.org/officeDocument/2006/relationships" xmlns:p="http://schemas.openxmlformats.org/presentationml/2006/main">
+  <p:cSld>
+    <p:spTree>
+      <p:nvGrpSpPr>
+        <p:cNvPr id="1" name=""/>
+        <p:cNvGrpSpPr/>
+        <p:nvPr/>
+      </p:nvGrpSpPr>
+      <p:grpSpPr>
+        <a:xfrm>
+          <a:off x="0" y="0"/>
+          <a:ext cx="0" cy="0"/>
+          <a:chOff x="0" y="0"/>
+          <a:chExt cx="0" cy="0"/>
+        </a:xfrm>
+      </p:grpSpPr>
+      <p:sp>
+        <p:nvSpPr>
+          <p:cNvPr id="2" name="Title 1">
+            <a:extLst>
+              <a:ext uri="{FF2B5EF4-FFF2-40B4-BE49-F238E27FC236}">
+                <a16:creationId xmlns:a16="http://schemas.microsoft.com/office/drawing/2014/main" id="{B1C8D20B-F0F1-A493-2D01-C6928A666FEF}"/>
+              </a:ext>
+            </a:extLst>
+          </p:cNvPr>
+          <p:cNvSpPr>
+            <a:spLocks noGrp="1"/>
+          </p:cNvSpPr>
+          <p:nvPr>
+            <p:ph type="title"/>
+          </p:nvPr>
+        </p:nvSpPr>
+        <p:spPr/>
+        <p:txBody>
+          <a:bodyPr/>
+          <a:lstStyle/>
+          <a:p>
+            <a:r>
+              <a:rPr lang="en-US" dirty="0"/>
+              <a:t>Conclusion</a:t>
+            </a:r>
+          </a:p>
+        </p:txBody>
+      </p:sp>
+      <p:sp>
+        <p:nvSpPr>
+          <p:cNvPr id="3" name="Content Placeholder 2">
+            <a:extLst>
+              <a:ext uri="{FF2B5EF4-FFF2-40B4-BE49-F238E27FC236}">
+                <a16:creationId xmlns:a16="http://schemas.microsoft.com/office/drawing/2014/main" id="{CC3677ED-B1FE-2753-95D6-AA48E426BFC6}"/>
+              </a:ext>
+            </a:extLst>
+          </p:cNvPr>
+          <p:cNvSpPr>
+            <a:spLocks noGrp="1"/>
+          </p:cNvSpPr>
+          <p:nvPr>
+            <p:ph idx="1"/>
+          </p:nvPr>
+        </p:nvSpPr>
+        <p:spPr/>
+        <p:txBody>
+          <a:bodyPr/>
+          <a:lstStyle/>
+          <a:p>
+            <a:endParaRPr lang="en-US"/>
+          </a:p>
+        </p:txBody>
+      </p:sp>
+    </p:spTree>
+    <p:extLst>
+      <p:ext uri="{BB962C8B-B14F-4D97-AF65-F5344CB8AC3E}">
+        <p14:creationId xmlns:p14="http://schemas.microsoft.com/office/powerpoint/2010/main" val="1931477183"/>
       </p:ext>
     </p:extLst>
   </p:cSld>

</xml_diff>